<commit_message>
Finalizando o uso do Proxy na NegociacaoController
</commit_message>
<xml_diff>
--- a/docs/JS Avançado 1-2-3-resumo.pptx
+++ b/docs/JS Avançado 1-2-3-resumo.pptx
@@ -245,7 +245,7 @@
           <a:p>
             <a:fld id="{CC58B075-67F8-4A8D-AE1C-3D3E4193EBCA}" type="datetimeFigureOut">
               <a:rPr lang="pt-BR" smtClean="0"/>
-              <a:t>10/03/19</a:t>
+              <a:t>15/03/2019</a:t>
             </a:fld>
             <a:endParaRPr lang="pt-BR"/>
           </a:p>
@@ -413,7 +413,7 @@
           <a:p>
             <a:fld id="{CC58B075-67F8-4A8D-AE1C-3D3E4193EBCA}" type="datetimeFigureOut">
               <a:rPr lang="pt-BR" smtClean="0"/>
-              <a:t>10/03/19</a:t>
+              <a:t>15/03/2019</a:t>
             </a:fld>
             <a:endParaRPr lang="pt-BR"/>
           </a:p>
@@ -591,7 +591,7 @@
           <a:p>
             <a:fld id="{CC58B075-67F8-4A8D-AE1C-3D3E4193EBCA}" type="datetimeFigureOut">
               <a:rPr lang="pt-BR" smtClean="0"/>
-              <a:t>10/03/19</a:t>
+              <a:t>15/03/2019</a:t>
             </a:fld>
             <a:endParaRPr lang="pt-BR"/>
           </a:p>
@@ -759,7 +759,7 @@
           <a:p>
             <a:fld id="{CC58B075-67F8-4A8D-AE1C-3D3E4193EBCA}" type="datetimeFigureOut">
               <a:rPr lang="pt-BR" smtClean="0"/>
-              <a:t>10/03/19</a:t>
+              <a:t>15/03/2019</a:t>
             </a:fld>
             <a:endParaRPr lang="pt-BR"/>
           </a:p>
@@ -1004,7 +1004,7 @@
           <a:p>
             <a:fld id="{CC58B075-67F8-4A8D-AE1C-3D3E4193EBCA}" type="datetimeFigureOut">
               <a:rPr lang="pt-BR" smtClean="0"/>
-              <a:t>10/03/19</a:t>
+              <a:t>15/03/2019</a:t>
             </a:fld>
             <a:endParaRPr lang="pt-BR"/>
           </a:p>
@@ -1233,7 +1233,7 @@
           <a:p>
             <a:fld id="{CC58B075-67F8-4A8D-AE1C-3D3E4193EBCA}" type="datetimeFigureOut">
               <a:rPr lang="pt-BR" smtClean="0"/>
-              <a:t>10/03/19</a:t>
+              <a:t>15/03/2019</a:t>
             </a:fld>
             <a:endParaRPr lang="pt-BR"/>
           </a:p>
@@ -1597,7 +1597,7 @@
           <a:p>
             <a:fld id="{CC58B075-67F8-4A8D-AE1C-3D3E4193EBCA}" type="datetimeFigureOut">
               <a:rPr lang="pt-BR" smtClean="0"/>
-              <a:t>10/03/19</a:t>
+              <a:t>15/03/2019</a:t>
             </a:fld>
             <a:endParaRPr lang="pt-BR"/>
           </a:p>
@@ -1714,7 +1714,7 @@
           <a:p>
             <a:fld id="{CC58B075-67F8-4A8D-AE1C-3D3E4193EBCA}" type="datetimeFigureOut">
               <a:rPr lang="pt-BR" smtClean="0"/>
-              <a:t>10/03/19</a:t>
+              <a:t>15/03/2019</a:t>
             </a:fld>
             <a:endParaRPr lang="pt-BR"/>
           </a:p>
@@ -1809,7 +1809,7 @@
           <a:p>
             <a:fld id="{CC58B075-67F8-4A8D-AE1C-3D3E4193EBCA}" type="datetimeFigureOut">
               <a:rPr lang="pt-BR" smtClean="0"/>
-              <a:t>10/03/19</a:t>
+              <a:t>15/03/2019</a:t>
             </a:fld>
             <a:endParaRPr lang="pt-BR"/>
           </a:p>
@@ -2084,7 +2084,7 @@
           <a:p>
             <a:fld id="{CC58B075-67F8-4A8D-AE1C-3D3E4193EBCA}" type="datetimeFigureOut">
               <a:rPr lang="pt-BR" smtClean="0"/>
-              <a:t>10/03/19</a:t>
+              <a:t>15/03/2019</a:t>
             </a:fld>
             <a:endParaRPr lang="pt-BR"/>
           </a:p>
@@ -2336,7 +2336,7 @@
           <a:p>
             <a:fld id="{CC58B075-67F8-4A8D-AE1C-3D3E4193EBCA}" type="datetimeFigureOut">
               <a:rPr lang="pt-BR" smtClean="0"/>
-              <a:t>10/03/19</a:t>
+              <a:t>15/03/2019</a:t>
             </a:fld>
             <a:endParaRPr lang="pt-BR"/>
           </a:p>
@@ -2547,7 +2547,7 @@
           <a:p>
             <a:fld id="{CC58B075-67F8-4A8D-AE1C-3D3E4193EBCA}" type="datetimeFigureOut">
               <a:rPr lang="pt-BR" smtClean="0"/>
-              <a:t>10/03/19</a:t>
+              <a:t>15/03/2019</a:t>
             </a:fld>
             <a:endParaRPr lang="pt-BR"/>
           </a:p>
@@ -3611,8 +3611,8 @@
         </p:nvSpPr>
         <p:spPr>
           <a:xfrm>
-            <a:off x="816078" y="247292"/>
-            <a:ext cx="9144000" cy="863753"/>
+            <a:off x="816078" y="247293"/>
+            <a:ext cx="9144000" cy="529322"/>
           </a:xfrm>
         </p:spPr>
         <p:txBody>
@@ -3621,6 +3621,10 @@
           </a:bodyPr>
           <a:lstStyle/>
           <a:p>
+            <a:r>
+              <a:rPr lang="pt-BR" sz="2800" dirty="0" smtClean="0"/>
+              <a:t>Padrão Proxy</a:t>
+            </a:r>
             <a:endParaRPr lang="pt-BR" sz="2800" dirty="0"/>
           </a:p>
         </p:txBody>
@@ -3637,8 +3641,8 @@
         </p:nvSpPr>
         <p:spPr>
           <a:xfrm>
-            <a:off x="816078" y="1311122"/>
-            <a:ext cx="9144000" cy="1655762"/>
+            <a:off x="540506" y="910288"/>
+            <a:ext cx="11259012" cy="5490512"/>
           </a:xfrm>
         </p:spPr>
         <p:txBody>
@@ -3646,6 +3650,198 @@
             <a:normAutofit/>
           </a:bodyPr>
           <a:lstStyle/>
+          <a:p>
+            <a:r>
+              <a:rPr lang="pt-BR" sz="1600" dirty="0" smtClean="0"/>
+              <a:t>É um cara “mentiroso”, um objeto falso, que envolve e encapsula o objeto real que queremos interagir. Podemos pensar como uma “casca” que envolve </a:t>
+            </a:r>
+            <a:r>
+              <a:rPr lang="pt-BR" sz="1600" smtClean="0"/>
+              <a:t>os objetos.</a:t>
+            </a:r>
+            <a:endParaRPr lang="pt-BR" sz="1600" dirty="0" smtClean="0"/>
+          </a:p>
+          <a:p>
+            <a:r>
+              <a:rPr lang="pt-BR" sz="1600" dirty="0" smtClean="0"/>
+              <a:t>É como se fosse uma interface, entre o objeto real e o resto do código. Assim você consegue controlar os métodos e atributos.</a:t>
+            </a:r>
+          </a:p>
+          <a:p>
+            <a:r>
+              <a:rPr lang="pt-BR" sz="1600" dirty="0" smtClean="0"/>
+              <a:t>Também é possível “pendurar” códigos que não deveriam estar alocados nos nossos modelos, mas que necessitam serem executados no caso de uma alteração ou atualização do mesmo.</a:t>
+            </a:r>
+          </a:p>
+          <a:p>
+            <a:endParaRPr lang="pt-BR" sz="1600" dirty="0"/>
+          </a:p>
+          <a:p>
+            <a:r>
+              <a:rPr lang="pt-BR" sz="1600" dirty="0" smtClean="0"/>
+              <a:t>...</a:t>
+            </a:r>
+          </a:p>
+          <a:p>
+            <a:r>
+              <a:rPr lang="en-US" dirty="0"/>
+              <a:t>let </a:t>
+            </a:r>
+            <a:r>
+              <a:rPr lang="en-US" dirty="0" err="1"/>
+              <a:t>lista</a:t>
+            </a:r>
+            <a:r>
+              <a:rPr lang="en-US" dirty="0"/>
+              <a:t> = new Proxy(new </a:t>
+            </a:r>
+            <a:r>
+              <a:rPr lang="en-US" dirty="0" err="1"/>
+              <a:t>ListaNegociacoes</a:t>
+            </a:r>
+            <a:r>
+              <a:rPr lang="en-US" dirty="0"/>
+              <a:t>(),{</a:t>
+            </a:r>
+          </a:p>
+          <a:p>
+            <a:r>
+              <a:rPr lang="en-US" dirty="0"/>
+              <a:t>get: function(target, prop, receiver){</a:t>
+            </a:r>
+          </a:p>
+          <a:p>
+            <a:r>
+              <a:rPr lang="pt-BR" sz="1600" dirty="0" smtClean="0"/>
+              <a:t>.....</a:t>
+            </a:r>
+          </a:p>
+          <a:p>
+            <a:pPr algn="l"/>
+            <a:endParaRPr lang="pt-BR" sz="1600" dirty="0" smtClean="0">
+              <a:solidFill>
+                <a:srgbClr val="6E757A"/>
+              </a:solidFill>
+              <a:latin typeface="Source Serif Pro"/>
+            </a:endParaRPr>
+          </a:p>
+          <a:p>
+            <a:pPr algn="l"/>
+            <a:r>
+              <a:rPr lang="pt-BR" sz="1600" dirty="0" smtClean="0">
+                <a:solidFill>
+                  <a:srgbClr val="6E757A"/>
+                </a:solidFill>
+                <a:latin typeface="Source Serif Pro"/>
+              </a:rPr>
+              <a:t>O</a:t>
+            </a:r>
+            <a:r>
+              <a:rPr lang="pt-BR" sz="1600" dirty="0">
+                <a:solidFill>
+                  <a:srgbClr val="6E757A"/>
+                </a:solidFill>
+                <a:latin typeface="Source Serif Pro"/>
+              </a:rPr>
+              <a:t> </a:t>
+            </a:r>
+            <a:r>
+              <a:rPr lang="pt-BR" sz="1600" b="1" i="1" dirty="0" err="1">
+                <a:solidFill>
+                  <a:srgbClr val="6E757A"/>
+                </a:solidFill>
+                <a:latin typeface="Source Serif Pro"/>
+              </a:rPr>
+              <a:t>target</a:t>
+            </a:r>
+            <a:r>
+              <a:rPr lang="pt-BR" sz="1600" dirty="0">
+                <a:solidFill>
+                  <a:srgbClr val="6E757A"/>
+                </a:solidFill>
+                <a:latin typeface="Source Serif Pro"/>
+              </a:rPr>
+              <a:t> é o objeto real que é encapsulado pela proxy. É este objeto que não queremos "sujar" com armadilhas ou qualquer código que não diga respeito ao modelo.</a:t>
+            </a:r>
+          </a:p>
+          <a:p>
+            <a:pPr algn="l"/>
+            <a:r>
+              <a:rPr lang="pt-BR" sz="1600" dirty="0">
+                <a:solidFill>
+                  <a:srgbClr val="6E757A"/>
+                </a:solidFill>
+                <a:latin typeface="Source Serif Pro"/>
+              </a:rPr>
+              <a:t>O </a:t>
+            </a:r>
+            <a:r>
+              <a:rPr lang="pt-BR" sz="1600" b="1" i="1" dirty="0" err="1">
+                <a:solidFill>
+                  <a:srgbClr val="6E757A"/>
+                </a:solidFill>
+                <a:latin typeface="Source Serif Pro"/>
+              </a:rPr>
+              <a:t>prop</a:t>
+            </a:r>
+            <a:r>
+              <a:rPr lang="pt-BR" sz="1600" dirty="0">
+                <a:solidFill>
+                  <a:srgbClr val="6E757A"/>
+                </a:solidFill>
+                <a:latin typeface="Source Serif Pro"/>
+              </a:rPr>
+              <a:t> é a propriedade em si, que está sendo lida naquele momento.</a:t>
+            </a:r>
+          </a:p>
+          <a:p>
+            <a:pPr algn="l"/>
+            <a:r>
+              <a:rPr lang="pt-BR" sz="1600" dirty="0">
+                <a:solidFill>
+                  <a:srgbClr val="6E757A"/>
+                </a:solidFill>
+                <a:latin typeface="Source Serif Pro"/>
+              </a:rPr>
+              <a:t>O </a:t>
+            </a:r>
+            <a:r>
+              <a:rPr lang="pt-BR" sz="1600" b="1" i="1" dirty="0" err="1">
+                <a:solidFill>
+                  <a:srgbClr val="6E757A"/>
+                </a:solidFill>
+                <a:latin typeface="Source Serif Pro"/>
+              </a:rPr>
+              <a:t>receiver</a:t>
+            </a:r>
+            <a:r>
+              <a:rPr lang="pt-BR" sz="1600" dirty="0">
+                <a:solidFill>
+                  <a:srgbClr val="6E757A"/>
+                </a:solidFill>
+                <a:latin typeface="Source Serif Pro"/>
+              </a:rPr>
+              <a:t> é a referência ao próprio proxy. É na configuração do </a:t>
+            </a:r>
+            <a:r>
+              <a:rPr lang="pt-BR" sz="1600" dirty="0" err="1">
+                <a:solidFill>
+                  <a:srgbClr val="6E757A"/>
+                </a:solidFill>
+                <a:latin typeface="Source Serif Pro"/>
+              </a:rPr>
+              <a:t>handler</a:t>
+            </a:r>
+            <a:r>
+              <a:rPr lang="pt-BR" sz="1600" dirty="0">
+                <a:solidFill>
+                  <a:srgbClr val="6E757A"/>
+                </a:solidFill>
+                <a:latin typeface="Source Serif Pro"/>
+              </a:rPr>
+              <a:t> do Proxy que colocamos armadilhas.</a:t>
+            </a:r>
+          </a:p>
           <a:p>
             <a:endParaRPr lang="pt-BR" sz="1600" dirty="0"/>
           </a:p>

</xml_diff>

<commit_message>
Final exemplos com ProxuFactory
</commit_message>
<xml_diff>
--- a/docs/JS Avançado 1-2-3-resumo.pptx
+++ b/docs/JS Avançado 1-2-3-resumo.pptx
@@ -9,7 +9,10 @@
     <p:sldId id="257" r:id="rId3"/>
     <p:sldId id="260" r:id="rId4"/>
     <p:sldId id="258" r:id="rId5"/>
-    <p:sldId id="259" r:id="rId6"/>
+    <p:sldId id="264" r:id="rId6"/>
+    <p:sldId id="259" r:id="rId7"/>
+    <p:sldId id="261" r:id="rId8"/>
+    <p:sldId id="265" r:id="rId9"/>
   </p:sldIdLst>
   <p:sldSz cx="12192000" cy="6858000"/>
   <p:notesSz cx="6858000" cy="9144000"/>
@@ -245,7 +248,7 @@
           <a:p>
             <a:fld id="{CC58B075-67F8-4A8D-AE1C-3D3E4193EBCA}" type="datetimeFigureOut">
               <a:rPr lang="pt-BR" smtClean="0"/>
-              <a:t>15/03/2019</a:t>
+              <a:t>10/04/19</a:t>
             </a:fld>
             <a:endParaRPr lang="pt-BR"/>
           </a:p>
@@ -413,7 +416,7 @@
           <a:p>
             <a:fld id="{CC58B075-67F8-4A8D-AE1C-3D3E4193EBCA}" type="datetimeFigureOut">
               <a:rPr lang="pt-BR" smtClean="0"/>
-              <a:t>15/03/2019</a:t>
+              <a:t>10/04/19</a:t>
             </a:fld>
             <a:endParaRPr lang="pt-BR"/>
           </a:p>
@@ -591,7 +594,7 @@
           <a:p>
             <a:fld id="{CC58B075-67F8-4A8D-AE1C-3D3E4193EBCA}" type="datetimeFigureOut">
               <a:rPr lang="pt-BR" smtClean="0"/>
-              <a:t>15/03/2019</a:t>
+              <a:t>10/04/19</a:t>
             </a:fld>
             <a:endParaRPr lang="pt-BR"/>
           </a:p>
@@ -759,7 +762,7 @@
           <a:p>
             <a:fld id="{CC58B075-67F8-4A8D-AE1C-3D3E4193EBCA}" type="datetimeFigureOut">
               <a:rPr lang="pt-BR" smtClean="0"/>
-              <a:t>15/03/2019</a:t>
+              <a:t>10/04/19</a:t>
             </a:fld>
             <a:endParaRPr lang="pt-BR"/>
           </a:p>
@@ -1004,7 +1007,7 @@
           <a:p>
             <a:fld id="{CC58B075-67F8-4A8D-AE1C-3D3E4193EBCA}" type="datetimeFigureOut">
               <a:rPr lang="pt-BR" smtClean="0"/>
-              <a:t>15/03/2019</a:t>
+              <a:t>10/04/19</a:t>
             </a:fld>
             <a:endParaRPr lang="pt-BR"/>
           </a:p>
@@ -1233,7 +1236,7 @@
           <a:p>
             <a:fld id="{CC58B075-67F8-4A8D-AE1C-3D3E4193EBCA}" type="datetimeFigureOut">
               <a:rPr lang="pt-BR" smtClean="0"/>
-              <a:t>15/03/2019</a:t>
+              <a:t>10/04/19</a:t>
             </a:fld>
             <a:endParaRPr lang="pt-BR"/>
           </a:p>
@@ -1597,7 +1600,7 @@
           <a:p>
             <a:fld id="{CC58B075-67F8-4A8D-AE1C-3D3E4193EBCA}" type="datetimeFigureOut">
               <a:rPr lang="pt-BR" smtClean="0"/>
-              <a:t>15/03/2019</a:t>
+              <a:t>10/04/19</a:t>
             </a:fld>
             <a:endParaRPr lang="pt-BR"/>
           </a:p>
@@ -1714,7 +1717,7 @@
           <a:p>
             <a:fld id="{CC58B075-67F8-4A8D-AE1C-3D3E4193EBCA}" type="datetimeFigureOut">
               <a:rPr lang="pt-BR" smtClean="0"/>
-              <a:t>15/03/2019</a:t>
+              <a:t>10/04/19</a:t>
             </a:fld>
             <a:endParaRPr lang="pt-BR"/>
           </a:p>
@@ -1809,7 +1812,7 @@
           <a:p>
             <a:fld id="{CC58B075-67F8-4A8D-AE1C-3D3E4193EBCA}" type="datetimeFigureOut">
               <a:rPr lang="pt-BR" smtClean="0"/>
-              <a:t>15/03/2019</a:t>
+              <a:t>10/04/19</a:t>
             </a:fld>
             <a:endParaRPr lang="pt-BR"/>
           </a:p>
@@ -2084,7 +2087,7 @@
           <a:p>
             <a:fld id="{CC58B075-67F8-4A8D-AE1C-3D3E4193EBCA}" type="datetimeFigureOut">
               <a:rPr lang="pt-BR" smtClean="0"/>
-              <a:t>15/03/2019</a:t>
+              <a:t>10/04/19</a:t>
             </a:fld>
             <a:endParaRPr lang="pt-BR"/>
           </a:p>
@@ -2336,7 +2339,7 @@
           <a:p>
             <a:fld id="{CC58B075-67F8-4A8D-AE1C-3D3E4193EBCA}" type="datetimeFigureOut">
               <a:rPr lang="pt-BR" smtClean="0"/>
-              <a:t>15/03/2019</a:t>
+              <a:t>10/04/19</a:t>
             </a:fld>
             <a:endParaRPr lang="pt-BR"/>
           </a:p>
@@ -2547,7 +2550,7 @@
           <a:p>
             <a:fld id="{CC58B075-67F8-4A8D-AE1C-3D3E4193EBCA}" type="datetimeFigureOut">
               <a:rPr lang="pt-BR" smtClean="0"/>
-              <a:t>15/03/2019</a:t>
+              <a:t>10/04/19</a:t>
             </a:fld>
             <a:endParaRPr lang="pt-BR"/>
           </a:p>
@@ -3415,156 +3418,6 @@
             </a:r>
           </a:p>
           <a:p>
-            <a:r>
-              <a:rPr lang="pt-BR" sz="1600" dirty="0"/>
-              <a:t>Mas a solução fracassou, porque a </a:t>
-            </a:r>
-            <a:r>
-              <a:rPr lang="pt-BR" sz="1600" dirty="0" err="1"/>
-              <a:t>function</a:t>
-            </a:r>
-            <a:r>
-              <a:rPr lang="pt-BR" sz="1600" dirty="0"/>
-              <a:t>() era enviada para o construtor do modelo que é a armadilha. Quando isso acontecia, o </a:t>
-            </a:r>
-            <a:r>
-              <a:rPr lang="pt-BR" sz="1600" dirty="0" err="1"/>
-              <a:t>this</a:t>
-            </a:r>
-            <a:r>
-              <a:rPr lang="pt-BR" sz="1600" dirty="0"/>
-              <a:t> era dinâmico, ou seja, não pertencia a controller, e sim, ao model. Então, tentamos acessar no </a:t>
-            </a:r>
-            <a:r>
-              <a:rPr lang="pt-BR" sz="1600" dirty="0" err="1"/>
-              <a:t>this</a:t>
-            </a:r>
-            <a:r>
-              <a:rPr lang="pt-BR" sz="1600" dirty="0"/>
-              <a:t> a nossa View. Vimos como fazer isto por meio da API de reflexão do </a:t>
-            </a:r>
-            <a:r>
-              <a:rPr lang="pt-BR" sz="1600" dirty="0" err="1"/>
-              <a:t>JavaScript</a:t>
-            </a:r>
-            <a:r>
-              <a:rPr lang="pt-BR" sz="1600" dirty="0"/>
-              <a:t>, </a:t>
-            </a:r>
-            <a:r>
-              <a:rPr lang="pt-BR" sz="1600" b="1" dirty="0" err="1"/>
-              <a:t>Reflection</a:t>
-            </a:r>
-            <a:r>
-              <a:rPr lang="pt-BR" sz="1600" b="1" dirty="0"/>
-              <a:t> API</a:t>
-            </a:r>
-            <a:r>
-              <a:rPr lang="pt-BR" sz="1600" dirty="0"/>
-              <a:t>, usando </a:t>
-            </a:r>
-            <a:r>
-              <a:rPr lang="pt-BR" sz="1600" dirty="0" err="1"/>
-              <a:t>reflect.apply</a:t>
-            </a:r>
-            <a:r>
-              <a:rPr lang="pt-BR" sz="1600" dirty="0"/>
-              <a:t>(). Ela recebe o nome do método, o contexto em que queremos executar o método, além dos parâmetros que serão passados para o método para corrigir o </a:t>
-            </a:r>
-            <a:r>
-              <a:rPr lang="pt-BR" sz="1600" dirty="0" err="1"/>
-              <a:t>this</a:t>
-            </a:r>
-            <a:r>
-              <a:rPr lang="pt-BR" sz="1600" dirty="0"/>
-              <a:t> no momento da execução da função. Mas vimos que este processo não era necessário. Em vez disso, usamos uma </a:t>
-            </a:r>
-            <a:r>
-              <a:rPr lang="pt-BR" sz="1600" i="1" dirty="0" err="1"/>
-              <a:t>arrow</a:t>
-            </a:r>
-            <a:r>
-              <a:rPr lang="pt-BR" sz="1600" i="1" dirty="0"/>
-              <a:t> </a:t>
-            </a:r>
-            <a:r>
-              <a:rPr lang="pt-BR" sz="1600" i="1" dirty="0" err="1"/>
-              <a:t>function</a:t>
-            </a:r>
-            <a:r>
-              <a:rPr lang="pt-BR" sz="1600" dirty="0"/>
-              <a:t>.</a:t>
-            </a:r>
-          </a:p>
-          <a:p>
-            <a:r>
-              <a:rPr lang="pt-BR" sz="1600" dirty="0"/>
-              <a:t>As </a:t>
-            </a:r>
-            <a:r>
-              <a:rPr lang="pt-BR" sz="1600" i="1" dirty="0" err="1"/>
-              <a:t>arrow</a:t>
-            </a:r>
-            <a:r>
-              <a:rPr lang="pt-BR" sz="1600" i="1" dirty="0"/>
-              <a:t> </a:t>
-            </a:r>
-            <a:r>
-              <a:rPr lang="pt-BR" sz="1600" i="1" dirty="0" err="1"/>
-              <a:t>functions</a:t>
-            </a:r>
-            <a:r>
-              <a:rPr lang="pt-BR" sz="1600" dirty="0"/>
-              <a:t> possuem um escopo léxico, enquanto as funções padrões têm um escopo dinâmico. Isto significa que, se temos uma função em </a:t>
-            </a:r>
-            <a:r>
-              <a:rPr lang="pt-BR" sz="1600" dirty="0" err="1"/>
-              <a:t>JavaScript</a:t>
-            </a:r>
-            <a:r>
-              <a:rPr lang="pt-BR" sz="1600" dirty="0"/>
-              <a:t> que varia de acordo com o contexto no qual é chamada, o </a:t>
-            </a:r>
-            <a:r>
-              <a:rPr lang="pt-BR" sz="1600" dirty="0" err="1"/>
-              <a:t>this</a:t>
-            </a:r>
-            <a:r>
-              <a:rPr lang="pt-BR" sz="1600" dirty="0"/>
-              <a:t> léxico de uma </a:t>
-            </a:r>
-            <a:r>
-              <a:rPr lang="pt-BR" sz="1600" i="1" dirty="0" err="1"/>
-              <a:t>arrow</a:t>
-            </a:r>
-            <a:r>
-              <a:rPr lang="pt-BR" sz="1600" i="1" dirty="0"/>
-              <a:t> </a:t>
-            </a:r>
-            <a:r>
-              <a:rPr lang="pt-BR" sz="1600" i="1" dirty="0" err="1"/>
-              <a:t>function</a:t>
-            </a:r>
-            <a:r>
-              <a:rPr lang="pt-BR" sz="1600" dirty="0"/>
-              <a:t> manterá o mesmo </a:t>
-            </a:r>
-            <a:r>
-              <a:rPr lang="pt-BR" sz="1600" dirty="0" err="1"/>
-              <a:t>this</a:t>
-            </a:r>
-            <a:r>
-              <a:rPr lang="pt-BR" sz="1600" dirty="0"/>
-              <a:t> em todas as chamadas da função. Isso torna o código mais enxuto, porque não precisarmos passar o contexto do construtor do modelo.</a:t>
-            </a:r>
-          </a:p>
-          <a:p>
-            <a:r>
-              <a:rPr lang="pt-BR" sz="1600" dirty="0"/>
-              <a:t>Nos exercícios, você terá a chance de praticar o conteúdo trabalhado, mas vale ressaltar que poluir o modelo com esse código de infraestrutura não é uma boa ideia. Atacaremos tal questão na próxima seção do curso, e descobriremos como disparar atualizações na View sem colocar "armadilhas". No entanto, os conceitos abordados aqui já devem estar bem consolidados. Vamos praticar!</a:t>
-            </a:r>
-          </a:p>
-          <a:p>
             <a:endParaRPr lang="pt-BR" sz="1600" dirty="0"/>
           </a:p>
         </p:txBody>
@@ -3601,6 +3454,212 @@
       </p:grpSpPr>
       <p:sp>
         <p:nvSpPr>
+          <p:cNvPr id="3" name="Subtítulo 2"/>
+          <p:cNvSpPr>
+            <a:spLocks noGrp="1"/>
+          </p:cNvSpPr>
+          <p:nvPr>
+            <p:ph type="subTitle" idx="1"/>
+          </p:nvPr>
+        </p:nvSpPr>
+        <p:spPr>
+          <a:xfrm>
+            <a:off x="293564" y="488161"/>
+            <a:ext cx="11371568" cy="6108582"/>
+          </a:xfrm>
+        </p:spPr>
+        <p:txBody>
+          <a:bodyPr>
+            <a:noAutofit/>
+          </a:bodyPr>
+          <a:lstStyle/>
+          <a:p>
+            <a:r>
+              <a:rPr lang="pt-BR" sz="1600" dirty="0"/>
+              <a:t>Mas a solução fracassou, porque a </a:t>
+            </a:r>
+            <a:r>
+              <a:rPr lang="pt-BR" sz="1600" dirty="0" err="1"/>
+              <a:t>function</a:t>
+            </a:r>
+            <a:r>
+              <a:rPr lang="pt-BR" sz="1600" dirty="0"/>
+              <a:t>() era enviada para o construtor do modelo que é a armadilha. Quando isso acontecia, o </a:t>
+            </a:r>
+            <a:r>
+              <a:rPr lang="pt-BR" sz="1600" dirty="0" err="1"/>
+              <a:t>this</a:t>
+            </a:r>
+            <a:r>
+              <a:rPr lang="pt-BR" sz="1600" dirty="0"/>
+              <a:t> era dinâmico, ou seja, não pertencia a controller, e sim, ao model. Então, tentamos acessar no </a:t>
+            </a:r>
+            <a:r>
+              <a:rPr lang="pt-BR" sz="1600" dirty="0" err="1"/>
+              <a:t>this</a:t>
+            </a:r>
+            <a:r>
+              <a:rPr lang="pt-BR" sz="1600" dirty="0"/>
+              <a:t> a nossa View. Vimos como fazer isto por meio da API de reflexão do </a:t>
+            </a:r>
+            <a:r>
+              <a:rPr lang="pt-BR" sz="1600" dirty="0" err="1"/>
+              <a:t>JavaScript</a:t>
+            </a:r>
+            <a:r>
+              <a:rPr lang="pt-BR" sz="1600" dirty="0"/>
+              <a:t>, </a:t>
+            </a:r>
+            <a:r>
+              <a:rPr lang="pt-BR" sz="1600" b="1" dirty="0" err="1"/>
+              <a:t>Reflection</a:t>
+            </a:r>
+            <a:r>
+              <a:rPr lang="pt-BR" sz="1600" b="1" dirty="0"/>
+              <a:t> API</a:t>
+            </a:r>
+            <a:r>
+              <a:rPr lang="pt-BR" sz="1600" dirty="0"/>
+              <a:t>, usando </a:t>
+            </a:r>
+            <a:r>
+              <a:rPr lang="pt-BR" sz="1600" dirty="0" err="1"/>
+              <a:t>reflect.apply</a:t>
+            </a:r>
+            <a:r>
+              <a:rPr lang="pt-BR" sz="1600" dirty="0"/>
+              <a:t>(). Ela recebe o nome do método, o contexto em que queremos executar o método, além dos parâmetros que serão passados para o método para corrigir o </a:t>
+            </a:r>
+            <a:r>
+              <a:rPr lang="pt-BR" sz="1600" dirty="0" err="1"/>
+              <a:t>this</a:t>
+            </a:r>
+            <a:r>
+              <a:rPr lang="pt-BR" sz="1600" dirty="0"/>
+              <a:t> no momento da execução da função. Mas vimos que este processo não era necessário. Em vez disso, usamos uma </a:t>
+            </a:r>
+            <a:r>
+              <a:rPr lang="pt-BR" sz="1600" i="1" dirty="0" err="1"/>
+              <a:t>arrow</a:t>
+            </a:r>
+            <a:r>
+              <a:rPr lang="pt-BR" sz="1600" i="1" dirty="0"/>
+              <a:t> </a:t>
+            </a:r>
+            <a:r>
+              <a:rPr lang="pt-BR" sz="1600" i="1" dirty="0" err="1"/>
+              <a:t>function</a:t>
+            </a:r>
+            <a:r>
+              <a:rPr lang="pt-BR" sz="1600" dirty="0"/>
+              <a:t>.</a:t>
+            </a:r>
+          </a:p>
+          <a:p>
+            <a:r>
+              <a:rPr lang="pt-BR" sz="1600" dirty="0"/>
+              <a:t>As </a:t>
+            </a:r>
+            <a:r>
+              <a:rPr lang="pt-BR" sz="1600" i="1" dirty="0" err="1"/>
+              <a:t>arrow</a:t>
+            </a:r>
+            <a:r>
+              <a:rPr lang="pt-BR" sz="1600" i="1" dirty="0"/>
+              <a:t> </a:t>
+            </a:r>
+            <a:r>
+              <a:rPr lang="pt-BR" sz="1600" i="1" dirty="0" err="1"/>
+              <a:t>functions</a:t>
+            </a:r>
+            <a:r>
+              <a:rPr lang="pt-BR" sz="1600" dirty="0"/>
+              <a:t> possuem um escopo léxico, enquanto as funções padrões têm um escopo dinâmico. Isto significa que, se temos uma função em </a:t>
+            </a:r>
+            <a:r>
+              <a:rPr lang="pt-BR" sz="1600" dirty="0" err="1"/>
+              <a:t>JavaScript</a:t>
+            </a:r>
+            <a:r>
+              <a:rPr lang="pt-BR" sz="1600" dirty="0"/>
+              <a:t> que varia de acordo com o contexto no qual é chamada, o </a:t>
+            </a:r>
+            <a:r>
+              <a:rPr lang="pt-BR" sz="1600" dirty="0" err="1"/>
+              <a:t>this</a:t>
+            </a:r>
+            <a:r>
+              <a:rPr lang="pt-BR" sz="1600" dirty="0"/>
+              <a:t> léxico de uma </a:t>
+            </a:r>
+            <a:r>
+              <a:rPr lang="pt-BR" sz="1600" i="1" dirty="0" err="1"/>
+              <a:t>arrow</a:t>
+            </a:r>
+            <a:r>
+              <a:rPr lang="pt-BR" sz="1600" i="1" dirty="0"/>
+              <a:t> </a:t>
+            </a:r>
+            <a:r>
+              <a:rPr lang="pt-BR" sz="1600" i="1" dirty="0" err="1"/>
+              <a:t>function</a:t>
+            </a:r>
+            <a:r>
+              <a:rPr lang="pt-BR" sz="1600" dirty="0"/>
+              <a:t> manterá o mesmo </a:t>
+            </a:r>
+            <a:r>
+              <a:rPr lang="pt-BR" sz="1600" dirty="0" err="1"/>
+              <a:t>this</a:t>
+            </a:r>
+            <a:r>
+              <a:rPr lang="pt-BR" sz="1600" dirty="0"/>
+              <a:t> em todas as chamadas da função. Isso torna o código mais enxuto, porque não precisarmos passar o contexto do construtor do modelo.</a:t>
+            </a:r>
+          </a:p>
+          <a:p>
+            <a:r>
+              <a:rPr lang="pt-BR" sz="1600" dirty="0"/>
+              <a:t>Nos exercícios, você terá a chance de praticar o conteúdo trabalhado, mas vale ressaltar que poluir o modelo com esse código de infraestrutura não é uma boa ideia. Atacaremos tal questão na próxima seção do curso, e descobriremos como disparar atualizações na View sem colocar "armadilhas". No entanto, os conceitos abordados aqui já devem estar bem consolidados. Vamos praticar!</a:t>
+            </a:r>
+          </a:p>
+          <a:p>
+            <a:endParaRPr lang="pt-BR" sz="1600" dirty="0"/>
+          </a:p>
+        </p:txBody>
+      </p:sp>
+    </p:spTree>
+    <p:extLst>
+      <p:ext uri="{BB962C8B-B14F-4D97-AF65-F5344CB8AC3E}">
+        <p14:creationId xmlns:p14="http://schemas.microsoft.com/office/powerpoint/2010/main" val="4036594404"/>
+      </p:ext>
+    </p:extLst>
+  </p:cSld>
+  <p:clrMapOvr>
+    <a:masterClrMapping/>
+  </p:clrMapOvr>
+</p:sld>
+</file>
+
+<file path=ppt/slides/slide6.xml><?xml version="1.0" encoding="utf-8"?>
+<p:sld xmlns:a="http://schemas.openxmlformats.org/drawingml/2006/main" xmlns:r="http://schemas.openxmlformats.org/officeDocument/2006/relationships" xmlns:p="http://schemas.openxmlformats.org/presentationml/2006/main">
+  <p:cSld>
+    <p:spTree>
+      <p:nvGrpSpPr>
+        <p:cNvPr id="1" name=""/>
+        <p:cNvGrpSpPr/>
+        <p:nvPr/>
+      </p:nvGrpSpPr>
+      <p:grpSpPr>
+        <a:xfrm>
+          <a:off x="0" y="0"/>
+          <a:ext cx="0" cy="0"/>
+          <a:chOff x="0" y="0"/>
+          <a:chExt cx="0" cy="0"/>
+        </a:xfrm>
+      </p:grpSpPr>
+      <p:sp>
+        <p:nvSpPr>
           <p:cNvPr id="2" name="Título 1"/>
           <p:cNvSpPr>
             <a:spLocks noGrp="1"/>
@@ -3622,10 +3681,9 @@
           <a:lstStyle/>
           <a:p>
             <a:r>
-              <a:rPr lang="pt-BR" sz="2800" dirty="0" smtClean="0"/>
+              <a:rPr lang="pt-BR" sz="2800" dirty="0"/>
               <a:t>Padrão Proxy</a:t>
             </a:r>
-            <a:endParaRPr lang="pt-BR" sz="2800" dirty="0"/>
           </a:p>
         </p:txBody>
       </p:sp>
@@ -3652,24 +3710,19 @@
           <a:lstStyle/>
           <a:p>
             <a:r>
-              <a:rPr lang="pt-BR" sz="1600" dirty="0" smtClean="0"/>
-              <a:t>É um cara “mentiroso”, um objeto falso, que envolve e encapsula o objeto real que queremos interagir. Podemos pensar como uma “casca” que envolve </a:t>
-            </a:r>
-            <a:r>
-              <a:rPr lang="pt-BR" sz="1600" smtClean="0"/>
-              <a:t>os objetos.</a:t>
-            </a:r>
-            <a:endParaRPr lang="pt-BR" sz="1600" dirty="0" smtClean="0"/>
-          </a:p>
-          <a:p>
-            <a:r>
-              <a:rPr lang="pt-BR" sz="1600" dirty="0" smtClean="0"/>
+              <a:rPr lang="pt-BR" sz="1600" dirty="0"/>
+              <a:t>É um cara “mentiroso”, um objeto falso, que envolve e encapsula o objeto real que queremos interagir. Podemos pensar como uma “casca” que envolve os objetos.</a:t>
+            </a:r>
+          </a:p>
+          <a:p>
+            <a:r>
+              <a:rPr lang="pt-BR" sz="1600" dirty="0"/>
               <a:t>É como se fosse uma interface, entre o objeto real e o resto do código. Assim você consegue controlar os métodos e atributos.</a:t>
             </a:r>
           </a:p>
           <a:p>
             <a:r>
-              <a:rPr lang="pt-BR" sz="1600" dirty="0" smtClean="0"/>
+              <a:rPr lang="pt-BR" sz="1600" dirty="0"/>
               <a:t>Também é possível “pendurar” códigos que não deveriam estar alocados nos nossos modelos, mas que necessitam serem executados no caso de uma alteração ou atualização do mesmo.</a:t>
             </a:r>
           </a:p>
@@ -3678,7 +3731,7 @@
           </a:p>
           <a:p>
             <a:r>
-              <a:rPr lang="pt-BR" sz="1600" dirty="0" smtClean="0"/>
+              <a:rPr lang="pt-BR" sz="1600" dirty="0"/>
               <a:t>...</a:t>
             </a:r>
           </a:p>
@@ -3712,13 +3765,13 @@
           </a:p>
           <a:p>
             <a:r>
-              <a:rPr lang="pt-BR" sz="1600" dirty="0" smtClean="0"/>
+              <a:rPr lang="pt-BR" sz="1600" dirty="0"/>
               <a:t>.....</a:t>
             </a:r>
           </a:p>
           <a:p>
             <a:pPr algn="l"/>
-            <a:endParaRPr lang="pt-BR" sz="1600" dirty="0" smtClean="0">
+            <a:endParaRPr lang="pt-BR" sz="1600" dirty="0">
               <a:solidFill>
                 <a:srgbClr val="6E757A"/>
               </a:solidFill>
@@ -3727,15 +3780,6 @@
           </a:p>
           <a:p>
             <a:pPr algn="l"/>
-            <a:r>
-              <a:rPr lang="pt-BR" sz="1600" dirty="0" smtClean="0">
-                <a:solidFill>
-                  <a:srgbClr val="6E757A"/>
-                </a:solidFill>
-                <a:latin typeface="Source Serif Pro"/>
-              </a:rPr>
-              <a:t>O</a:t>
-            </a:r>
             <a:r>
               <a:rPr lang="pt-BR" sz="1600" dirty="0">
                 <a:solidFill>
@@ -3743,7 +3787,7 @@
                 </a:solidFill>
                 <a:latin typeface="Source Serif Pro"/>
               </a:rPr>
-              <a:t> </a:t>
+              <a:t>O </a:t>
             </a:r>
             <a:r>
               <a:rPr lang="pt-BR" sz="1600" b="1" i="1" dirty="0" err="1">
@@ -3851,6 +3895,461 @@
     <p:extLst>
       <p:ext uri="{BB962C8B-B14F-4D97-AF65-F5344CB8AC3E}">
         <p14:creationId xmlns:p14="http://schemas.microsoft.com/office/powerpoint/2010/main" val="757018139"/>
+      </p:ext>
+    </p:extLst>
+  </p:cSld>
+  <p:clrMapOvr>
+    <a:masterClrMapping/>
+  </p:clrMapOvr>
+</p:sld>
+</file>
+
+<file path=ppt/slides/slide7.xml><?xml version="1.0" encoding="utf-8"?>
+<p:sld xmlns:a="http://schemas.openxmlformats.org/drawingml/2006/main" xmlns:r="http://schemas.openxmlformats.org/officeDocument/2006/relationships" xmlns:p="http://schemas.openxmlformats.org/presentationml/2006/main">
+  <p:cSld>
+    <p:spTree>
+      <p:nvGrpSpPr>
+        <p:cNvPr id="1" name=""/>
+        <p:cNvGrpSpPr/>
+        <p:nvPr/>
+      </p:nvGrpSpPr>
+      <p:grpSpPr>
+        <a:xfrm>
+          <a:off x="0" y="0"/>
+          <a:ext cx="0" cy="0"/>
+          <a:chOff x="0" y="0"/>
+          <a:chExt cx="0" cy="0"/>
+        </a:xfrm>
+      </p:grpSpPr>
+      <p:sp>
+        <p:nvSpPr>
+          <p:cNvPr id="2" name="Título 1"/>
+          <p:cNvSpPr>
+            <a:spLocks noGrp="1"/>
+          </p:cNvSpPr>
+          <p:nvPr>
+            <p:ph type="ctrTitle"/>
+          </p:nvPr>
+        </p:nvSpPr>
+        <p:spPr>
+          <a:xfrm>
+            <a:off x="853657" y="134559"/>
+            <a:ext cx="9144000" cy="529322"/>
+          </a:xfrm>
+        </p:spPr>
+        <p:txBody>
+          <a:bodyPr>
+            <a:normAutofit/>
+          </a:bodyPr>
+          <a:lstStyle/>
+          <a:p>
+            <a:r>
+              <a:rPr lang="pt-BR" sz="2800" dirty="0"/>
+              <a:t>Operador REST</a:t>
+            </a:r>
+          </a:p>
+        </p:txBody>
+      </p:sp>
+      <p:sp>
+        <p:nvSpPr>
+          <p:cNvPr id="3" name="Subtítulo 2"/>
+          <p:cNvSpPr>
+            <a:spLocks noGrp="1"/>
+          </p:cNvSpPr>
+          <p:nvPr>
+            <p:ph type="subTitle" idx="1"/>
+          </p:nvPr>
+        </p:nvSpPr>
+        <p:spPr>
+          <a:xfrm>
+            <a:off x="515454" y="663880"/>
+            <a:ext cx="11259012" cy="5599133"/>
+          </a:xfrm>
+        </p:spPr>
+        <p:txBody>
+          <a:bodyPr>
+            <a:normAutofit fontScale="92500" lnSpcReduction="10000"/>
+          </a:bodyPr>
+          <a:lstStyle/>
+          <a:p>
+            <a:r>
+              <a:rPr lang="pt-BR" b="1" dirty="0"/>
+              <a:t>REST</a:t>
+            </a:r>
+            <a:r>
+              <a:rPr lang="pt-BR" dirty="0"/>
+              <a:t>, temos que o correto é utilizarmos "..." antes do </a:t>
+            </a:r>
+            <a:r>
+              <a:rPr lang="pt-BR" b="1" dirty="0"/>
+              <a:t>último</a:t>
+            </a:r>
+            <a:r>
+              <a:rPr lang="pt-BR" dirty="0"/>
+              <a:t> parâmetro, e assim tudo que nós passarmos de "extra" será colocado dentro de um </a:t>
+            </a:r>
+            <a:r>
+              <a:rPr lang="pt-BR" dirty="0" err="1"/>
+              <a:t>array</a:t>
+            </a:r>
+            <a:r>
+              <a:rPr lang="pt-BR" dirty="0"/>
+              <a:t>, no nosso caso, itens:</a:t>
+            </a:r>
+          </a:p>
+          <a:p>
+            <a:endParaRPr lang="pt-BR" dirty="0"/>
+          </a:p>
+          <a:p>
+            <a:pPr algn="l"/>
+            <a:r>
+              <a:rPr lang="pt-BR" sz="1900" i="1" dirty="0" err="1">
+                <a:solidFill>
+                  <a:schemeClr val="accent5"/>
+                </a:solidFill>
+              </a:rPr>
+              <a:t>constructor</a:t>
+            </a:r>
+            <a:r>
+              <a:rPr lang="pt-BR" sz="1900" i="1" dirty="0">
+                <a:solidFill>
+                  <a:schemeClr val="accent5"/>
+                </a:solidFill>
+              </a:rPr>
+              <a:t>(tipo, ...itens) { </a:t>
+            </a:r>
+          </a:p>
+          <a:p>
+            <a:pPr algn="l"/>
+            <a:r>
+              <a:rPr lang="pt-BR" sz="1900" i="1" dirty="0">
+                <a:solidFill>
+                  <a:schemeClr val="accent5"/>
+                </a:solidFill>
+              </a:rPr>
+              <a:t>	//lógica </a:t>
+            </a:r>
+          </a:p>
+          <a:p>
+            <a:pPr algn="l"/>
+            <a:r>
+              <a:rPr lang="pt-BR" sz="1900" i="1" dirty="0">
+                <a:solidFill>
+                  <a:schemeClr val="accent5"/>
+                </a:solidFill>
+              </a:rPr>
+              <a:t>}</a:t>
+            </a:r>
+          </a:p>
+          <a:p>
+            <a:pPr algn="just"/>
+            <a:endParaRPr lang="pt-BR" dirty="0"/>
+          </a:p>
+          <a:p>
+            <a:pPr algn="just"/>
+            <a:r>
+              <a:rPr lang="pt-BR" dirty="0"/>
+              <a:t>E chamamos:</a:t>
+            </a:r>
+          </a:p>
+          <a:p>
+            <a:pPr algn="just"/>
+            <a:endParaRPr lang="pt-BR" dirty="0"/>
+          </a:p>
+          <a:p>
+            <a:pPr algn="l"/>
+            <a:r>
+              <a:rPr lang="pt-BR" sz="1900" i="1" dirty="0" err="1">
+                <a:solidFill>
+                  <a:schemeClr val="accent5"/>
+                </a:solidFill>
+              </a:rPr>
+              <a:t>let</a:t>
+            </a:r>
+            <a:r>
+              <a:rPr lang="pt-BR" sz="1900" i="1" dirty="0">
+                <a:solidFill>
+                  <a:schemeClr val="accent5"/>
+                </a:solidFill>
+              </a:rPr>
+              <a:t> cesta = new Cesta('fruta', 'banana', 'tomate', 'maçã’);</a:t>
+            </a:r>
+          </a:p>
+          <a:p>
+            <a:pPr algn="just"/>
+            <a:endParaRPr lang="pt-BR" dirty="0"/>
+          </a:p>
+          <a:p>
+            <a:pPr algn="just"/>
+            <a:r>
+              <a:rPr lang="pt-BR" dirty="0"/>
+              <a:t>No final, as variáveis no construtor ficarão:</a:t>
+            </a:r>
+          </a:p>
+          <a:p>
+            <a:pPr algn="just"/>
+            <a:endParaRPr lang="pt-BR" dirty="0"/>
+          </a:p>
+          <a:p>
+            <a:pPr marL="800100" lvl="1" indent="-342900" algn="just">
+              <a:buFont typeface="Arial" panose="020B0604020202020204" pitchFamily="34" charset="0"/>
+              <a:buChar char="•"/>
+            </a:pPr>
+            <a:r>
+              <a:rPr lang="pt-BR" dirty="0"/>
+              <a:t>tipo : 'fruta';</a:t>
+            </a:r>
+          </a:p>
+          <a:p>
+            <a:pPr marL="800100" lvl="1" indent="-342900" algn="just">
+              <a:buFont typeface="Arial" panose="020B0604020202020204" pitchFamily="34" charset="0"/>
+              <a:buChar char="•"/>
+            </a:pPr>
+            <a:r>
+              <a:rPr lang="pt-BR" dirty="0"/>
+              <a:t>itens : ['banana', 'tomate', 'maçã'].</a:t>
+            </a:r>
+          </a:p>
+          <a:p>
+            <a:endParaRPr lang="pt-BR" sz="1600" dirty="0"/>
+          </a:p>
+        </p:txBody>
+      </p:sp>
+    </p:spTree>
+    <p:extLst>
+      <p:ext uri="{BB962C8B-B14F-4D97-AF65-F5344CB8AC3E}">
+        <p14:creationId xmlns:p14="http://schemas.microsoft.com/office/powerpoint/2010/main" val="2516763126"/>
+      </p:ext>
+    </p:extLst>
+  </p:cSld>
+  <p:clrMapOvr>
+    <a:masterClrMapping/>
+  </p:clrMapOvr>
+</p:sld>
+</file>
+
+<file path=ppt/slides/slide8.xml><?xml version="1.0" encoding="utf-8"?>
+<p:sld xmlns:a="http://schemas.openxmlformats.org/drawingml/2006/main" xmlns:r="http://schemas.openxmlformats.org/officeDocument/2006/relationships" xmlns:p="http://schemas.openxmlformats.org/presentationml/2006/main">
+  <p:cSld>
+    <p:spTree>
+      <p:nvGrpSpPr>
+        <p:cNvPr id="1" name=""/>
+        <p:cNvGrpSpPr/>
+        <p:nvPr/>
+      </p:nvGrpSpPr>
+      <p:grpSpPr>
+        <a:xfrm>
+          <a:off x="0" y="0"/>
+          <a:ext cx="0" cy="0"/>
+          <a:chOff x="0" y="0"/>
+          <a:chExt cx="0" cy="0"/>
+        </a:xfrm>
+      </p:grpSpPr>
+      <p:sp>
+        <p:nvSpPr>
+          <p:cNvPr id="2" name="Título 1"/>
+          <p:cNvSpPr>
+            <a:spLocks noGrp="1"/>
+          </p:cNvSpPr>
+          <p:nvPr>
+            <p:ph type="ctrTitle"/>
+          </p:nvPr>
+        </p:nvSpPr>
+        <p:spPr>
+          <a:xfrm>
+            <a:off x="853657" y="134559"/>
+            <a:ext cx="9144000" cy="529322"/>
+          </a:xfrm>
+        </p:spPr>
+        <p:txBody>
+          <a:bodyPr>
+            <a:normAutofit/>
+          </a:bodyPr>
+          <a:lstStyle/>
+          <a:p>
+            <a:r>
+              <a:rPr lang="pt-BR" sz="2800" dirty="0">
+                <a:solidFill>
+                  <a:srgbClr val="3D464D"/>
+                </a:solidFill>
+                <a:latin typeface="Source Serif Pro"/>
+              </a:rPr>
+              <a:t>Padrão de projeto </a:t>
+            </a:r>
+            <a:r>
+              <a:rPr lang="pt-BR" sz="2800" b="1" dirty="0" err="1">
+                <a:solidFill>
+                  <a:srgbClr val="3D464D"/>
+                </a:solidFill>
+                <a:latin typeface="Source Serif Pro"/>
+              </a:rPr>
+              <a:t>Factory</a:t>
+            </a:r>
+            <a:endParaRPr lang="pt-BR" sz="2800" dirty="0">
+              <a:solidFill>
+                <a:srgbClr val="3D464D"/>
+              </a:solidFill>
+              <a:latin typeface="Source Serif Pro"/>
+            </a:endParaRPr>
+          </a:p>
+        </p:txBody>
+      </p:sp>
+      <p:sp>
+        <p:nvSpPr>
+          <p:cNvPr id="3" name="Subtítulo 2"/>
+          <p:cNvSpPr>
+            <a:spLocks noGrp="1"/>
+          </p:cNvSpPr>
+          <p:nvPr>
+            <p:ph type="subTitle" idx="1"/>
+          </p:nvPr>
+        </p:nvSpPr>
+        <p:spPr>
+          <a:xfrm>
+            <a:off x="477876" y="663881"/>
+            <a:ext cx="11259012" cy="5599133"/>
+          </a:xfrm>
+        </p:spPr>
+        <p:txBody>
+          <a:bodyPr>
+            <a:normAutofit/>
+          </a:bodyPr>
+          <a:lstStyle/>
+          <a:p>
+            <a:pPr algn="l"/>
+            <a:endParaRPr lang="pt-BR" sz="1800" dirty="0">
+              <a:solidFill>
+                <a:srgbClr val="3D464D"/>
+              </a:solidFill>
+              <a:latin typeface="Source Serif Pro"/>
+            </a:endParaRPr>
+          </a:p>
+          <a:p>
+            <a:pPr algn="l"/>
+            <a:r>
+              <a:rPr lang="pt-BR" sz="1800" dirty="0">
+                <a:solidFill>
+                  <a:srgbClr val="3D464D"/>
+                </a:solidFill>
+                <a:latin typeface="Source Serif Pro"/>
+              </a:rPr>
+              <a:t>1) Ele é utilizado quando precisamos facilitar a criação de um objeto.</a:t>
+            </a:r>
+          </a:p>
+          <a:p>
+            <a:pPr algn="l"/>
+            <a:r>
+              <a:rPr lang="pt-BR" sz="1800" dirty="0">
+                <a:solidFill>
+                  <a:srgbClr val="3D464D"/>
+                </a:solidFill>
+                <a:latin typeface="Source Serif Pro"/>
+              </a:rPr>
+              <a:t>2) É ideal quando queremos criar objetos similares, com apenas seus detalhes diferentes, que podemos passar nos argumentos da </a:t>
+            </a:r>
+            <a:r>
+              <a:rPr lang="pt-BR" sz="1800" b="1" dirty="0" err="1">
+                <a:solidFill>
+                  <a:srgbClr val="3D464D"/>
+                </a:solidFill>
+                <a:latin typeface="Source Serif Pro"/>
+              </a:rPr>
+              <a:t>Factory</a:t>
+            </a:r>
+            <a:r>
+              <a:rPr lang="pt-BR" sz="1800" dirty="0">
+                <a:solidFill>
+                  <a:srgbClr val="3D464D"/>
+                </a:solidFill>
+                <a:latin typeface="Source Serif Pro"/>
+              </a:rPr>
+              <a:t>.</a:t>
+            </a:r>
+          </a:p>
+          <a:p>
+            <a:pPr algn="l"/>
+            <a:r>
+              <a:rPr lang="pt-BR" sz="1800" dirty="0">
+                <a:solidFill>
+                  <a:srgbClr val="3D464D"/>
+                </a:solidFill>
+                <a:latin typeface="Source Serif Pro"/>
+              </a:rPr>
+              <a:t>3) É bom para abstrair a criação de um objeto complexo, já que o programador que utilizar a </a:t>
+            </a:r>
+            <a:r>
+              <a:rPr lang="pt-BR" sz="1800" b="1" dirty="0" err="1">
+                <a:solidFill>
+                  <a:srgbClr val="3D464D"/>
+                </a:solidFill>
+                <a:latin typeface="Source Serif Pro"/>
+              </a:rPr>
+              <a:t>Factory</a:t>
+            </a:r>
+            <a:r>
+              <a:rPr lang="pt-BR" sz="1800" dirty="0">
+                <a:solidFill>
+                  <a:srgbClr val="3D464D"/>
+                </a:solidFill>
+                <a:latin typeface="Source Serif Pro"/>
+              </a:rPr>
+              <a:t> não precisa necessariamente saber como é feita esta operação.</a:t>
+            </a:r>
+          </a:p>
+          <a:p>
+            <a:pPr algn="l"/>
+            <a:endParaRPr lang="pt-BR" sz="1800" dirty="0">
+              <a:solidFill>
+                <a:srgbClr val="3D464D"/>
+              </a:solidFill>
+              <a:latin typeface="Source Serif Pro"/>
+            </a:endParaRPr>
+          </a:p>
+          <a:p>
+            <a:r>
+              <a:rPr lang="pt-BR" dirty="0"/>
+              <a:t>O padrão de projeto </a:t>
+            </a:r>
+            <a:r>
+              <a:rPr lang="pt-BR" b="1" dirty="0" err="1"/>
+              <a:t>Factory</a:t>
+            </a:r>
+            <a:r>
+              <a:rPr lang="pt-BR" dirty="0"/>
+              <a:t> é um dos padrões mais utilizados no desenvolvimento. Ele é mais um da categoria dos </a:t>
+            </a:r>
+            <a:r>
+              <a:rPr lang="pt-BR" i="1" dirty="0" err="1"/>
+              <a:t>patterns</a:t>
+            </a:r>
+            <a:r>
+              <a:rPr lang="pt-BR" dirty="0"/>
+              <a:t> responsáveis por criar objetos, como o </a:t>
+            </a:r>
+            <a:r>
+              <a:rPr lang="pt-BR" b="1" dirty="0" err="1"/>
+              <a:t>Builder</a:t>
+            </a:r>
+            <a:r>
+              <a:rPr lang="pt-BR" dirty="0"/>
+              <a:t> e o </a:t>
+            </a:r>
+            <a:r>
+              <a:rPr lang="pt-BR" b="1" dirty="0" err="1"/>
+              <a:t>Prototype</a:t>
+            </a:r>
+            <a:r>
+              <a:rPr lang="pt-BR" dirty="0"/>
+              <a:t>.</a:t>
+            </a:r>
+            <a:endParaRPr lang="pt-BR" sz="1800" dirty="0"/>
+          </a:p>
+        </p:txBody>
+      </p:sp>
+    </p:spTree>
+    <p:extLst>
+      <p:ext uri="{BB962C8B-B14F-4D97-AF65-F5344CB8AC3E}">
+        <p14:creationId xmlns:p14="http://schemas.microsoft.com/office/powerpoint/2010/main" val="1766206525"/>
       </p:ext>
     </p:extLst>
   </p:cSld>

</xml_diff>

<commit_message>
Iniciando a Persistência; Estudos com o IndexedDB e Criando as conexões
</commit_message>
<xml_diff>
--- a/docs/JS Avançado 1-2-3-resumo.pptx
+++ b/docs/JS Avançado 1-2-3-resumo.pptx
@@ -16,6 +16,11 @@
     <p:sldId id="266" r:id="rId10"/>
     <p:sldId id="267" r:id="rId11"/>
     <p:sldId id="268" r:id="rId12"/>
+    <p:sldId id="269" r:id="rId13"/>
+    <p:sldId id="270" r:id="rId14"/>
+    <p:sldId id="271" r:id="rId15"/>
+    <p:sldId id="272" r:id="rId16"/>
+    <p:sldId id="273" r:id="rId17"/>
   </p:sldIdLst>
   <p:sldSz cx="12192000" cy="6858000"/>
   <p:notesSz cx="6858000" cy="9144000"/>
@@ -251,7 +256,7 @@
           <a:p>
             <a:fld id="{CC58B075-67F8-4A8D-AE1C-3D3E4193EBCA}" type="datetimeFigureOut">
               <a:rPr lang="pt-BR" smtClean="0"/>
-              <a:t>13/04/19</a:t>
+              <a:t>28/04/19</a:t>
             </a:fld>
             <a:endParaRPr lang="pt-BR"/>
           </a:p>
@@ -419,7 +424,7 @@
           <a:p>
             <a:fld id="{CC58B075-67F8-4A8D-AE1C-3D3E4193EBCA}" type="datetimeFigureOut">
               <a:rPr lang="pt-BR" smtClean="0"/>
-              <a:t>13/04/19</a:t>
+              <a:t>28/04/19</a:t>
             </a:fld>
             <a:endParaRPr lang="pt-BR"/>
           </a:p>
@@ -597,7 +602,7 @@
           <a:p>
             <a:fld id="{CC58B075-67F8-4A8D-AE1C-3D3E4193EBCA}" type="datetimeFigureOut">
               <a:rPr lang="pt-BR" smtClean="0"/>
-              <a:t>13/04/19</a:t>
+              <a:t>28/04/19</a:t>
             </a:fld>
             <a:endParaRPr lang="pt-BR"/>
           </a:p>
@@ -765,7 +770,7 @@
           <a:p>
             <a:fld id="{CC58B075-67F8-4A8D-AE1C-3D3E4193EBCA}" type="datetimeFigureOut">
               <a:rPr lang="pt-BR" smtClean="0"/>
-              <a:t>13/04/19</a:t>
+              <a:t>28/04/19</a:t>
             </a:fld>
             <a:endParaRPr lang="pt-BR"/>
           </a:p>
@@ -1010,7 +1015,7 @@
           <a:p>
             <a:fld id="{CC58B075-67F8-4A8D-AE1C-3D3E4193EBCA}" type="datetimeFigureOut">
               <a:rPr lang="pt-BR" smtClean="0"/>
-              <a:t>13/04/19</a:t>
+              <a:t>28/04/19</a:t>
             </a:fld>
             <a:endParaRPr lang="pt-BR"/>
           </a:p>
@@ -1239,7 +1244,7 @@
           <a:p>
             <a:fld id="{CC58B075-67F8-4A8D-AE1C-3D3E4193EBCA}" type="datetimeFigureOut">
               <a:rPr lang="pt-BR" smtClean="0"/>
-              <a:t>13/04/19</a:t>
+              <a:t>28/04/19</a:t>
             </a:fld>
             <a:endParaRPr lang="pt-BR"/>
           </a:p>
@@ -1603,7 +1608,7 @@
           <a:p>
             <a:fld id="{CC58B075-67F8-4A8D-AE1C-3D3E4193EBCA}" type="datetimeFigureOut">
               <a:rPr lang="pt-BR" smtClean="0"/>
-              <a:t>13/04/19</a:t>
+              <a:t>28/04/19</a:t>
             </a:fld>
             <a:endParaRPr lang="pt-BR"/>
           </a:p>
@@ -1720,7 +1725,7 @@
           <a:p>
             <a:fld id="{CC58B075-67F8-4A8D-AE1C-3D3E4193EBCA}" type="datetimeFigureOut">
               <a:rPr lang="pt-BR" smtClean="0"/>
-              <a:t>13/04/19</a:t>
+              <a:t>28/04/19</a:t>
             </a:fld>
             <a:endParaRPr lang="pt-BR"/>
           </a:p>
@@ -1815,7 +1820,7 @@
           <a:p>
             <a:fld id="{CC58B075-67F8-4A8D-AE1C-3D3E4193EBCA}" type="datetimeFigureOut">
               <a:rPr lang="pt-BR" smtClean="0"/>
-              <a:t>13/04/19</a:t>
+              <a:t>28/04/19</a:t>
             </a:fld>
             <a:endParaRPr lang="pt-BR"/>
           </a:p>
@@ -2090,7 +2095,7 @@
           <a:p>
             <a:fld id="{CC58B075-67F8-4A8D-AE1C-3D3E4193EBCA}" type="datetimeFigureOut">
               <a:rPr lang="pt-BR" smtClean="0"/>
-              <a:t>13/04/19</a:t>
+              <a:t>28/04/19</a:t>
             </a:fld>
             <a:endParaRPr lang="pt-BR"/>
           </a:p>
@@ -2342,7 +2347,7 @@
           <a:p>
             <a:fld id="{CC58B075-67F8-4A8D-AE1C-3D3E4193EBCA}" type="datetimeFigureOut">
               <a:rPr lang="pt-BR" smtClean="0"/>
-              <a:t>13/04/19</a:t>
+              <a:t>28/04/19</a:t>
             </a:fld>
             <a:endParaRPr lang="pt-BR"/>
           </a:p>
@@ -2553,7 +2558,7 @@
           <a:p>
             <a:fld id="{CC58B075-67F8-4A8D-AE1C-3D3E4193EBCA}" type="datetimeFigureOut">
               <a:rPr lang="pt-BR" smtClean="0"/>
-              <a:t>13/04/19</a:t>
+              <a:t>28/04/19</a:t>
             </a:fld>
             <a:endParaRPr lang="pt-BR"/>
           </a:p>
@@ -3312,6 +3317,1142 @@
 </p:sld>
 </file>
 
+<file path=ppt/slides/slide12.xml><?xml version="1.0" encoding="utf-8"?>
+<p:sld xmlns:a="http://schemas.openxmlformats.org/drawingml/2006/main" xmlns:r="http://schemas.openxmlformats.org/officeDocument/2006/relationships" xmlns:p="http://schemas.openxmlformats.org/presentationml/2006/main">
+  <p:cSld>
+    <p:spTree>
+      <p:nvGrpSpPr>
+        <p:cNvPr id="1" name=""/>
+        <p:cNvGrpSpPr/>
+        <p:nvPr/>
+      </p:nvGrpSpPr>
+      <p:grpSpPr>
+        <a:xfrm>
+          <a:off x="0" y="0"/>
+          <a:ext cx="0" cy="0"/>
+          <a:chOff x="0" y="0"/>
+          <a:chExt cx="0" cy="0"/>
+        </a:xfrm>
+      </p:grpSpPr>
+      <p:sp>
+        <p:nvSpPr>
+          <p:cNvPr id="2" name="Título 1"/>
+          <p:cNvSpPr>
+            <a:spLocks noGrp="1"/>
+          </p:cNvSpPr>
+          <p:nvPr>
+            <p:ph type="ctrTitle"/>
+          </p:nvPr>
+        </p:nvSpPr>
+        <p:spPr/>
+        <p:txBody>
+          <a:bodyPr>
+            <a:normAutofit/>
+          </a:bodyPr>
+          <a:lstStyle/>
+          <a:p>
+            <a:r>
+              <a:rPr lang="pt-BR" sz="3600" dirty="0"/>
+              <a:t>JS Avançado 3</a:t>
+            </a:r>
+          </a:p>
+        </p:txBody>
+      </p:sp>
+    </p:spTree>
+    <p:extLst>
+      <p:ext uri="{BB962C8B-B14F-4D97-AF65-F5344CB8AC3E}">
+        <p14:creationId xmlns:p14="http://schemas.microsoft.com/office/powerpoint/2010/main" val="1039430126"/>
+      </p:ext>
+    </p:extLst>
+  </p:cSld>
+  <p:clrMapOvr>
+    <a:masterClrMapping/>
+  </p:clrMapOvr>
+</p:sld>
+</file>
+
+<file path=ppt/slides/slide13.xml><?xml version="1.0" encoding="utf-8"?>
+<p:sld xmlns:a="http://schemas.openxmlformats.org/drawingml/2006/main" xmlns:r="http://schemas.openxmlformats.org/officeDocument/2006/relationships" xmlns:p="http://schemas.openxmlformats.org/presentationml/2006/main">
+  <p:cSld>
+    <p:spTree>
+      <p:nvGrpSpPr>
+        <p:cNvPr id="1" name=""/>
+        <p:cNvGrpSpPr/>
+        <p:nvPr/>
+      </p:nvGrpSpPr>
+      <p:grpSpPr>
+        <a:xfrm>
+          <a:off x="0" y="0"/>
+          <a:ext cx="0" cy="0"/>
+          <a:chOff x="0" y="0"/>
+          <a:chExt cx="0" cy="0"/>
+        </a:xfrm>
+      </p:grpSpPr>
+      <p:sp>
+        <p:nvSpPr>
+          <p:cNvPr id="2" name="Título 1"/>
+          <p:cNvSpPr>
+            <a:spLocks noGrp="1"/>
+          </p:cNvSpPr>
+          <p:nvPr>
+            <p:ph type="title"/>
+          </p:nvPr>
+        </p:nvSpPr>
+        <p:spPr>
+          <a:xfrm>
+            <a:off x="759177" y="89552"/>
+            <a:ext cx="10515600" cy="549275"/>
+          </a:xfrm>
+        </p:spPr>
+        <p:txBody>
+          <a:bodyPr>
+            <a:normAutofit/>
+          </a:bodyPr>
+          <a:lstStyle/>
+          <a:p>
+            <a:pPr algn="ctr"/>
+            <a:r>
+              <a:rPr lang="pt-BR" sz="2800" b="1" dirty="0"/>
+              <a:t>Persistência</a:t>
+            </a:r>
+          </a:p>
+        </p:txBody>
+      </p:sp>
+      <p:sp>
+        <p:nvSpPr>
+          <p:cNvPr id="7" name="Espaço Reservado para Conteúdo 6">
+            <a:extLst>
+              <a:ext uri="{FF2B5EF4-FFF2-40B4-BE49-F238E27FC236}">
+                <a16:creationId xmlns:a16="http://schemas.microsoft.com/office/drawing/2014/main" id="{CBDD146F-E87E-0140-B521-E123E7DC95E8}"/>
+              </a:ext>
+            </a:extLst>
+          </p:cNvPr>
+          <p:cNvSpPr>
+            <a:spLocks noGrp="1"/>
+          </p:cNvSpPr>
+          <p:nvPr>
+            <p:ph idx="1"/>
+          </p:nvPr>
+        </p:nvSpPr>
+        <p:spPr>
+          <a:xfrm>
+            <a:off x="563671" y="801666"/>
+            <a:ext cx="10790129" cy="5375297"/>
+          </a:xfrm>
+        </p:spPr>
+        <p:txBody>
+          <a:bodyPr/>
+          <a:lstStyle/>
+          <a:p>
+            <a:r>
+              <a:rPr lang="pt-BR" sz="2400" dirty="0"/>
+              <a:t>Persistência com o banco de dados bastante famoso no mercado e certificado pela W3C, </a:t>
+            </a:r>
+            <a:r>
+              <a:rPr lang="pt-BR" sz="2400" b="1" dirty="0" err="1"/>
+              <a:t>IndexedDB</a:t>
+            </a:r>
+            <a:r>
+              <a:rPr lang="pt-BR" sz="2400" dirty="0"/>
+              <a:t> (</a:t>
+            </a:r>
+            <a:r>
+              <a:rPr lang="pt-BR" sz="2400" b="1" dirty="0"/>
+              <a:t>IDB</a:t>
+            </a:r>
+            <a:r>
+              <a:rPr lang="pt-BR" sz="2400" dirty="0"/>
+              <a:t>).</a:t>
+            </a:r>
+          </a:p>
+          <a:p>
+            <a:r>
+              <a:rPr lang="pt-BR" sz="2400" dirty="0"/>
+              <a:t>É acessível pelo escopo global</a:t>
+            </a:r>
+          </a:p>
+          <a:p>
+            <a:r>
+              <a:rPr lang="pt-BR" sz="2400" dirty="0"/>
+              <a:t>Precisamos solicitar uma requisição de abertura para um Banco antes de qualquer coisa</a:t>
+            </a:r>
+          </a:p>
+          <a:p>
+            <a:r>
+              <a:rPr lang="pt-BR" sz="2400" dirty="0"/>
+              <a:t>Temos que lidar com uma tríade de eventos todas as vezes que obtermos uma conexão</a:t>
+            </a:r>
+          </a:p>
+          <a:p>
+            <a:pPr lvl="1"/>
+            <a:r>
+              <a:rPr lang="pt-BR" dirty="0" err="1"/>
+              <a:t>openRequest.</a:t>
+            </a:r>
+            <a:r>
+              <a:rPr lang="pt-BR" b="1" dirty="0" err="1"/>
+              <a:t>onupgradeneeded</a:t>
+            </a:r>
+            <a:endParaRPr lang="pt-BR" b="1" dirty="0"/>
+          </a:p>
+          <a:p>
+            <a:pPr lvl="1"/>
+            <a:r>
+              <a:rPr lang="pt-BR" dirty="0" err="1"/>
+              <a:t>openRequest.</a:t>
+            </a:r>
+            <a:r>
+              <a:rPr lang="pt-BR" b="1" dirty="0" err="1"/>
+              <a:t>onsuccess</a:t>
+            </a:r>
+            <a:endParaRPr lang="pt-BR" b="1" dirty="0"/>
+          </a:p>
+          <a:p>
+            <a:pPr lvl="1"/>
+            <a:r>
+              <a:rPr lang="pt-BR" dirty="0" err="1"/>
+              <a:t>openRequest.</a:t>
+            </a:r>
+            <a:r>
+              <a:rPr lang="pt-BR" b="1" dirty="0" err="1"/>
+              <a:t>onerror</a:t>
+            </a:r>
+            <a:endParaRPr lang="pt-BR" b="1" dirty="0"/>
+          </a:p>
+          <a:p>
+            <a:pPr lvl="1"/>
+            <a:endParaRPr lang="pt-BR" sz="2000" dirty="0"/>
+          </a:p>
+        </p:txBody>
+      </p:sp>
+    </p:spTree>
+    <p:extLst>
+      <p:ext uri="{BB962C8B-B14F-4D97-AF65-F5344CB8AC3E}">
+        <p14:creationId xmlns:p14="http://schemas.microsoft.com/office/powerpoint/2010/main" val="266674773"/>
+      </p:ext>
+    </p:extLst>
+  </p:cSld>
+  <p:clrMapOvr>
+    <a:masterClrMapping/>
+  </p:clrMapOvr>
+</p:sld>
+</file>
+
+<file path=ppt/slides/slide14.xml><?xml version="1.0" encoding="utf-8"?>
+<p:sld xmlns:a="http://schemas.openxmlformats.org/drawingml/2006/main" xmlns:r="http://schemas.openxmlformats.org/officeDocument/2006/relationships" xmlns:p="http://schemas.openxmlformats.org/presentationml/2006/main">
+  <p:cSld>
+    <p:spTree>
+      <p:nvGrpSpPr>
+        <p:cNvPr id="1" name=""/>
+        <p:cNvGrpSpPr/>
+        <p:nvPr/>
+      </p:nvGrpSpPr>
+      <p:grpSpPr>
+        <a:xfrm>
+          <a:off x="0" y="0"/>
+          <a:ext cx="0" cy="0"/>
+          <a:chOff x="0" y="0"/>
+          <a:chExt cx="0" cy="0"/>
+        </a:xfrm>
+      </p:grpSpPr>
+      <p:sp>
+        <p:nvSpPr>
+          <p:cNvPr id="2" name="Título 1"/>
+          <p:cNvSpPr>
+            <a:spLocks noGrp="1"/>
+          </p:cNvSpPr>
+          <p:nvPr>
+            <p:ph type="title"/>
+          </p:nvPr>
+        </p:nvSpPr>
+        <p:spPr>
+          <a:xfrm>
+            <a:off x="759177" y="89552"/>
+            <a:ext cx="10515600" cy="549275"/>
+          </a:xfrm>
+        </p:spPr>
+        <p:txBody>
+          <a:bodyPr>
+            <a:normAutofit/>
+          </a:bodyPr>
+          <a:lstStyle/>
+          <a:p>
+            <a:pPr algn="ctr"/>
+            <a:r>
+              <a:rPr lang="pt-BR" sz="2800" b="1" dirty="0"/>
+              <a:t>Persistência</a:t>
+            </a:r>
+          </a:p>
+        </p:txBody>
+      </p:sp>
+      <p:sp>
+        <p:nvSpPr>
+          <p:cNvPr id="7" name="Espaço Reservado para Conteúdo 6">
+            <a:extLst>
+              <a:ext uri="{FF2B5EF4-FFF2-40B4-BE49-F238E27FC236}">
+                <a16:creationId xmlns:a16="http://schemas.microsoft.com/office/drawing/2014/main" id="{CBDD146F-E87E-0140-B521-E123E7DC95E8}"/>
+              </a:ext>
+            </a:extLst>
+          </p:cNvPr>
+          <p:cNvSpPr>
+            <a:spLocks noGrp="1"/>
+          </p:cNvSpPr>
+          <p:nvPr>
+            <p:ph idx="1"/>
+          </p:nvPr>
+        </p:nvSpPr>
+        <p:spPr>
+          <a:xfrm>
+            <a:off x="563671" y="801666"/>
+            <a:ext cx="10790129" cy="5649238"/>
+          </a:xfrm>
+        </p:spPr>
+        <p:txBody>
+          <a:bodyPr/>
+          <a:lstStyle/>
+          <a:p>
+            <a:r>
+              <a:rPr lang="pt-BR" dirty="0"/>
+              <a:t>O evento </a:t>
+            </a:r>
+            <a:r>
+              <a:rPr lang="pt-BR" b="1" dirty="0" err="1"/>
+              <a:t>onupgradeneeded</a:t>
+            </a:r>
+            <a:r>
+              <a:rPr lang="pt-BR" dirty="0"/>
+              <a:t> pode ou não ser disparado em determinadas situações.</a:t>
+            </a:r>
+          </a:p>
+          <a:p>
+            <a:r>
+              <a:rPr lang="pt-BR" dirty="0"/>
+              <a:t>O evento </a:t>
+            </a:r>
+            <a:r>
+              <a:rPr lang="pt-BR" dirty="0" err="1"/>
+              <a:t>onupgradeneeded</a:t>
+            </a:r>
+            <a:r>
+              <a:rPr lang="pt-BR" dirty="0"/>
+              <a:t> é </a:t>
+            </a:r>
+            <a:r>
+              <a:rPr lang="pt-BR" b="1" dirty="0"/>
+              <a:t>sempre</a:t>
+            </a:r>
+            <a:r>
+              <a:rPr lang="pt-BR" dirty="0"/>
+              <a:t> chamado quando o banco é criado pela primeira vez.</a:t>
+            </a:r>
+          </a:p>
+          <a:p>
+            <a:endParaRPr lang="pt-BR" dirty="0"/>
+          </a:p>
+          <a:p>
+            <a:endParaRPr lang="pt-BR" dirty="0"/>
+          </a:p>
+          <a:p>
+            <a:r>
+              <a:rPr lang="pt-BR" dirty="0"/>
+              <a:t>Partindo do ponto que a variável connection possui uma conexão para o banco </a:t>
+            </a:r>
+            <a:r>
+              <a:rPr lang="pt-BR" dirty="0" err="1"/>
+              <a:t>aluraframe</a:t>
+            </a:r>
+            <a:r>
+              <a:rPr lang="pt-BR" dirty="0"/>
+              <a:t> e que este banco possui a store negociações a forma correta de obter a store negociações</a:t>
+            </a:r>
+          </a:p>
+          <a:p>
+            <a:endParaRPr lang="pt-BR" dirty="0"/>
+          </a:p>
+          <a:p>
+            <a:pPr lvl="1"/>
+            <a:r>
+              <a:rPr lang="pt-BR" dirty="0" err="1">
+                <a:solidFill>
+                  <a:schemeClr val="accent5"/>
+                </a:solidFill>
+              </a:rPr>
+              <a:t>let</a:t>
+            </a:r>
+            <a:r>
+              <a:rPr lang="pt-BR" dirty="0">
+                <a:solidFill>
+                  <a:schemeClr val="accent5"/>
+                </a:solidFill>
+              </a:rPr>
+              <a:t> </a:t>
+            </a:r>
+            <a:r>
+              <a:rPr lang="pt-BR" dirty="0" err="1">
+                <a:solidFill>
+                  <a:schemeClr val="accent5"/>
+                </a:solidFill>
+              </a:rPr>
+              <a:t>transaction</a:t>
+            </a:r>
+            <a:r>
+              <a:rPr lang="pt-BR" dirty="0">
+                <a:solidFill>
+                  <a:schemeClr val="accent5"/>
+                </a:solidFill>
+              </a:rPr>
+              <a:t> = </a:t>
+            </a:r>
+            <a:r>
+              <a:rPr lang="pt-BR" dirty="0" err="1">
+                <a:solidFill>
+                  <a:schemeClr val="accent5"/>
+                </a:solidFill>
+              </a:rPr>
+              <a:t>connection.transaction</a:t>
+            </a:r>
+            <a:r>
+              <a:rPr lang="pt-BR" dirty="0">
+                <a:solidFill>
+                  <a:schemeClr val="accent5"/>
+                </a:solidFill>
+              </a:rPr>
+              <a:t>(['</a:t>
+            </a:r>
+            <a:r>
+              <a:rPr lang="pt-BR" dirty="0" err="1">
+                <a:solidFill>
+                  <a:schemeClr val="accent5"/>
+                </a:solidFill>
+              </a:rPr>
+              <a:t>negociacoes</a:t>
+            </a:r>
+            <a:r>
+              <a:rPr lang="pt-BR" dirty="0">
+                <a:solidFill>
+                  <a:schemeClr val="accent5"/>
+                </a:solidFill>
+              </a:rPr>
+              <a:t>'],'</a:t>
+            </a:r>
+            <a:r>
+              <a:rPr lang="pt-BR" dirty="0" err="1">
+                <a:solidFill>
+                  <a:schemeClr val="accent5"/>
+                </a:solidFill>
+              </a:rPr>
+              <a:t>readwrite</a:t>
+            </a:r>
+            <a:r>
+              <a:rPr lang="pt-BR" dirty="0">
+                <a:solidFill>
+                  <a:schemeClr val="accent5"/>
+                </a:solidFill>
+              </a:rPr>
+              <a:t>’); </a:t>
+            </a:r>
+          </a:p>
+          <a:p>
+            <a:pPr lvl="1"/>
+            <a:r>
+              <a:rPr lang="pt-BR" dirty="0" err="1">
+                <a:solidFill>
+                  <a:schemeClr val="accent5"/>
+                </a:solidFill>
+              </a:rPr>
+              <a:t>let</a:t>
+            </a:r>
+            <a:r>
+              <a:rPr lang="pt-BR" dirty="0">
+                <a:solidFill>
+                  <a:schemeClr val="accent5"/>
+                </a:solidFill>
+              </a:rPr>
+              <a:t> store = </a:t>
+            </a:r>
+            <a:r>
+              <a:rPr lang="pt-BR" dirty="0" err="1">
+                <a:solidFill>
+                  <a:schemeClr val="accent5"/>
+                </a:solidFill>
+              </a:rPr>
+              <a:t>transaction.objectStore</a:t>
+            </a:r>
+            <a:r>
+              <a:rPr lang="pt-BR" dirty="0">
+                <a:solidFill>
+                  <a:schemeClr val="accent5"/>
+                </a:solidFill>
+              </a:rPr>
+              <a:t>('</a:t>
+            </a:r>
+            <a:r>
+              <a:rPr lang="pt-BR" dirty="0" err="1">
+                <a:solidFill>
+                  <a:schemeClr val="accent5"/>
+                </a:solidFill>
+              </a:rPr>
+              <a:t>negociacoes</a:t>
+            </a:r>
+            <a:r>
+              <a:rPr lang="pt-BR" dirty="0">
+                <a:solidFill>
+                  <a:schemeClr val="accent5"/>
+                </a:solidFill>
+              </a:rPr>
+              <a:t>');</a:t>
+            </a:r>
+          </a:p>
+        </p:txBody>
+      </p:sp>
+    </p:spTree>
+    <p:extLst>
+      <p:ext uri="{BB962C8B-B14F-4D97-AF65-F5344CB8AC3E}">
+        <p14:creationId xmlns:p14="http://schemas.microsoft.com/office/powerpoint/2010/main" val="692149539"/>
+      </p:ext>
+    </p:extLst>
+  </p:cSld>
+  <p:clrMapOvr>
+    <a:masterClrMapping/>
+  </p:clrMapOvr>
+</p:sld>
+</file>
+
+<file path=ppt/slides/slide15.xml><?xml version="1.0" encoding="utf-8"?>
+<p:sld xmlns:a="http://schemas.openxmlformats.org/drawingml/2006/main" xmlns:r="http://schemas.openxmlformats.org/officeDocument/2006/relationships" xmlns:p="http://schemas.openxmlformats.org/presentationml/2006/main">
+  <p:cSld>
+    <p:spTree>
+      <p:nvGrpSpPr>
+        <p:cNvPr id="1" name=""/>
+        <p:cNvGrpSpPr/>
+        <p:nvPr/>
+      </p:nvGrpSpPr>
+      <p:grpSpPr>
+        <a:xfrm>
+          <a:off x="0" y="0"/>
+          <a:ext cx="0" cy="0"/>
+          <a:chOff x="0" y="0"/>
+          <a:chExt cx="0" cy="0"/>
+        </a:xfrm>
+      </p:grpSpPr>
+      <p:sp>
+        <p:nvSpPr>
+          <p:cNvPr id="2" name="Título 1"/>
+          <p:cNvSpPr>
+            <a:spLocks noGrp="1"/>
+          </p:cNvSpPr>
+          <p:nvPr>
+            <p:ph type="title"/>
+          </p:nvPr>
+        </p:nvSpPr>
+        <p:spPr>
+          <a:xfrm>
+            <a:off x="759177" y="89552"/>
+            <a:ext cx="10515600" cy="549275"/>
+          </a:xfrm>
+        </p:spPr>
+        <p:txBody>
+          <a:bodyPr>
+            <a:normAutofit/>
+          </a:bodyPr>
+          <a:lstStyle/>
+          <a:p>
+            <a:pPr algn="ctr"/>
+            <a:r>
+              <a:rPr lang="pt-BR" sz="2800" b="1" dirty="0"/>
+              <a:t>Uma conexão ou várias</a:t>
+            </a:r>
+          </a:p>
+        </p:txBody>
+      </p:sp>
+      <p:sp>
+        <p:nvSpPr>
+          <p:cNvPr id="7" name="Espaço Reservado para Conteúdo 6">
+            <a:extLst>
+              <a:ext uri="{FF2B5EF4-FFF2-40B4-BE49-F238E27FC236}">
+                <a16:creationId xmlns:a16="http://schemas.microsoft.com/office/drawing/2014/main" id="{CBDD146F-E87E-0140-B521-E123E7DC95E8}"/>
+              </a:ext>
+            </a:extLst>
+          </p:cNvPr>
+          <p:cNvSpPr>
+            <a:spLocks noGrp="1"/>
+          </p:cNvSpPr>
+          <p:nvPr>
+            <p:ph idx="1"/>
+          </p:nvPr>
+        </p:nvSpPr>
+        <p:spPr>
+          <a:xfrm>
+            <a:off x="563671" y="801666"/>
+            <a:ext cx="10790129" cy="5649238"/>
+          </a:xfrm>
+        </p:spPr>
+        <p:txBody>
+          <a:bodyPr/>
+          <a:lstStyle/>
+          <a:p>
+            <a:r>
+              <a:rPr lang="pt-BR" dirty="0">
+                <a:solidFill>
+                  <a:srgbClr val="3D464D"/>
+                </a:solidFill>
+                <a:latin typeface="Source Serif Pro"/>
+              </a:rPr>
+              <a:t>A) O método </a:t>
+            </a:r>
+            <a:r>
+              <a:rPr lang="pt-BR" dirty="0" err="1">
+                <a:solidFill>
+                  <a:srgbClr val="3D464D"/>
+                </a:solidFill>
+                <a:latin typeface="Source Serif Pro"/>
+              </a:rPr>
+              <a:t>getConnection</a:t>
+            </a:r>
+            <a:r>
+              <a:rPr lang="pt-BR" dirty="0">
+                <a:solidFill>
+                  <a:srgbClr val="3D464D"/>
+                </a:solidFill>
+                <a:latin typeface="Source Serif Pro"/>
+              </a:rPr>
+              <a:t>() será um método estático, ou seja, invocado diretamente na classe.</a:t>
+            </a:r>
+          </a:p>
+          <a:p>
+            <a:endParaRPr lang="pt-BR" dirty="0">
+              <a:solidFill>
+                <a:srgbClr val="3D464D"/>
+              </a:solidFill>
+              <a:latin typeface="Source Serif Pro"/>
+            </a:endParaRPr>
+          </a:p>
+          <a:p>
+            <a:r>
+              <a:rPr lang="pt-BR" dirty="0" err="1">
+                <a:solidFill>
+                  <a:srgbClr val="3D464D"/>
+                </a:solidFill>
+                <a:latin typeface="Source Serif Pro"/>
+              </a:rPr>
+              <a:t>B</a:t>
+            </a:r>
+            <a:r>
+              <a:rPr lang="pt-BR" dirty="0">
+                <a:solidFill>
+                  <a:srgbClr val="3D464D"/>
+                </a:solidFill>
+                <a:latin typeface="Source Serif Pro"/>
+              </a:rPr>
+              <a:t>) O retorno de </a:t>
+            </a:r>
+            <a:r>
+              <a:rPr lang="pt-BR" dirty="0" err="1">
+                <a:solidFill>
+                  <a:srgbClr val="3D464D"/>
+                </a:solidFill>
+                <a:latin typeface="Source Serif Pro"/>
+              </a:rPr>
+              <a:t>getConnection</a:t>
+            </a:r>
+            <a:r>
+              <a:rPr lang="pt-BR" dirty="0">
+                <a:solidFill>
+                  <a:srgbClr val="3D464D"/>
+                </a:solidFill>
+                <a:latin typeface="Source Serif Pro"/>
+              </a:rPr>
+              <a:t> será uma </a:t>
+            </a:r>
+            <a:r>
+              <a:rPr lang="pt-BR" dirty="0" err="1">
+                <a:solidFill>
+                  <a:srgbClr val="3D464D"/>
+                </a:solidFill>
+                <a:latin typeface="Source Serif Pro"/>
+              </a:rPr>
+              <a:t>promise</a:t>
+            </a:r>
+            <a:r>
+              <a:rPr lang="pt-BR" dirty="0">
+                <a:solidFill>
+                  <a:srgbClr val="3D464D"/>
+                </a:solidFill>
+                <a:latin typeface="Source Serif Pro"/>
+              </a:rPr>
+              <a:t>, pois a abertura de uma conexão é um processo assíncrono.</a:t>
+            </a:r>
+          </a:p>
+          <a:p>
+            <a:endParaRPr lang="pt-BR" dirty="0">
+              <a:solidFill>
+                <a:srgbClr val="3D464D"/>
+              </a:solidFill>
+              <a:latin typeface="Source Serif Pro"/>
+            </a:endParaRPr>
+          </a:p>
+          <a:p>
+            <a:r>
+              <a:rPr lang="pt-BR" dirty="0">
+                <a:solidFill>
+                  <a:srgbClr val="3D464D"/>
+                </a:solidFill>
+                <a:latin typeface="Source Serif Pro"/>
+              </a:rPr>
+              <a:t>C) Não importa quantas vezes seja chamado o método </a:t>
+            </a:r>
+            <a:r>
+              <a:rPr lang="pt-BR" dirty="0" err="1">
+                <a:solidFill>
+                  <a:srgbClr val="3D464D"/>
+                </a:solidFill>
+                <a:latin typeface="Source Serif Pro"/>
+              </a:rPr>
+              <a:t>getConnection</a:t>
+            </a:r>
+            <a:r>
+              <a:rPr lang="pt-BR" dirty="0">
+                <a:solidFill>
+                  <a:srgbClr val="3D464D"/>
+                </a:solidFill>
+                <a:latin typeface="Source Serif Pro"/>
+              </a:rPr>
+              <a:t>(), a conexão retornada deve ser a mesma.</a:t>
+            </a:r>
+          </a:p>
+          <a:p>
+            <a:endParaRPr lang="pt-BR" dirty="0">
+              <a:solidFill>
+                <a:srgbClr val="3D464D"/>
+              </a:solidFill>
+              <a:latin typeface="Source Serif Pro"/>
+            </a:endParaRPr>
+          </a:p>
+          <a:p>
+            <a:r>
+              <a:rPr lang="pt-BR" dirty="0" err="1">
+                <a:solidFill>
+                  <a:srgbClr val="3D464D"/>
+                </a:solidFill>
+                <a:latin typeface="Source Serif Pro"/>
+              </a:rPr>
+              <a:t>D</a:t>
+            </a:r>
+            <a:r>
+              <a:rPr lang="pt-BR" dirty="0">
+                <a:solidFill>
+                  <a:srgbClr val="3D464D"/>
+                </a:solidFill>
+                <a:latin typeface="Source Serif Pro"/>
+              </a:rPr>
+              <a:t>) Toda conexão possui o método close(), mas o programador não pode chamá-lo, porque a conexão é a mesma para a aplicação inteira. Só o próprio </a:t>
+            </a:r>
+            <a:r>
+              <a:rPr lang="pt-BR" dirty="0" err="1">
+                <a:solidFill>
+                  <a:srgbClr val="3D464D"/>
+                </a:solidFill>
+                <a:latin typeface="Source Serif Pro"/>
+              </a:rPr>
+              <a:t>ConnectionFactory</a:t>
+            </a:r>
+            <a:r>
+              <a:rPr lang="pt-BR" dirty="0">
+                <a:solidFill>
+                  <a:srgbClr val="3D464D"/>
+                </a:solidFill>
+                <a:latin typeface="Source Serif Pro"/>
+              </a:rPr>
+              <a:t> pode fechar a conexão.</a:t>
+            </a:r>
+          </a:p>
+          <a:p>
+            <a:endParaRPr lang="pt-BR" dirty="0">
+              <a:solidFill>
+                <a:schemeClr val="accent5"/>
+              </a:solidFill>
+            </a:endParaRPr>
+          </a:p>
+        </p:txBody>
+      </p:sp>
+    </p:spTree>
+    <p:extLst>
+      <p:ext uri="{BB962C8B-B14F-4D97-AF65-F5344CB8AC3E}">
+        <p14:creationId xmlns:p14="http://schemas.microsoft.com/office/powerpoint/2010/main" val="298619623"/>
+      </p:ext>
+    </p:extLst>
+  </p:cSld>
+  <p:clrMapOvr>
+    <a:masterClrMapping/>
+  </p:clrMapOvr>
+</p:sld>
+</file>
+
+<file path=ppt/slides/slide16.xml><?xml version="1.0" encoding="utf-8"?>
+<p:sld xmlns:a="http://schemas.openxmlformats.org/drawingml/2006/main" xmlns:r="http://schemas.openxmlformats.org/officeDocument/2006/relationships" xmlns:p="http://schemas.openxmlformats.org/presentationml/2006/main">
+  <p:cSld>
+    <p:spTree>
+      <p:nvGrpSpPr>
+        <p:cNvPr id="1" name=""/>
+        <p:cNvGrpSpPr/>
+        <p:nvPr/>
+      </p:nvGrpSpPr>
+      <p:grpSpPr>
+        <a:xfrm>
+          <a:off x="0" y="0"/>
+          <a:ext cx="0" cy="0"/>
+          <a:chOff x="0" y="0"/>
+          <a:chExt cx="0" cy="0"/>
+        </a:xfrm>
+      </p:grpSpPr>
+      <p:sp>
+        <p:nvSpPr>
+          <p:cNvPr id="2" name="Título 1"/>
+          <p:cNvSpPr>
+            <a:spLocks noGrp="1"/>
+          </p:cNvSpPr>
+          <p:nvPr>
+            <p:ph type="title"/>
+          </p:nvPr>
+        </p:nvSpPr>
+        <p:spPr>
+          <a:xfrm>
+            <a:off x="759177" y="89552"/>
+            <a:ext cx="10515600" cy="549275"/>
+          </a:xfrm>
+        </p:spPr>
+        <p:txBody>
+          <a:bodyPr>
+            <a:normAutofit/>
+          </a:bodyPr>
+          <a:lstStyle/>
+          <a:p>
+            <a:pPr algn="ctr"/>
+            <a:r>
+              <a:rPr lang="pt-BR" sz="2800" b="1" dirty="0"/>
+              <a:t>Uma conexão ou várias</a:t>
+            </a:r>
+          </a:p>
+        </p:txBody>
+      </p:sp>
+      <p:sp>
+        <p:nvSpPr>
+          <p:cNvPr id="7" name="Espaço Reservado para Conteúdo 6">
+            <a:extLst>
+              <a:ext uri="{FF2B5EF4-FFF2-40B4-BE49-F238E27FC236}">
+                <a16:creationId xmlns:a16="http://schemas.microsoft.com/office/drawing/2014/main" id="{CBDD146F-E87E-0140-B521-E123E7DC95E8}"/>
+              </a:ext>
+            </a:extLst>
+          </p:cNvPr>
+          <p:cNvSpPr>
+            <a:spLocks noGrp="1"/>
+          </p:cNvSpPr>
+          <p:nvPr>
+            <p:ph idx="1"/>
+          </p:nvPr>
+        </p:nvSpPr>
+        <p:spPr>
+          <a:xfrm>
+            <a:off x="563671" y="801666"/>
+            <a:ext cx="10790129" cy="5649238"/>
+          </a:xfrm>
+        </p:spPr>
+        <p:txBody>
+          <a:bodyPr/>
+          <a:lstStyle/>
+          <a:p>
+            <a:pPr marL="0" indent="0">
+              <a:buNone/>
+            </a:pPr>
+            <a:r>
+              <a:rPr lang="pt-BR" dirty="0" err="1">
+                <a:solidFill>
+                  <a:srgbClr val="A67F59"/>
+                </a:solidFill>
+              </a:rPr>
+              <a:t>ConnectionFactory</a:t>
+            </a:r>
+            <a:r>
+              <a:rPr lang="pt-BR" dirty="0"/>
+              <a:t> </a:t>
+            </a:r>
+          </a:p>
+          <a:p>
+            <a:pPr marL="0" indent="0">
+              <a:buNone/>
+            </a:pPr>
+            <a:r>
+              <a:rPr lang="pt-BR" dirty="0">
+                <a:solidFill>
+                  <a:srgbClr val="999999"/>
+                </a:solidFill>
+              </a:rPr>
+              <a:t>	.</a:t>
+            </a:r>
+            <a:r>
+              <a:rPr lang="pt-BR" dirty="0" err="1"/>
+              <a:t>getConnection</a:t>
+            </a:r>
+            <a:r>
+              <a:rPr lang="pt-BR" dirty="0">
+                <a:solidFill>
+                  <a:srgbClr val="999999"/>
+                </a:solidFill>
+              </a:rPr>
+              <a:t>()</a:t>
+            </a:r>
+            <a:r>
+              <a:rPr lang="pt-BR" dirty="0"/>
+              <a:t> </a:t>
+            </a:r>
+          </a:p>
+          <a:p>
+            <a:pPr marL="457200" lvl="1" indent="0">
+              <a:buNone/>
+            </a:pPr>
+            <a:r>
+              <a:rPr lang="pt-BR" dirty="0">
+                <a:solidFill>
+                  <a:srgbClr val="999999"/>
+                </a:solidFill>
+              </a:rPr>
+              <a:t>	.</a:t>
+            </a:r>
+            <a:r>
+              <a:rPr lang="pt-BR" dirty="0" err="1">
+                <a:solidFill>
+                  <a:srgbClr val="0077AA"/>
+                </a:solidFill>
+              </a:rPr>
+              <a:t>then</a:t>
+            </a:r>
+            <a:r>
+              <a:rPr lang="pt-BR" dirty="0">
+                <a:solidFill>
+                  <a:srgbClr val="999999"/>
+                </a:solidFill>
+              </a:rPr>
+              <a:t>(</a:t>
+            </a:r>
+            <a:r>
+              <a:rPr lang="pt-BR" dirty="0"/>
+              <a:t>connection </a:t>
+            </a:r>
+            <a:r>
+              <a:rPr lang="pt-BR" dirty="0">
+                <a:solidFill>
+                  <a:srgbClr val="999999"/>
+                </a:solidFill>
+              </a:rPr>
+              <a:t>=&gt;</a:t>
+            </a:r>
+            <a:r>
+              <a:rPr lang="pt-BR" dirty="0"/>
+              <a:t> </a:t>
+            </a:r>
+            <a:r>
+              <a:rPr lang="pt-BR" dirty="0">
+                <a:solidFill>
+                  <a:srgbClr val="999999"/>
+                </a:solidFill>
+              </a:rPr>
+              <a:t>{</a:t>
+            </a:r>
+            <a:r>
+              <a:rPr lang="pt-BR" dirty="0"/>
+              <a:t> </a:t>
+            </a:r>
+          </a:p>
+          <a:p>
+            <a:pPr marL="457200" lvl="1" indent="0">
+              <a:buNone/>
+            </a:pPr>
+            <a:r>
+              <a:rPr lang="pt-BR" dirty="0">
+                <a:solidFill>
+                  <a:srgbClr val="999999"/>
+                </a:solidFill>
+              </a:rPr>
+              <a:t>});</a:t>
+            </a:r>
+            <a:r>
+              <a:rPr lang="pt-BR" dirty="0"/>
+              <a:t> </a:t>
+            </a:r>
+          </a:p>
+          <a:p>
+            <a:pPr marL="457200" lvl="1" indent="0">
+              <a:buNone/>
+            </a:pPr>
+            <a:endParaRPr lang="pt-BR" dirty="0">
+              <a:solidFill>
+                <a:srgbClr val="708090"/>
+              </a:solidFill>
+            </a:endParaRPr>
+          </a:p>
+          <a:p>
+            <a:pPr marL="457200" lvl="1" indent="0">
+              <a:buNone/>
+            </a:pPr>
+            <a:r>
+              <a:rPr lang="pt-BR" dirty="0">
+                <a:solidFill>
+                  <a:srgbClr val="708090"/>
+                </a:solidFill>
+              </a:rPr>
+              <a:t>// faz outras coisas e pede novamente a conexão</a:t>
+            </a:r>
+            <a:r>
+              <a:rPr lang="pt-BR" dirty="0"/>
+              <a:t> </a:t>
+            </a:r>
+          </a:p>
+          <a:p>
+            <a:pPr marL="457200" lvl="1" indent="0">
+              <a:buNone/>
+            </a:pPr>
+            <a:endParaRPr lang="pt-BR" sz="2800" dirty="0">
+              <a:solidFill>
+                <a:srgbClr val="A67F59"/>
+              </a:solidFill>
+            </a:endParaRPr>
+          </a:p>
+          <a:p>
+            <a:pPr marL="457200" lvl="1" indent="0">
+              <a:buNone/>
+            </a:pPr>
+            <a:r>
+              <a:rPr lang="pt-BR" sz="2800" dirty="0" err="1">
+                <a:solidFill>
+                  <a:srgbClr val="A67F59"/>
+                </a:solidFill>
+              </a:rPr>
+              <a:t>ConnectionFactory</a:t>
+            </a:r>
+            <a:r>
+              <a:rPr lang="pt-BR" sz="2800" dirty="0"/>
+              <a:t> </a:t>
+            </a:r>
+          </a:p>
+          <a:p>
+            <a:pPr marL="457200" lvl="1" indent="0">
+              <a:buNone/>
+            </a:pPr>
+            <a:r>
+              <a:rPr lang="pt-BR" sz="2800" dirty="0">
+                <a:solidFill>
+                  <a:srgbClr val="999999"/>
+                </a:solidFill>
+              </a:rPr>
+              <a:t>.</a:t>
+            </a:r>
+            <a:r>
+              <a:rPr lang="pt-BR" sz="2800" dirty="0" err="1"/>
+              <a:t>getConnection</a:t>
+            </a:r>
+            <a:r>
+              <a:rPr lang="pt-BR" sz="2800" dirty="0">
+                <a:solidFill>
+                  <a:srgbClr val="999999"/>
+                </a:solidFill>
+              </a:rPr>
+              <a:t>()</a:t>
+            </a:r>
+            <a:r>
+              <a:rPr lang="pt-BR" sz="2800" dirty="0"/>
+              <a:t> </a:t>
+            </a:r>
+          </a:p>
+          <a:p>
+            <a:pPr marL="457200" lvl="1" indent="0">
+              <a:buNone/>
+            </a:pPr>
+            <a:r>
+              <a:rPr lang="pt-BR" sz="2800" dirty="0">
+                <a:solidFill>
+                  <a:srgbClr val="999999"/>
+                </a:solidFill>
+              </a:rPr>
+              <a:t>.</a:t>
+            </a:r>
+            <a:r>
+              <a:rPr lang="pt-BR" sz="2800" dirty="0" err="1">
+                <a:solidFill>
+                  <a:srgbClr val="0077AA"/>
+                </a:solidFill>
+              </a:rPr>
+              <a:t>then</a:t>
+            </a:r>
+            <a:r>
+              <a:rPr lang="pt-BR" sz="2800" dirty="0">
+                <a:solidFill>
+                  <a:srgbClr val="999999"/>
+                </a:solidFill>
+              </a:rPr>
+              <a:t>(</a:t>
+            </a:r>
+            <a:r>
+              <a:rPr lang="pt-BR" sz="2800" dirty="0"/>
+              <a:t>connection </a:t>
+            </a:r>
+            <a:r>
+              <a:rPr lang="pt-BR" sz="2800" dirty="0">
+                <a:solidFill>
+                  <a:srgbClr val="999999"/>
+                </a:solidFill>
+              </a:rPr>
+              <a:t>=&gt;</a:t>
+            </a:r>
+            <a:r>
+              <a:rPr lang="pt-BR" sz="2800" dirty="0"/>
+              <a:t> </a:t>
+            </a:r>
+            <a:r>
+              <a:rPr lang="pt-BR" sz="2800" dirty="0">
+                <a:solidFill>
+                  <a:srgbClr val="999999"/>
+                </a:solidFill>
+              </a:rPr>
+              <a:t>{</a:t>
+            </a:r>
+            <a:r>
+              <a:rPr lang="pt-BR" sz="2800" dirty="0"/>
+              <a:t> </a:t>
+            </a:r>
+          </a:p>
+          <a:p>
+            <a:pPr marL="457200" lvl="1" indent="0">
+              <a:buNone/>
+            </a:pPr>
+            <a:r>
+              <a:rPr lang="pt-BR" sz="2800" dirty="0">
+                <a:solidFill>
+                  <a:srgbClr val="999999"/>
+                </a:solidFill>
+              </a:rPr>
+              <a:t>});</a:t>
+            </a:r>
+            <a:endParaRPr lang="pt-BR" sz="2800" dirty="0">
+              <a:solidFill>
+                <a:schemeClr val="accent5"/>
+              </a:solidFill>
+            </a:endParaRPr>
+          </a:p>
+        </p:txBody>
+      </p:sp>
+    </p:spTree>
+    <p:extLst>
+      <p:ext uri="{BB962C8B-B14F-4D97-AF65-F5344CB8AC3E}">
+        <p14:creationId xmlns:p14="http://schemas.microsoft.com/office/powerpoint/2010/main" val="1564479947"/>
+      </p:ext>
+    </p:extLst>
+  </p:cSld>
+  <p:clrMapOvr>
+    <a:masterClrMapping/>
+  </p:clrMapOvr>
+</p:sld>
+</file>
+
 <file path=ppt/slides/slide2.xml><?xml version="1.0" encoding="utf-8"?>
 <p:sld xmlns:a="http://schemas.openxmlformats.org/drawingml/2006/main" xmlns:r="http://schemas.openxmlformats.org/officeDocument/2006/relationships" xmlns:p="http://schemas.openxmlformats.org/presentationml/2006/main">
   <p:cSld>
@@ -3785,7 +4926,7 @@
         <p:spPr>
           <a:xfrm>
             <a:off x="293564" y="488161"/>
-            <a:ext cx="11371568" cy="6108582"/>
+            <a:ext cx="11371568" cy="5774853"/>
           </a:xfrm>
         </p:spPr>
         <p:txBody>
@@ -3794,157 +4935,170 @@
           </a:bodyPr>
           <a:lstStyle/>
           <a:p>
-            <a:r>
-              <a:rPr lang="pt-BR" sz="1600" dirty="0"/>
+            <a:pPr marL="342900" indent="-342900" algn="just">
+              <a:buFont typeface="Arial" panose="020B0604020202020204" pitchFamily="34" charset="0"/>
+              <a:buChar char="•"/>
+            </a:pPr>
+            <a:r>
+              <a:rPr lang="pt-BR" dirty="0"/>
               <a:t>Mas a solução fracassou, porque a </a:t>
             </a:r>
             <a:r>
-              <a:rPr lang="pt-BR" sz="1600" dirty="0" err="1"/>
+              <a:rPr lang="pt-BR" dirty="0" err="1"/>
               <a:t>function</a:t>
             </a:r>
             <a:r>
-              <a:rPr lang="pt-BR" sz="1600" dirty="0"/>
-              <a:t>() era enviada para o construtor do modelo que é a armadilha. Quando isso acontecia, o </a:t>
-            </a:r>
-            <a:r>
-              <a:rPr lang="pt-BR" sz="1600" dirty="0" err="1"/>
+              <a:rPr lang="pt-BR" dirty="0"/>
+              <a:t>() era enviada para o construtor do modelo que é a armadilha.</a:t>
+            </a:r>
+          </a:p>
+          <a:p>
+            <a:pPr marL="342900" indent="-342900" algn="just">
+              <a:buFont typeface="Arial" panose="020B0604020202020204" pitchFamily="34" charset="0"/>
+              <a:buChar char="•"/>
+            </a:pPr>
+            <a:r>
+              <a:rPr lang="pt-BR" dirty="0"/>
+              <a:t> Quando isso acontecia, o </a:t>
+            </a:r>
+            <a:r>
+              <a:rPr lang="pt-BR" dirty="0" err="1"/>
               <a:t>this</a:t>
             </a:r>
             <a:r>
-              <a:rPr lang="pt-BR" sz="1600" dirty="0"/>
+              <a:rPr lang="pt-BR" dirty="0"/>
               <a:t> era dinâmico, ou seja, não pertencia a controller, e sim, ao model. Então, tentamos acessar no </a:t>
             </a:r>
             <a:r>
-              <a:rPr lang="pt-BR" sz="1600" dirty="0" err="1"/>
+              <a:rPr lang="pt-BR" dirty="0" err="1"/>
               <a:t>this</a:t>
             </a:r>
             <a:r>
-              <a:rPr lang="pt-BR" sz="1600" dirty="0"/>
+              <a:rPr lang="pt-BR" dirty="0"/>
               <a:t> a nossa View. Vimos como fazer isto por meio da API de reflexão do </a:t>
             </a:r>
             <a:r>
-              <a:rPr lang="pt-BR" sz="1600" dirty="0" err="1"/>
+              <a:rPr lang="pt-BR" dirty="0" err="1"/>
               <a:t>JavaScript</a:t>
             </a:r>
             <a:r>
-              <a:rPr lang="pt-BR" sz="1600" dirty="0"/>
+              <a:rPr lang="pt-BR" dirty="0"/>
               <a:t>, </a:t>
             </a:r>
             <a:r>
-              <a:rPr lang="pt-BR" sz="1600" b="1" dirty="0" err="1"/>
+              <a:rPr lang="pt-BR" b="1" dirty="0" err="1"/>
               <a:t>Reflection</a:t>
             </a:r>
             <a:r>
-              <a:rPr lang="pt-BR" sz="1600" b="1" dirty="0"/>
+              <a:rPr lang="pt-BR" b="1" dirty="0"/>
               <a:t> API</a:t>
             </a:r>
             <a:r>
-              <a:rPr lang="pt-BR" sz="1600" dirty="0"/>
+              <a:rPr lang="pt-BR" dirty="0"/>
               <a:t>, usando </a:t>
             </a:r>
             <a:r>
-              <a:rPr lang="pt-BR" sz="1600" dirty="0" err="1"/>
+              <a:rPr lang="pt-BR" dirty="0" err="1"/>
               <a:t>reflect.apply</a:t>
             </a:r>
             <a:r>
-              <a:rPr lang="pt-BR" sz="1600" dirty="0"/>
+              <a:rPr lang="pt-BR" dirty="0"/>
               <a:t>(). Ela recebe o nome do método, o contexto em que queremos executar o método, além dos parâmetros que serão passados para o método para corrigir o </a:t>
             </a:r>
             <a:r>
-              <a:rPr lang="pt-BR" sz="1600" dirty="0" err="1"/>
+              <a:rPr lang="pt-BR" dirty="0" err="1"/>
               <a:t>this</a:t>
             </a:r>
             <a:r>
-              <a:rPr lang="pt-BR" sz="1600" dirty="0"/>
+              <a:rPr lang="pt-BR" dirty="0"/>
               <a:t> no momento da execução da função. Mas vimos que este processo não era necessário. Em vez disso, usamos uma </a:t>
             </a:r>
             <a:r>
-              <a:rPr lang="pt-BR" sz="1600" i="1" dirty="0" err="1"/>
+              <a:rPr lang="pt-BR" b="1" i="1" dirty="0" err="1"/>
               <a:t>arrow</a:t>
             </a:r>
             <a:r>
-              <a:rPr lang="pt-BR" sz="1600" i="1" dirty="0"/>
+              <a:rPr lang="pt-BR" b="1" i="1" dirty="0"/>
               <a:t> </a:t>
             </a:r>
             <a:r>
-              <a:rPr lang="pt-BR" sz="1600" i="1" dirty="0" err="1"/>
+              <a:rPr lang="pt-BR" b="1" i="1" dirty="0" err="1"/>
               <a:t>function</a:t>
             </a:r>
             <a:r>
-              <a:rPr lang="pt-BR" sz="1600" dirty="0"/>
+              <a:rPr lang="pt-BR" dirty="0"/>
               <a:t>.</a:t>
             </a:r>
           </a:p>
           <a:p>
-            <a:r>
-              <a:rPr lang="pt-BR" sz="1600" dirty="0"/>
-              <a:t>As </a:t>
-            </a:r>
-            <a:r>
-              <a:rPr lang="pt-BR" sz="1600" i="1" dirty="0" err="1"/>
+            <a:pPr marL="342900" indent="-342900" algn="just">
+              <a:buFont typeface="Arial" panose="020B0604020202020204" pitchFamily="34" charset="0"/>
+              <a:buChar char="•"/>
+            </a:pPr>
+            <a:r>
+              <a:rPr lang="pt-BR" dirty="0"/>
+              <a:t>As</a:t>
+            </a:r>
+            <a:r>
+              <a:rPr lang="pt-BR" b="1" dirty="0"/>
+              <a:t> </a:t>
+            </a:r>
+            <a:r>
+              <a:rPr lang="pt-BR" b="1" i="1" dirty="0" err="1"/>
               <a:t>arrow</a:t>
             </a:r>
             <a:r>
-              <a:rPr lang="pt-BR" sz="1600" i="1" dirty="0"/>
+              <a:rPr lang="pt-BR" b="1" i="1" dirty="0"/>
               <a:t> </a:t>
             </a:r>
             <a:r>
-              <a:rPr lang="pt-BR" sz="1600" i="1" dirty="0" err="1"/>
+              <a:rPr lang="pt-BR" b="1" i="1" dirty="0" err="1"/>
               <a:t>functions</a:t>
             </a:r>
             <a:r>
-              <a:rPr lang="pt-BR" sz="1600" dirty="0"/>
+              <a:rPr lang="pt-BR" dirty="0"/>
               <a:t> possuem um escopo léxico, enquanto as funções padrões têm um escopo dinâmico. Isto significa que, se temos uma função em </a:t>
             </a:r>
             <a:r>
-              <a:rPr lang="pt-BR" sz="1600" dirty="0" err="1"/>
+              <a:rPr lang="pt-BR" dirty="0" err="1"/>
               <a:t>JavaScript</a:t>
             </a:r>
             <a:r>
-              <a:rPr lang="pt-BR" sz="1600" dirty="0"/>
+              <a:rPr lang="pt-BR" dirty="0"/>
               <a:t> que varia de acordo com o contexto no qual é chamada, o </a:t>
             </a:r>
             <a:r>
-              <a:rPr lang="pt-BR" sz="1600" dirty="0" err="1"/>
+              <a:rPr lang="pt-BR" dirty="0" err="1"/>
               <a:t>this</a:t>
             </a:r>
             <a:r>
-              <a:rPr lang="pt-BR" sz="1600" dirty="0"/>
+              <a:rPr lang="pt-BR" dirty="0"/>
               <a:t> léxico de uma </a:t>
             </a:r>
             <a:r>
-              <a:rPr lang="pt-BR" sz="1600" i="1" dirty="0" err="1"/>
+              <a:rPr lang="pt-BR" i="1" dirty="0" err="1"/>
               <a:t>arrow</a:t>
             </a:r>
             <a:r>
-              <a:rPr lang="pt-BR" sz="1600" i="1" dirty="0"/>
+              <a:rPr lang="pt-BR" i="1" dirty="0"/>
               <a:t> </a:t>
             </a:r>
             <a:r>
-              <a:rPr lang="pt-BR" sz="1600" i="1" dirty="0" err="1"/>
+              <a:rPr lang="pt-BR" i="1" dirty="0" err="1"/>
               <a:t>function</a:t>
             </a:r>
             <a:r>
-              <a:rPr lang="pt-BR" sz="1600" dirty="0"/>
+              <a:rPr lang="pt-BR" dirty="0"/>
               <a:t> manterá o mesmo </a:t>
             </a:r>
             <a:r>
-              <a:rPr lang="pt-BR" sz="1600" dirty="0" err="1"/>
+              <a:rPr lang="pt-BR" dirty="0" err="1"/>
               <a:t>this</a:t>
             </a:r>
             <a:r>
-              <a:rPr lang="pt-BR" sz="1600" dirty="0"/>
+              <a:rPr lang="pt-BR" dirty="0"/>
               <a:t> em todas as chamadas da função. Isso torna o código mais enxuto, porque não precisarmos passar o contexto do construtor do modelo.</a:t>
             </a:r>
-          </a:p>
-          <a:p>
-            <a:r>
-              <a:rPr lang="pt-BR" sz="1600" dirty="0"/>
-              <a:t>Nos exercícios, você terá a chance de praticar o conteúdo trabalhado, mas vale ressaltar que poluir o modelo com esse código de infraestrutura não é uma boa ideia. Atacaremos tal questão na próxima seção do curso, e descobriremos como disparar atualizações na View sem colocar "armadilhas". No entanto, os conceitos abordados aqui já devem estar bem consolidados. Vamos praticar!</a:t>
-            </a:r>
-          </a:p>
-          <a:p>
-            <a:endParaRPr lang="pt-BR" sz="1600" dirty="0"/>
           </a:p>
         </p:txBody>
       </p:sp>

</xml_diff>

<commit_message>
Constantes e Monkey Patch
</commit_message>
<xml_diff>
--- a/docs/JS Avançado 1-2-3-resumo.pptx
+++ b/docs/JS Avançado 1-2-3-resumo.pptx
@@ -22,6 +22,13 @@
     <p:sldId id="272" r:id="rId16"/>
     <p:sldId id="273" r:id="rId17"/>
     <p:sldId id="274" r:id="rId18"/>
+    <p:sldId id="275" r:id="rId19"/>
+    <p:sldId id="276" r:id="rId20"/>
+    <p:sldId id="279" r:id="rId21"/>
+    <p:sldId id="280" r:id="rId22"/>
+    <p:sldId id="281" r:id="rId23"/>
+    <p:sldId id="277" r:id="rId24"/>
+    <p:sldId id="278" r:id="rId25"/>
   </p:sldIdLst>
   <p:sldSz cx="12192000" cy="6858000"/>
   <p:notesSz cx="6858000" cy="9144000"/>
@@ -257,7 +264,7 @@
           <a:p>
             <a:fld id="{CC58B075-67F8-4A8D-AE1C-3D3E4193EBCA}" type="datetimeFigureOut">
               <a:rPr lang="pt-BR" smtClean="0"/>
-              <a:t>05/05/19</a:t>
+              <a:t>06/05/2019</a:t>
             </a:fld>
             <a:endParaRPr lang="pt-BR"/>
           </a:p>
@@ -425,7 +432,7 @@
           <a:p>
             <a:fld id="{CC58B075-67F8-4A8D-AE1C-3D3E4193EBCA}" type="datetimeFigureOut">
               <a:rPr lang="pt-BR" smtClean="0"/>
-              <a:t>05/05/19</a:t>
+              <a:t>06/05/2019</a:t>
             </a:fld>
             <a:endParaRPr lang="pt-BR"/>
           </a:p>
@@ -603,7 +610,7 @@
           <a:p>
             <a:fld id="{CC58B075-67F8-4A8D-AE1C-3D3E4193EBCA}" type="datetimeFigureOut">
               <a:rPr lang="pt-BR" smtClean="0"/>
-              <a:t>05/05/19</a:t>
+              <a:t>06/05/2019</a:t>
             </a:fld>
             <a:endParaRPr lang="pt-BR"/>
           </a:p>
@@ -771,7 +778,7 @@
           <a:p>
             <a:fld id="{CC58B075-67F8-4A8D-AE1C-3D3E4193EBCA}" type="datetimeFigureOut">
               <a:rPr lang="pt-BR" smtClean="0"/>
-              <a:t>05/05/19</a:t>
+              <a:t>06/05/2019</a:t>
             </a:fld>
             <a:endParaRPr lang="pt-BR"/>
           </a:p>
@@ -1016,7 +1023,7 @@
           <a:p>
             <a:fld id="{CC58B075-67F8-4A8D-AE1C-3D3E4193EBCA}" type="datetimeFigureOut">
               <a:rPr lang="pt-BR" smtClean="0"/>
-              <a:t>05/05/19</a:t>
+              <a:t>06/05/2019</a:t>
             </a:fld>
             <a:endParaRPr lang="pt-BR"/>
           </a:p>
@@ -1245,7 +1252,7 @@
           <a:p>
             <a:fld id="{CC58B075-67F8-4A8D-AE1C-3D3E4193EBCA}" type="datetimeFigureOut">
               <a:rPr lang="pt-BR" smtClean="0"/>
-              <a:t>05/05/19</a:t>
+              <a:t>06/05/2019</a:t>
             </a:fld>
             <a:endParaRPr lang="pt-BR"/>
           </a:p>
@@ -1609,7 +1616,7 @@
           <a:p>
             <a:fld id="{CC58B075-67F8-4A8D-AE1C-3D3E4193EBCA}" type="datetimeFigureOut">
               <a:rPr lang="pt-BR" smtClean="0"/>
-              <a:t>05/05/19</a:t>
+              <a:t>06/05/2019</a:t>
             </a:fld>
             <a:endParaRPr lang="pt-BR"/>
           </a:p>
@@ -1726,7 +1733,7 @@
           <a:p>
             <a:fld id="{CC58B075-67F8-4A8D-AE1C-3D3E4193EBCA}" type="datetimeFigureOut">
               <a:rPr lang="pt-BR" smtClean="0"/>
-              <a:t>05/05/19</a:t>
+              <a:t>06/05/2019</a:t>
             </a:fld>
             <a:endParaRPr lang="pt-BR"/>
           </a:p>
@@ -1821,7 +1828,7 @@
           <a:p>
             <a:fld id="{CC58B075-67F8-4A8D-AE1C-3D3E4193EBCA}" type="datetimeFigureOut">
               <a:rPr lang="pt-BR" smtClean="0"/>
-              <a:t>05/05/19</a:t>
+              <a:t>06/05/2019</a:t>
             </a:fld>
             <a:endParaRPr lang="pt-BR"/>
           </a:p>
@@ -2096,7 +2103,7 @@
           <a:p>
             <a:fld id="{CC58B075-67F8-4A8D-AE1C-3D3E4193EBCA}" type="datetimeFigureOut">
               <a:rPr lang="pt-BR" smtClean="0"/>
-              <a:t>05/05/19</a:t>
+              <a:t>06/05/2019</a:t>
             </a:fld>
             <a:endParaRPr lang="pt-BR"/>
           </a:p>
@@ -2348,7 +2355,7 @@
           <a:p>
             <a:fld id="{CC58B075-67F8-4A8D-AE1C-3D3E4193EBCA}" type="datetimeFigureOut">
               <a:rPr lang="pt-BR" smtClean="0"/>
-              <a:t>05/05/19</a:t>
+              <a:t>06/05/2019</a:t>
             </a:fld>
             <a:endParaRPr lang="pt-BR"/>
           </a:p>
@@ -2559,7 +2566,7 @@
           <a:p>
             <a:fld id="{CC58B075-67F8-4A8D-AE1C-3D3E4193EBCA}" type="datetimeFigureOut">
               <a:rPr lang="pt-BR" smtClean="0"/>
-              <a:t>05/05/19</a:t>
+              <a:t>06/05/2019</a:t>
             </a:fld>
             <a:endParaRPr lang="pt-BR"/>
           </a:p>
@@ -3889,7 +3896,9 @@
           </a:xfrm>
         </p:spPr>
         <p:txBody>
-          <a:bodyPr/>
+          <a:bodyPr>
+            <a:normAutofit lnSpcReduction="10000"/>
+          </a:bodyPr>
           <a:lstStyle/>
           <a:p>
             <a:r>
@@ -4495,9 +4504,14 @@
           <a:p>
             <a:pPr algn="ctr"/>
             <a:r>
-              <a:rPr lang="pt-BR" sz="2800" b="1" dirty="0"/>
-              <a:t>Uma conexão ou várias</a:t>
-            </a:r>
+              <a:rPr lang="pt-BR" sz="2800" b="1" dirty="0" smtClean="0"/>
+              <a:t>Uma instância </a:t>
+            </a:r>
+            <a:r>
+              <a:rPr lang="pt-BR" sz="2800" b="1" dirty="0" err="1" smtClean="0"/>
+              <a:t>ConnectionFactory</a:t>
+            </a:r>
+            <a:endParaRPr lang="pt-BR" sz="2800" b="1" dirty="0"/>
           </a:p>
         </p:txBody>
       </p:sp>
@@ -4520,12 +4534,65 @@
         <p:spPr>
           <a:xfrm>
             <a:off x="563671" y="801666"/>
-            <a:ext cx="10790129" cy="5649238"/>
+            <a:ext cx="10790129" cy="936823"/>
           </a:xfrm>
         </p:spPr>
         <p:txBody>
           <a:bodyPr/>
           <a:lstStyle/>
+          <a:p>
+            <a:pPr marL="0" indent="0">
+              <a:buNone/>
+            </a:pPr>
+            <a:r>
+              <a:rPr lang="pt-BR" sz="2800" dirty="0" smtClean="0">
+                <a:solidFill>
+                  <a:schemeClr val="accent5"/>
+                </a:solidFill>
+              </a:rPr>
+              <a:t>Não permitindo criar instâncias a partir dela e que possui um método estático </a:t>
+            </a:r>
+            <a:r>
+              <a:rPr lang="pt-BR" sz="2800" dirty="0" err="1" smtClean="0">
+                <a:solidFill>
+                  <a:schemeClr val="accent5"/>
+                </a:solidFill>
+              </a:rPr>
+              <a:t>getConnection</a:t>
+            </a:r>
+            <a:r>
+              <a:rPr lang="pt-BR" dirty="0">
+                <a:solidFill>
+                  <a:schemeClr val="accent5"/>
+                </a:solidFill>
+              </a:rPr>
+              <a:t> </a:t>
+            </a:r>
+            <a:r>
+              <a:rPr lang="pt-BR" dirty="0" smtClean="0">
+                <a:solidFill>
+                  <a:schemeClr val="accent5"/>
+                </a:solidFill>
+              </a:rPr>
+              <a:t>cujo retorno é uma </a:t>
+            </a:r>
+            <a:r>
+              <a:rPr lang="pt-BR" dirty="0" err="1" smtClean="0">
+                <a:solidFill>
+                  <a:schemeClr val="accent5"/>
+                </a:solidFill>
+              </a:rPr>
+              <a:t>promise</a:t>
+            </a:r>
+            <a:r>
+              <a:rPr lang="pt-BR" dirty="0" smtClean="0">
+                <a:solidFill>
+                  <a:schemeClr val="accent5"/>
+                </a:solidFill>
+              </a:rPr>
+              <a:t>.</a:t>
+            </a:r>
+          </a:p>
           <a:p>
             <a:pPr marL="0" indent="0">
               <a:buNone/>
@@ -4536,12 +4603,1364 @@
               </a:solidFill>
             </a:endParaRPr>
           </a:p>
+          <a:p>
+            <a:pPr marL="0" indent="0">
+              <a:buNone/>
+            </a:pPr>
+            <a:endParaRPr lang="pt-BR" dirty="0" smtClean="0">
+              <a:solidFill>
+                <a:schemeClr val="accent5"/>
+              </a:solidFill>
+            </a:endParaRPr>
+          </a:p>
+          <a:p>
+            <a:pPr marL="0" indent="0">
+              <a:buNone/>
+            </a:pPr>
+            <a:endParaRPr lang="pt-BR" sz="2800" dirty="0">
+              <a:solidFill>
+                <a:schemeClr val="accent5"/>
+              </a:solidFill>
+            </a:endParaRPr>
+          </a:p>
+        </p:txBody>
+      </p:sp>
+      <p:sp>
+        <p:nvSpPr>
+          <p:cNvPr id="8" name="Espaço Reservado para Conteúdo 6">
+            <a:extLst>
+              <a:ext uri="{FF2B5EF4-FFF2-40B4-BE49-F238E27FC236}">
+                <a16:creationId xmlns:a16="http://schemas.microsoft.com/office/drawing/2014/main" id="{CBDD146F-E87E-0140-B521-E123E7DC95E8}"/>
+              </a:ext>
+            </a:extLst>
+          </p:cNvPr>
+          <p:cNvSpPr txBox="1">
+            <a:spLocks/>
+          </p:cNvSpPr>
+          <p:nvPr/>
+        </p:nvSpPr>
+        <p:spPr>
+          <a:xfrm>
+            <a:off x="1233309" y="1822306"/>
+            <a:ext cx="9491135" cy="3668734"/>
+          </a:xfrm>
+          <a:prstGeom prst="rect">
+            <a:avLst/>
+          </a:prstGeom>
+        </p:spPr>
+        <p:txBody>
+          <a:bodyPr vert="horz" lIns="91440" tIns="45720" rIns="91440" bIns="45720" rtlCol="0">
+            <a:normAutofit fontScale="25000" lnSpcReduction="20000"/>
+          </a:bodyPr>
+          <a:lstStyle>
+            <a:lvl1pPr marL="228600" indent="-228600" algn="l" defTabSz="914400" rtl="0" eaLnBrk="1" latinLnBrk="0" hangingPunct="1">
+              <a:lnSpc>
+                <a:spcPct val="90000"/>
+              </a:lnSpc>
+              <a:spcBef>
+                <a:spcPts val="1000"/>
+              </a:spcBef>
+              <a:buFont typeface="Arial" panose="020B0604020202020204" pitchFamily="34" charset="0"/>
+              <a:buChar char="•"/>
+              <a:defRPr sz="2800" kern="1200">
+                <a:solidFill>
+                  <a:schemeClr val="tx1"/>
+                </a:solidFill>
+                <a:latin typeface="+mn-lt"/>
+                <a:ea typeface="+mn-ea"/>
+                <a:cs typeface="+mn-cs"/>
+              </a:defRPr>
+            </a:lvl1pPr>
+            <a:lvl2pPr marL="685800" indent="-228600" algn="l" defTabSz="914400" rtl="0" eaLnBrk="1" latinLnBrk="0" hangingPunct="1">
+              <a:lnSpc>
+                <a:spcPct val="90000"/>
+              </a:lnSpc>
+              <a:spcBef>
+                <a:spcPts val="500"/>
+              </a:spcBef>
+              <a:buFont typeface="Arial" panose="020B0604020202020204" pitchFamily="34" charset="0"/>
+              <a:buChar char="•"/>
+              <a:defRPr sz="2400" kern="1200">
+                <a:solidFill>
+                  <a:schemeClr val="tx1"/>
+                </a:solidFill>
+                <a:latin typeface="+mn-lt"/>
+                <a:ea typeface="+mn-ea"/>
+                <a:cs typeface="+mn-cs"/>
+              </a:defRPr>
+            </a:lvl2pPr>
+            <a:lvl3pPr marL="1143000" indent="-228600" algn="l" defTabSz="914400" rtl="0" eaLnBrk="1" latinLnBrk="0" hangingPunct="1">
+              <a:lnSpc>
+                <a:spcPct val="90000"/>
+              </a:lnSpc>
+              <a:spcBef>
+                <a:spcPts val="500"/>
+              </a:spcBef>
+              <a:buFont typeface="Arial" panose="020B0604020202020204" pitchFamily="34" charset="0"/>
+              <a:buChar char="•"/>
+              <a:defRPr sz="2000" kern="1200">
+                <a:solidFill>
+                  <a:schemeClr val="tx1"/>
+                </a:solidFill>
+                <a:latin typeface="+mn-lt"/>
+                <a:ea typeface="+mn-ea"/>
+                <a:cs typeface="+mn-cs"/>
+              </a:defRPr>
+            </a:lvl3pPr>
+            <a:lvl4pPr marL="1600200" indent="-228600" algn="l" defTabSz="914400" rtl="0" eaLnBrk="1" latinLnBrk="0" hangingPunct="1">
+              <a:lnSpc>
+                <a:spcPct val="90000"/>
+              </a:lnSpc>
+              <a:spcBef>
+                <a:spcPts val="500"/>
+              </a:spcBef>
+              <a:buFont typeface="Arial" panose="020B0604020202020204" pitchFamily="34" charset="0"/>
+              <a:buChar char="•"/>
+              <a:defRPr sz="1800" kern="1200">
+                <a:solidFill>
+                  <a:schemeClr val="tx1"/>
+                </a:solidFill>
+                <a:latin typeface="+mn-lt"/>
+                <a:ea typeface="+mn-ea"/>
+                <a:cs typeface="+mn-cs"/>
+              </a:defRPr>
+            </a:lvl4pPr>
+            <a:lvl5pPr marL="2057400" indent="-228600" algn="l" defTabSz="914400" rtl="0" eaLnBrk="1" latinLnBrk="0" hangingPunct="1">
+              <a:lnSpc>
+                <a:spcPct val="90000"/>
+              </a:lnSpc>
+              <a:spcBef>
+                <a:spcPts val="500"/>
+              </a:spcBef>
+              <a:buFont typeface="Arial" panose="020B0604020202020204" pitchFamily="34" charset="0"/>
+              <a:buChar char="•"/>
+              <a:defRPr sz="1800" kern="1200">
+                <a:solidFill>
+                  <a:schemeClr val="tx1"/>
+                </a:solidFill>
+                <a:latin typeface="+mn-lt"/>
+                <a:ea typeface="+mn-ea"/>
+                <a:cs typeface="+mn-cs"/>
+              </a:defRPr>
+            </a:lvl5pPr>
+            <a:lvl6pPr marL="2514600" indent="-228600" algn="l" defTabSz="914400" rtl="0" eaLnBrk="1" latinLnBrk="0" hangingPunct="1">
+              <a:lnSpc>
+                <a:spcPct val="90000"/>
+              </a:lnSpc>
+              <a:spcBef>
+                <a:spcPts val="500"/>
+              </a:spcBef>
+              <a:buFont typeface="Arial" panose="020B0604020202020204" pitchFamily="34" charset="0"/>
+              <a:buChar char="•"/>
+              <a:defRPr sz="1800" kern="1200">
+                <a:solidFill>
+                  <a:schemeClr val="tx1"/>
+                </a:solidFill>
+                <a:latin typeface="+mn-lt"/>
+                <a:ea typeface="+mn-ea"/>
+                <a:cs typeface="+mn-cs"/>
+              </a:defRPr>
+            </a:lvl6pPr>
+            <a:lvl7pPr marL="2971800" indent="-228600" algn="l" defTabSz="914400" rtl="0" eaLnBrk="1" latinLnBrk="0" hangingPunct="1">
+              <a:lnSpc>
+                <a:spcPct val="90000"/>
+              </a:lnSpc>
+              <a:spcBef>
+                <a:spcPts val="500"/>
+              </a:spcBef>
+              <a:buFont typeface="Arial" panose="020B0604020202020204" pitchFamily="34" charset="0"/>
+              <a:buChar char="•"/>
+              <a:defRPr sz="1800" kern="1200">
+                <a:solidFill>
+                  <a:schemeClr val="tx1"/>
+                </a:solidFill>
+                <a:latin typeface="+mn-lt"/>
+                <a:ea typeface="+mn-ea"/>
+                <a:cs typeface="+mn-cs"/>
+              </a:defRPr>
+            </a:lvl7pPr>
+            <a:lvl8pPr marL="3429000" indent="-228600" algn="l" defTabSz="914400" rtl="0" eaLnBrk="1" latinLnBrk="0" hangingPunct="1">
+              <a:lnSpc>
+                <a:spcPct val="90000"/>
+              </a:lnSpc>
+              <a:spcBef>
+                <a:spcPts val="500"/>
+              </a:spcBef>
+              <a:buFont typeface="Arial" panose="020B0604020202020204" pitchFamily="34" charset="0"/>
+              <a:buChar char="•"/>
+              <a:defRPr sz="1800" kern="1200">
+                <a:solidFill>
+                  <a:schemeClr val="tx1"/>
+                </a:solidFill>
+                <a:latin typeface="+mn-lt"/>
+                <a:ea typeface="+mn-ea"/>
+                <a:cs typeface="+mn-cs"/>
+              </a:defRPr>
+            </a:lvl8pPr>
+            <a:lvl9pPr marL="3886200" indent="-228600" algn="l" defTabSz="914400" rtl="0" eaLnBrk="1" latinLnBrk="0" hangingPunct="1">
+              <a:lnSpc>
+                <a:spcPct val="90000"/>
+              </a:lnSpc>
+              <a:spcBef>
+                <a:spcPts val="500"/>
+              </a:spcBef>
+              <a:buFont typeface="Arial" panose="020B0604020202020204" pitchFamily="34" charset="0"/>
+              <a:buChar char="•"/>
+              <a:defRPr sz="1800" kern="1200">
+                <a:solidFill>
+                  <a:schemeClr val="tx1"/>
+                </a:solidFill>
+                <a:latin typeface="+mn-lt"/>
+                <a:ea typeface="+mn-ea"/>
+                <a:cs typeface="+mn-cs"/>
+              </a:defRPr>
+            </a:lvl9pPr>
+          </a:lstStyle>
+          <a:p>
+            <a:pPr marL="0" indent="0">
+              <a:buNone/>
+            </a:pPr>
+            <a:r>
+              <a:rPr lang="pt-BR" sz="7200" dirty="0" err="1"/>
+              <a:t>class</a:t>
+            </a:r>
+            <a:r>
+              <a:rPr lang="pt-BR" sz="7200" dirty="0"/>
+              <a:t> </a:t>
+            </a:r>
+            <a:r>
+              <a:rPr lang="pt-BR" sz="7200" dirty="0" err="1"/>
+              <a:t>ConnectionFactory</a:t>
+            </a:r>
+            <a:r>
+              <a:rPr lang="pt-BR" sz="7200" dirty="0"/>
+              <a:t> {</a:t>
+            </a:r>
+          </a:p>
+          <a:p>
+            <a:pPr marL="0" indent="0">
+              <a:buNone/>
+            </a:pPr>
+            <a:endParaRPr lang="pt-BR" sz="7200" dirty="0"/>
+          </a:p>
+          <a:p>
+            <a:pPr marL="0" indent="0">
+              <a:buNone/>
+            </a:pPr>
+            <a:r>
+              <a:rPr lang="pt-BR" sz="7200" dirty="0"/>
+              <a:t>    </a:t>
+            </a:r>
+            <a:r>
+              <a:rPr lang="pt-BR" sz="7200" dirty="0" err="1"/>
+              <a:t>constructor</a:t>
+            </a:r>
+            <a:r>
+              <a:rPr lang="pt-BR" sz="7200" dirty="0"/>
+              <a:t>() {</a:t>
+            </a:r>
+          </a:p>
+          <a:p>
+            <a:pPr marL="0" indent="0">
+              <a:buNone/>
+            </a:pPr>
+            <a:r>
+              <a:rPr lang="pt-BR" sz="7200" dirty="0" smtClean="0"/>
+              <a:t>        </a:t>
+            </a:r>
+            <a:r>
+              <a:rPr lang="pt-BR" sz="7200" dirty="0" err="1"/>
+              <a:t>throw</a:t>
+            </a:r>
+            <a:r>
+              <a:rPr lang="pt-BR" sz="7200" dirty="0"/>
+              <a:t> new </a:t>
+            </a:r>
+            <a:r>
+              <a:rPr lang="pt-BR" sz="7200" dirty="0" err="1"/>
+              <a:t>Error</a:t>
+            </a:r>
+            <a:r>
+              <a:rPr lang="pt-BR" sz="7200" dirty="0"/>
+              <a:t>("</a:t>
+            </a:r>
+            <a:r>
+              <a:rPr lang="pt-BR" sz="7200" dirty="0" err="1"/>
+              <a:t>ConnectionFactory</a:t>
+            </a:r>
+            <a:r>
+              <a:rPr lang="pt-BR" sz="7200" dirty="0"/>
+              <a:t> não pode ser instanciada");</a:t>
+            </a:r>
+          </a:p>
+          <a:p>
+            <a:pPr marL="0" indent="0">
+              <a:buNone/>
+            </a:pPr>
+            <a:r>
+              <a:rPr lang="pt-BR" sz="7200" dirty="0"/>
+              <a:t>    }</a:t>
+            </a:r>
+          </a:p>
+          <a:p>
+            <a:pPr marL="0" indent="0">
+              <a:buNone/>
+            </a:pPr>
+            <a:endParaRPr lang="pt-BR" sz="7200" dirty="0"/>
+          </a:p>
+          <a:p>
+            <a:pPr marL="0" indent="0">
+              <a:buNone/>
+            </a:pPr>
+            <a:r>
+              <a:rPr lang="pt-BR" sz="7200" dirty="0"/>
+              <a:t>    </a:t>
+            </a:r>
+            <a:r>
+              <a:rPr lang="pt-BR" sz="7200" dirty="0" err="1"/>
+              <a:t>static</a:t>
+            </a:r>
+            <a:r>
+              <a:rPr lang="pt-BR" sz="7200" dirty="0"/>
+              <a:t> </a:t>
+            </a:r>
+            <a:r>
+              <a:rPr lang="pt-BR" sz="7200" dirty="0" err="1"/>
+              <a:t>getConnection</a:t>
+            </a:r>
+            <a:r>
+              <a:rPr lang="pt-BR" sz="7200" dirty="0"/>
+              <a:t>() {</a:t>
+            </a:r>
+          </a:p>
+          <a:p>
+            <a:pPr marL="0" indent="0">
+              <a:buNone/>
+            </a:pPr>
+            <a:r>
+              <a:rPr lang="pt-BR" sz="7200" dirty="0" smtClean="0"/>
+              <a:t>        </a:t>
+            </a:r>
+            <a:r>
+              <a:rPr lang="pt-BR" sz="7200" dirty="0" err="1"/>
+              <a:t>return</a:t>
+            </a:r>
+            <a:r>
+              <a:rPr lang="pt-BR" sz="7200" dirty="0"/>
+              <a:t> new </a:t>
+            </a:r>
+            <a:r>
+              <a:rPr lang="pt-BR" sz="7200" dirty="0" err="1"/>
+              <a:t>Promise</a:t>
+            </a:r>
+            <a:r>
+              <a:rPr lang="pt-BR" sz="7200" dirty="0"/>
+              <a:t>((resolve, </a:t>
+            </a:r>
+            <a:r>
+              <a:rPr lang="pt-BR" sz="7200" dirty="0" err="1"/>
+              <a:t>reject</a:t>
+            </a:r>
+            <a:r>
+              <a:rPr lang="pt-BR" sz="7200" dirty="0"/>
+              <a:t>) =&gt; </a:t>
+            </a:r>
+            <a:r>
+              <a:rPr lang="pt-BR" sz="7200" dirty="0" smtClean="0"/>
+              <a:t>{  ...</a:t>
+            </a:r>
+            <a:endParaRPr lang="pt-BR" sz="7200" dirty="0"/>
+          </a:p>
+          <a:p>
+            <a:pPr marL="0" indent="0">
+              <a:buNone/>
+            </a:pPr>
+            <a:r>
+              <a:rPr lang="pt-BR" sz="7200" dirty="0" smtClean="0"/>
+              <a:t>	        </a:t>
+            </a:r>
+            <a:r>
+              <a:rPr lang="pt-BR" sz="7200" dirty="0"/>
+              <a:t>});</a:t>
+            </a:r>
+          </a:p>
+          <a:p>
+            <a:pPr marL="0" indent="0">
+              <a:buNone/>
+            </a:pPr>
+            <a:r>
+              <a:rPr lang="pt-BR" sz="7200" dirty="0"/>
+              <a:t>    }</a:t>
+            </a:r>
+          </a:p>
+          <a:p>
+            <a:pPr marL="0" indent="0">
+              <a:buNone/>
+            </a:pPr>
+            <a:r>
+              <a:rPr lang="pt-BR" sz="7200" dirty="0"/>
+              <a:t>}</a:t>
+            </a:r>
+            <a:endParaRPr lang="pt-BR" sz="7200" dirty="0" smtClean="0"/>
+          </a:p>
+          <a:p>
+            <a:pPr marL="0" indent="0">
+              <a:buFont typeface="Arial" panose="020B0604020202020204" pitchFamily="34" charset="0"/>
+              <a:buNone/>
+            </a:pPr>
+            <a:endParaRPr lang="pt-BR" sz="7200" dirty="0" smtClean="0"/>
+          </a:p>
+          <a:p>
+            <a:pPr marL="0" indent="0">
+              <a:buFont typeface="Arial" panose="020B0604020202020204" pitchFamily="34" charset="0"/>
+              <a:buNone/>
+            </a:pPr>
+            <a:endParaRPr lang="pt-BR" dirty="0"/>
+          </a:p>
         </p:txBody>
       </p:sp>
     </p:spTree>
     <p:extLst>
       <p:ext uri="{BB962C8B-B14F-4D97-AF65-F5344CB8AC3E}">
         <p14:creationId xmlns:p14="http://schemas.microsoft.com/office/powerpoint/2010/main" val="2315279440"/>
+      </p:ext>
+    </p:extLst>
+  </p:cSld>
+  <p:clrMapOvr>
+    <a:masterClrMapping/>
+  </p:clrMapOvr>
+</p:sld>
+</file>
+
+<file path=ppt/slides/slide18.xml><?xml version="1.0" encoding="utf-8"?>
+<p:sld xmlns:a="http://schemas.openxmlformats.org/drawingml/2006/main" xmlns:r="http://schemas.openxmlformats.org/officeDocument/2006/relationships" xmlns:p="http://schemas.openxmlformats.org/presentationml/2006/main">
+  <p:cSld>
+    <p:spTree>
+      <p:nvGrpSpPr>
+        <p:cNvPr id="1" name=""/>
+        <p:cNvGrpSpPr/>
+        <p:nvPr/>
+      </p:nvGrpSpPr>
+      <p:grpSpPr>
+        <a:xfrm>
+          <a:off x="0" y="0"/>
+          <a:ext cx="0" cy="0"/>
+          <a:chOff x="0" y="0"/>
+          <a:chExt cx="0" cy="0"/>
+        </a:xfrm>
+      </p:grpSpPr>
+      <p:sp>
+        <p:nvSpPr>
+          <p:cNvPr id="2" name="Título 1"/>
+          <p:cNvSpPr>
+            <a:spLocks noGrp="1"/>
+          </p:cNvSpPr>
+          <p:nvPr>
+            <p:ph type="title"/>
+          </p:nvPr>
+        </p:nvSpPr>
+        <p:spPr>
+          <a:xfrm>
+            <a:off x="759177" y="89552"/>
+            <a:ext cx="10515600" cy="549275"/>
+          </a:xfrm>
+        </p:spPr>
+        <p:txBody>
+          <a:bodyPr>
+            <a:normAutofit/>
+          </a:bodyPr>
+          <a:lstStyle/>
+          <a:p>
+            <a:pPr algn="ctr"/>
+            <a:r>
+              <a:rPr lang="pt-BR" sz="2800" b="1" dirty="0" smtClean="0"/>
+              <a:t>Module </a:t>
+            </a:r>
+            <a:r>
+              <a:rPr lang="pt-BR" sz="2800" b="1" dirty="0" err="1" smtClean="0"/>
+              <a:t>Pattern</a:t>
+            </a:r>
+            <a:endParaRPr lang="pt-BR" sz="2800" b="1" dirty="0"/>
+          </a:p>
+        </p:txBody>
+      </p:sp>
+      <p:pic>
+        <p:nvPicPr>
+          <p:cNvPr id="4" name="Imagem 3"/>
+          <p:cNvPicPr>
+            <a:picLocks noChangeAspect="1"/>
+          </p:cNvPicPr>
+          <p:nvPr/>
+        </p:nvPicPr>
+        <p:blipFill>
+          <a:blip r:embed="rId2"/>
+          <a:stretch>
+            <a:fillRect/>
+          </a:stretch>
+        </p:blipFill>
+        <p:spPr>
+          <a:xfrm>
+            <a:off x="487714" y="689680"/>
+            <a:ext cx="4962525" cy="2724150"/>
+          </a:xfrm>
+          <a:prstGeom prst="rect">
+            <a:avLst/>
+          </a:prstGeom>
+        </p:spPr>
+      </p:pic>
+      <p:pic>
+        <p:nvPicPr>
+          <p:cNvPr id="5" name="Imagem 4"/>
+          <p:cNvPicPr>
+            <a:picLocks noChangeAspect="1"/>
+          </p:cNvPicPr>
+          <p:nvPr/>
+        </p:nvPicPr>
+        <p:blipFill>
+          <a:blip r:embed="rId3"/>
+          <a:stretch>
+            <a:fillRect/>
+          </a:stretch>
+        </p:blipFill>
+        <p:spPr>
+          <a:xfrm>
+            <a:off x="6690254" y="768703"/>
+            <a:ext cx="4772025" cy="5981700"/>
+          </a:xfrm>
+          <a:prstGeom prst="rect">
+            <a:avLst/>
+          </a:prstGeom>
+        </p:spPr>
+      </p:pic>
+    </p:spTree>
+    <p:extLst>
+      <p:ext uri="{BB962C8B-B14F-4D97-AF65-F5344CB8AC3E}">
+        <p14:creationId xmlns:p14="http://schemas.microsoft.com/office/powerpoint/2010/main" val="1460323876"/>
+      </p:ext>
+    </p:extLst>
+  </p:cSld>
+  <p:clrMapOvr>
+    <a:masterClrMapping/>
+  </p:clrMapOvr>
+</p:sld>
+</file>
+
+<file path=ppt/slides/slide19.xml><?xml version="1.0" encoding="utf-8"?>
+<p:sld xmlns:a="http://schemas.openxmlformats.org/drawingml/2006/main" xmlns:r="http://schemas.openxmlformats.org/officeDocument/2006/relationships" xmlns:p="http://schemas.openxmlformats.org/presentationml/2006/main">
+  <p:cSld>
+    <p:spTree>
+      <p:nvGrpSpPr>
+        <p:cNvPr id="1" name=""/>
+        <p:cNvGrpSpPr/>
+        <p:nvPr/>
+      </p:nvGrpSpPr>
+      <p:grpSpPr>
+        <a:xfrm>
+          <a:off x="0" y="0"/>
+          <a:ext cx="0" cy="0"/>
+          <a:chOff x="0" y="0"/>
+          <a:chExt cx="0" cy="0"/>
+        </a:xfrm>
+      </p:grpSpPr>
+      <p:sp>
+        <p:nvSpPr>
+          <p:cNvPr id="2" name="Título 1"/>
+          <p:cNvSpPr>
+            <a:spLocks noGrp="1"/>
+          </p:cNvSpPr>
+          <p:nvPr>
+            <p:ph type="title"/>
+          </p:nvPr>
+        </p:nvSpPr>
+        <p:spPr>
+          <a:xfrm>
+            <a:off x="838200" y="161925"/>
+            <a:ext cx="10515600" cy="492831"/>
+          </a:xfrm>
+        </p:spPr>
+        <p:txBody>
+          <a:bodyPr>
+            <a:normAutofit/>
+          </a:bodyPr>
+          <a:lstStyle/>
+          <a:p>
+            <a:pPr algn="ctr"/>
+            <a:r>
+              <a:rPr lang="pt-BR" sz="2800" dirty="0" smtClean="0"/>
+              <a:t>Método </a:t>
+            </a:r>
+            <a:r>
+              <a:rPr lang="pt-BR" sz="2800" dirty="0" err="1" smtClean="0"/>
+              <a:t>getConnection</a:t>
+            </a:r>
+            <a:endParaRPr lang="pt-BR" sz="2800" dirty="0"/>
+          </a:p>
+        </p:txBody>
+      </p:sp>
+      <p:sp>
+        <p:nvSpPr>
+          <p:cNvPr id="3" name="Espaço Reservado para Conteúdo 2"/>
+          <p:cNvSpPr>
+            <a:spLocks noGrp="1"/>
+          </p:cNvSpPr>
+          <p:nvPr>
+            <p:ph idx="1"/>
+          </p:nvPr>
+        </p:nvSpPr>
+        <p:spPr>
+          <a:xfrm>
+            <a:off x="544689" y="654756"/>
+            <a:ext cx="10461978" cy="6062133"/>
+          </a:xfrm>
+        </p:spPr>
+        <p:txBody>
+          <a:bodyPr>
+            <a:noAutofit/>
+          </a:bodyPr>
+          <a:lstStyle/>
+          <a:p>
+            <a:pPr marL="0" indent="0">
+              <a:buNone/>
+            </a:pPr>
+            <a:r>
+              <a:rPr lang="pt-BR" sz="1400" dirty="0" err="1">
+                <a:solidFill>
+                  <a:schemeClr val="accent5"/>
+                </a:solidFill>
+              </a:rPr>
+              <a:t>class</a:t>
+            </a:r>
+            <a:r>
+              <a:rPr lang="pt-BR" sz="1400" dirty="0">
+                <a:solidFill>
+                  <a:schemeClr val="accent5"/>
+                </a:solidFill>
+              </a:rPr>
+              <a:t> </a:t>
+            </a:r>
+            <a:r>
+              <a:rPr lang="pt-BR" sz="1400" b="1" dirty="0" err="1">
+                <a:solidFill>
+                  <a:schemeClr val="accent5"/>
+                </a:solidFill>
+              </a:rPr>
+              <a:t>ConnectionFactory</a:t>
+            </a:r>
+            <a:r>
+              <a:rPr lang="pt-BR" sz="1400" dirty="0">
+                <a:solidFill>
+                  <a:schemeClr val="accent5"/>
+                </a:solidFill>
+              </a:rPr>
+              <a:t> {</a:t>
+            </a:r>
+          </a:p>
+          <a:p>
+            <a:pPr marL="0" indent="0">
+              <a:buNone/>
+            </a:pPr>
+            <a:r>
+              <a:rPr lang="pt-BR" sz="1400" dirty="0" smtClean="0">
+                <a:solidFill>
+                  <a:schemeClr val="accent5"/>
+                </a:solidFill>
+              </a:rPr>
+              <a:t>    </a:t>
+            </a:r>
+            <a:r>
+              <a:rPr lang="pt-BR" sz="1400" dirty="0" err="1">
+                <a:solidFill>
+                  <a:schemeClr val="accent5"/>
+                </a:solidFill>
+              </a:rPr>
+              <a:t>constructor</a:t>
+            </a:r>
+            <a:r>
+              <a:rPr lang="pt-BR" sz="1400" dirty="0">
+                <a:solidFill>
+                  <a:schemeClr val="accent5"/>
+                </a:solidFill>
+              </a:rPr>
+              <a:t>() {</a:t>
+            </a:r>
+          </a:p>
+          <a:p>
+            <a:pPr marL="0" indent="0">
+              <a:buNone/>
+            </a:pPr>
+            <a:r>
+              <a:rPr lang="pt-BR" sz="1400" dirty="0" smtClean="0">
+                <a:solidFill>
+                  <a:schemeClr val="accent5"/>
+                </a:solidFill>
+              </a:rPr>
+              <a:t>       </a:t>
+            </a:r>
+            <a:r>
+              <a:rPr lang="pt-BR" sz="1400" dirty="0" smtClean="0">
+                <a:solidFill>
+                  <a:schemeClr val="accent2"/>
+                </a:solidFill>
+              </a:rPr>
+              <a:t> </a:t>
+            </a:r>
+            <a:r>
+              <a:rPr lang="pt-BR" sz="1400" dirty="0" err="1">
+                <a:solidFill>
+                  <a:schemeClr val="accent2"/>
+                </a:solidFill>
+              </a:rPr>
+              <a:t>throw</a:t>
+            </a:r>
+            <a:r>
+              <a:rPr lang="pt-BR" sz="1400" dirty="0">
+                <a:solidFill>
+                  <a:schemeClr val="accent2"/>
+                </a:solidFill>
+              </a:rPr>
+              <a:t> new </a:t>
+            </a:r>
+            <a:r>
+              <a:rPr lang="pt-BR" sz="1400" dirty="0" err="1">
+                <a:solidFill>
+                  <a:schemeClr val="accent2"/>
+                </a:solidFill>
+              </a:rPr>
+              <a:t>Error</a:t>
+            </a:r>
+            <a:r>
+              <a:rPr lang="pt-BR" sz="1400" dirty="0">
+                <a:solidFill>
+                  <a:schemeClr val="accent2"/>
+                </a:solidFill>
+              </a:rPr>
+              <a:t>("</a:t>
+            </a:r>
+            <a:r>
+              <a:rPr lang="pt-BR" sz="1400" dirty="0" err="1">
+                <a:solidFill>
+                  <a:schemeClr val="accent2"/>
+                </a:solidFill>
+              </a:rPr>
+              <a:t>ConnectionFactory</a:t>
+            </a:r>
+            <a:r>
+              <a:rPr lang="pt-BR" sz="1400" dirty="0">
+                <a:solidFill>
+                  <a:schemeClr val="accent2"/>
+                </a:solidFill>
+              </a:rPr>
+              <a:t> não pode ser instanciada");</a:t>
+            </a:r>
+          </a:p>
+          <a:p>
+            <a:pPr marL="0" indent="0">
+              <a:buNone/>
+            </a:pPr>
+            <a:r>
+              <a:rPr lang="pt-BR" sz="1400" dirty="0">
+                <a:solidFill>
+                  <a:schemeClr val="accent5"/>
+                </a:solidFill>
+              </a:rPr>
+              <a:t>    }</a:t>
+            </a:r>
+          </a:p>
+          <a:p>
+            <a:pPr marL="0" indent="0">
+              <a:buNone/>
+            </a:pPr>
+            <a:endParaRPr lang="pt-BR" sz="1400" dirty="0">
+              <a:solidFill>
+                <a:schemeClr val="accent5"/>
+              </a:solidFill>
+            </a:endParaRPr>
+          </a:p>
+          <a:p>
+            <a:pPr marL="0" indent="0">
+              <a:buNone/>
+            </a:pPr>
+            <a:r>
+              <a:rPr lang="pt-BR" sz="1400" dirty="0">
+                <a:solidFill>
+                  <a:schemeClr val="accent5"/>
+                </a:solidFill>
+              </a:rPr>
+              <a:t>    </a:t>
+            </a:r>
+            <a:r>
+              <a:rPr lang="pt-BR" sz="1400" dirty="0" err="1">
+                <a:solidFill>
+                  <a:schemeClr val="accent5"/>
+                </a:solidFill>
+              </a:rPr>
+              <a:t>static</a:t>
+            </a:r>
+            <a:r>
+              <a:rPr lang="pt-BR" sz="1400" dirty="0">
+                <a:solidFill>
+                  <a:schemeClr val="accent5"/>
+                </a:solidFill>
+              </a:rPr>
+              <a:t> </a:t>
+            </a:r>
+            <a:r>
+              <a:rPr lang="pt-BR" sz="1400" b="1" dirty="0" err="1">
+                <a:solidFill>
+                  <a:schemeClr val="accent5"/>
+                </a:solidFill>
+              </a:rPr>
+              <a:t>getConnection</a:t>
+            </a:r>
+            <a:r>
+              <a:rPr lang="pt-BR" sz="1400" dirty="0">
+                <a:solidFill>
+                  <a:schemeClr val="accent5"/>
+                </a:solidFill>
+              </a:rPr>
+              <a:t>() {</a:t>
+            </a:r>
+          </a:p>
+          <a:p>
+            <a:pPr marL="0" indent="0">
+              <a:buNone/>
+            </a:pPr>
+            <a:r>
+              <a:rPr lang="pt-BR" sz="1400" dirty="0" smtClean="0">
+                <a:solidFill>
+                  <a:schemeClr val="accent2"/>
+                </a:solidFill>
+              </a:rPr>
+              <a:t>        </a:t>
+            </a:r>
+            <a:r>
+              <a:rPr lang="pt-BR" sz="1400" dirty="0" err="1">
+                <a:solidFill>
+                  <a:schemeClr val="accent2"/>
+                </a:solidFill>
+              </a:rPr>
+              <a:t>return</a:t>
+            </a:r>
+            <a:r>
+              <a:rPr lang="pt-BR" sz="1400" dirty="0">
+                <a:solidFill>
+                  <a:schemeClr val="accent2"/>
+                </a:solidFill>
+              </a:rPr>
+              <a:t> new </a:t>
+            </a:r>
+            <a:r>
+              <a:rPr lang="pt-BR" sz="1400" dirty="0" err="1">
+                <a:solidFill>
+                  <a:schemeClr val="accent2"/>
+                </a:solidFill>
+              </a:rPr>
+              <a:t>Promise</a:t>
+            </a:r>
+            <a:r>
+              <a:rPr lang="pt-BR" sz="1400" dirty="0">
+                <a:solidFill>
+                  <a:schemeClr val="accent2"/>
+                </a:solidFill>
+              </a:rPr>
+              <a:t>((resolve, </a:t>
+            </a:r>
+            <a:r>
+              <a:rPr lang="pt-BR" sz="1400" dirty="0" err="1">
+                <a:solidFill>
+                  <a:schemeClr val="accent2"/>
+                </a:solidFill>
+              </a:rPr>
+              <a:t>reject</a:t>
+            </a:r>
+            <a:r>
+              <a:rPr lang="pt-BR" sz="1400" dirty="0">
+                <a:solidFill>
+                  <a:schemeClr val="accent2"/>
+                </a:solidFill>
+              </a:rPr>
+              <a:t>) =&gt; {</a:t>
+            </a:r>
+          </a:p>
+          <a:p>
+            <a:pPr marL="0" indent="0">
+              <a:buNone/>
+            </a:pPr>
+            <a:r>
+              <a:rPr lang="pt-BR" sz="1400" dirty="0" smtClean="0">
+                <a:solidFill>
+                  <a:schemeClr val="accent2"/>
+                </a:solidFill>
+              </a:rPr>
+              <a:t>            </a:t>
+            </a:r>
+            <a:r>
+              <a:rPr lang="pt-BR" sz="1400" dirty="0" err="1">
+                <a:solidFill>
+                  <a:schemeClr val="accent2"/>
+                </a:solidFill>
+              </a:rPr>
+              <a:t>let</a:t>
+            </a:r>
+            <a:r>
+              <a:rPr lang="pt-BR" sz="1400" dirty="0">
+                <a:solidFill>
+                  <a:schemeClr val="accent2"/>
+                </a:solidFill>
+              </a:rPr>
+              <a:t> </a:t>
+            </a:r>
+            <a:r>
+              <a:rPr lang="pt-BR" sz="1400" dirty="0" err="1">
+                <a:solidFill>
+                  <a:schemeClr val="accent2"/>
+                </a:solidFill>
+              </a:rPr>
+              <a:t>openRequest</a:t>
+            </a:r>
+            <a:r>
+              <a:rPr lang="pt-BR" sz="1400" dirty="0">
+                <a:solidFill>
+                  <a:schemeClr val="accent2"/>
+                </a:solidFill>
+              </a:rPr>
+              <a:t> = </a:t>
+            </a:r>
+            <a:r>
+              <a:rPr lang="pt-BR" sz="1400" dirty="0" err="1">
+                <a:solidFill>
+                  <a:schemeClr val="accent2"/>
+                </a:solidFill>
+              </a:rPr>
+              <a:t>window.indexedDB.open</a:t>
+            </a:r>
+            <a:r>
+              <a:rPr lang="pt-BR" sz="1400" dirty="0">
+                <a:solidFill>
+                  <a:schemeClr val="accent2"/>
+                </a:solidFill>
+              </a:rPr>
+              <a:t>('aluraframe',4);</a:t>
+            </a:r>
+          </a:p>
+          <a:p>
+            <a:pPr marL="0" indent="0">
+              <a:buNone/>
+            </a:pPr>
+            <a:r>
+              <a:rPr lang="pt-BR" sz="1400" dirty="0" smtClean="0">
+                <a:solidFill>
+                  <a:schemeClr val="accent2"/>
+                </a:solidFill>
+              </a:rPr>
+              <a:t>            </a:t>
+            </a:r>
+            <a:r>
+              <a:rPr lang="pt-BR" sz="1400" dirty="0" err="1">
+                <a:solidFill>
+                  <a:schemeClr val="accent2"/>
+                </a:solidFill>
+              </a:rPr>
+              <a:t>openRequest.onupgradeneeded</a:t>
+            </a:r>
+            <a:r>
+              <a:rPr lang="pt-BR" sz="1400" dirty="0">
+                <a:solidFill>
+                  <a:schemeClr val="accent2"/>
+                </a:solidFill>
+              </a:rPr>
+              <a:t> = e =&gt; {</a:t>
+            </a:r>
+          </a:p>
+          <a:p>
+            <a:pPr marL="0" indent="0">
+              <a:buNone/>
+            </a:pPr>
+            <a:r>
+              <a:rPr lang="pt-BR" sz="1400" dirty="0" smtClean="0">
+                <a:solidFill>
+                  <a:schemeClr val="accent2"/>
+                </a:solidFill>
+              </a:rPr>
+              <a:t>                    </a:t>
+            </a:r>
+            <a:r>
+              <a:rPr lang="pt-BR" sz="1400" dirty="0" err="1">
+                <a:solidFill>
+                  <a:schemeClr val="accent2"/>
+                </a:solidFill>
+              </a:rPr>
+              <a:t>ConnectionFactory</a:t>
+            </a:r>
+            <a:r>
+              <a:rPr lang="pt-BR" sz="1400" dirty="0">
+                <a:solidFill>
+                  <a:schemeClr val="accent2"/>
+                </a:solidFill>
+              </a:rPr>
+              <a:t>._</a:t>
+            </a:r>
+            <a:r>
+              <a:rPr lang="pt-BR" sz="1400" dirty="0" err="1">
+                <a:solidFill>
+                  <a:schemeClr val="accent2"/>
+                </a:solidFill>
+              </a:rPr>
+              <a:t>createStores</a:t>
+            </a:r>
+            <a:r>
+              <a:rPr lang="pt-BR" sz="1400" dirty="0">
+                <a:solidFill>
+                  <a:schemeClr val="accent2"/>
+                </a:solidFill>
+              </a:rPr>
+              <a:t>(</a:t>
+            </a:r>
+            <a:r>
+              <a:rPr lang="pt-BR" sz="1400" dirty="0" err="1">
+                <a:solidFill>
+                  <a:schemeClr val="accent2"/>
+                </a:solidFill>
+              </a:rPr>
+              <a:t>e.target.result</a:t>
+            </a:r>
+            <a:r>
+              <a:rPr lang="pt-BR" sz="1400" dirty="0">
+                <a:solidFill>
+                  <a:schemeClr val="accent2"/>
+                </a:solidFill>
+              </a:rPr>
+              <a:t>);</a:t>
+            </a:r>
+          </a:p>
+          <a:p>
+            <a:pPr marL="0" indent="0">
+              <a:buNone/>
+            </a:pPr>
+            <a:r>
+              <a:rPr lang="pt-BR" sz="1400" dirty="0" smtClean="0">
+                <a:solidFill>
+                  <a:schemeClr val="accent2"/>
+                </a:solidFill>
+              </a:rPr>
+              <a:t>            </a:t>
+            </a:r>
+            <a:r>
+              <a:rPr lang="pt-BR" sz="1400" dirty="0">
+                <a:solidFill>
+                  <a:schemeClr val="accent2"/>
+                </a:solidFill>
+              </a:rPr>
+              <a:t>};</a:t>
+            </a:r>
+          </a:p>
+          <a:p>
+            <a:pPr marL="0" indent="0">
+              <a:buNone/>
+            </a:pPr>
+            <a:r>
+              <a:rPr lang="pt-BR" sz="1400" dirty="0" smtClean="0">
+                <a:solidFill>
+                  <a:schemeClr val="accent5"/>
+                </a:solidFill>
+              </a:rPr>
+              <a:t>        </a:t>
+            </a:r>
+            <a:r>
+              <a:rPr lang="pt-BR" sz="1400" dirty="0">
+                <a:solidFill>
+                  <a:schemeClr val="accent5"/>
+                </a:solidFill>
+              </a:rPr>
+              <a:t>});</a:t>
+            </a:r>
+          </a:p>
+          <a:p>
+            <a:pPr marL="0" indent="0">
+              <a:buNone/>
+            </a:pPr>
+            <a:r>
+              <a:rPr lang="pt-BR" sz="1400" dirty="0">
+                <a:solidFill>
+                  <a:schemeClr val="accent5"/>
+                </a:solidFill>
+              </a:rPr>
+              <a:t>    }</a:t>
+            </a:r>
+          </a:p>
+          <a:p>
+            <a:pPr marL="0" indent="0">
+              <a:buNone/>
+            </a:pPr>
+            <a:endParaRPr lang="pt-BR" sz="1400" dirty="0" smtClean="0">
+              <a:solidFill>
+                <a:schemeClr val="accent5"/>
+              </a:solidFill>
+            </a:endParaRPr>
+          </a:p>
+          <a:p>
+            <a:pPr marL="0" indent="0">
+              <a:buNone/>
+            </a:pPr>
+            <a:r>
+              <a:rPr lang="pt-BR" sz="1400" dirty="0" smtClean="0">
+                <a:solidFill>
+                  <a:schemeClr val="accent5"/>
+                </a:solidFill>
+              </a:rPr>
+              <a:t>    </a:t>
+            </a:r>
+            <a:r>
+              <a:rPr lang="pt-BR" sz="1400" dirty="0" err="1">
+                <a:solidFill>
+                  <a:schemeClr val="accent5"/>
+                </a:solidFill>
+              </a:rPr>
+              <a:t>static</a:t>
+            </a:r>
+            <a:r>
+              <a:rPr lang="pt-BR" sz="1400" dirty="0">
+                <a:solidFill>
+                  <a:schemeClr val="accent5"/>
+                </a:solidFill>
+              </a:rPr>
+              <a:t>  </a:t>
+            </a:r>
+            <a:r>
+              <a:rPr lang="pt-BR" sz="1400" b="1" dirty="0">
+                <a:solidFill>
+                  <a:schemeClr val="accent5"/>
+                </a:solidFill>
+              </a:rPr>
+              <a:t>_</a:t>
+            </a:r>
+            <a:r>
+              <a:rPr lang="pt-BR" sz="1400" b="1" dirty="0" err="1">
+                <a:solidFill>
+                  <a:schemeClr val="accent5"/>
+                </a:solidFill>
+              </a:rPr>
+              <a:t>createStores</a:t>
+            </a:r>
+            <a:r>
+              <a:rPr lang="pt-BR" sz="1400" dirty="0">
+                <a:solidFill>
+                  <a:schemeClr val="accent5"/>
+                </a:solidFill>
+              </a:rPr>
+              <a:t>(connection) {</a:t>
+            </a:r>
+          </a:p>
+          <a:p>
+            <a:pPr marL="0" indent="0">
+              <a:buNone/>
+            </a:pPr>
+            <a:r>
+              <a:rPr lang="pt-BR" sz="1400" dirty="0" smtClean="0">
+                <a:solidFill>
+                  <a:schemeClr val="accent2"/>
+                </a:solidFill>
+              </a:rPr>
+              <a:t>        </a:t>
+            </a:r>
+            <a:r>
+              <a:rPr lang="pt-BR" sz="1400" dirty="0" err="1">
+                <a:solidFill>
+                  <a:schemeClr val="accent2"/>
+                </a:solidFill>
+              </a:rPr>
+              <a:t>if</a:t>
+            </a:r>
+            <a:r>
+              <a:rPr lang="pt-BR" sz="1400" dirty="0">
+                <a:solidFill>
+                  <a:schemeClr val="accent2"/>
+                </a:solidFill>
+              </a:rPr>
+              <a:t>(</a:t>
+            </a:r>
+            <a:r>
+              <a:rPr lang="pt-BR" sz="1400" dirty="0" err="1">
+                <a:solidFill>
+                  <a:schemeClr val="accent2"/>
+                </a:solidFill>
+              </a:rPr>
+              <a:t>connection.objectStoreNames.contains</a:t>
+            </a:r>
+            <a:r>
+              <a:rPr lang="pt-BR" sz="1400" dirty="0">
+                <a:solidFill>
+                  <a:schemeClr val="accent2"/>
+                </a:solidFill>
+              </a:rPr>
+              <a:t>('</a:t>
+            </a:r>
+            <a:r>
+              <a:rPr lang="pt-BR" sz="1400" dirty="0" err="1">
+                <a:solidFill>
+                  <a:schemeClr val="accent2"/>
+                </a:solidFill>
+              </a:rPr>
+              <a:t>negociacoes</a:t>
+            </a:r>
+            <a:r>
+              <a:rPr lang="pt-BR" sz="1400" dirty="0">
+                <a:solidFill>
+                  <a:schemeClr val="accent2"/>
+                </a:solidFill>
+              </a:rPr>
+              <a:t>')) </a:t>
+            </a:r>
+            <a:r>
+              <a:rPr lang="pt-BR" sz="1400" dirty="0" err="1">
+                <a:solidFill>
+                  <a:schemeClr val="accent2"/>
+                </a:solidFill>
+              </a:rPr>
+              <a:t>connection.deleteObjectStore</a:t>
+            </a:r>
+            <a:r>
+              <a:rPr lang="pt-BR" sz="1400" dirty="0">
+                <a:solidFill>
+                  <a:schemeClr val="accent2"/>
+                </a:solidFill>
+              </a:rPr>
+              <a:t>('</a:t>
+            </a:r>
+            <a:r>
+              <a:rPr lang="pt-BR" sz="1400" dirty="0" err="1">
+                <a:solidFill>
+                  <a:schemeClr val="accent2"/>
+                </a:solidFill>
+              </a:rPr>
+              <a:t>negociacoes</a:t>
+            </a:r>
+            <a:r>
+              <a:rPr lang="pt-BR" sz="1400" dirty="0">
+                <a:solidFill>
+                  <a:schemeClr val="accent2"/>
+                </a:solidFill>
+              </a:rPr>
+              <a:t>');</a:t>
+            </a:r>
+          </a:p>
+          <a:p>
+            <a:pPr marL="0" indent="0">
+              <a:buNone/>
+            </a:pPr>
+            <a:r>
+              <a:rPr lang="pt-BR" sz="1400" dirty="0">
+                <a:solidFill>
+                  <a:schemeClr val="accent2"/>
+                </a:solidFill>
+              </a:rPr>
+              <a:t>        </a:t>
+            </a:r>
+            <a:r>
+              <a:rPr lang="pt-BR" sz="1400" dirty="0" err="1">
+                <a:solidFill>
+                  <a:schemeClr val="accent2"/>
+                </a:solidFill>
+              </a:rPr>
+              <a:t>connection.createObjectStore</a:t>
+            </a:r>
+            <a:r>
+              <a:rPr lang="pt-BR" sz="1400" dirty="0">
+                <a:solidFill>
+                  <a:schemeClr val="accent2"/>
+                </a:solidFill>
+              </a:rPr>
+              <a:t>('</a:t>
+            </a:r>
+            <a:r>
+              <a:rPr lang="pt-BR" sz="1400" dirty="0" err="1">
+                <a:solidFill>
+                  <a:schemeClr val="accent2"/>
+                </a:solidFill>
+              </a:rPr>
+              <a:t>negociacoes</a:t>
+            </a:r>
+            <a:r>
+              <a:rPr lang="pt-BR" sz="1400" dirty="0">
+                <a:solidFill>
+                  <a:schemeClr val="accent2"/>
+                </a:solidFill>
+              </a:rPr>
+              <a:t>', { </a:t>
+            </a:r>
+            <a:r>
+              <a:rPr lang="pt-BR" sz="1400" dirty="0" err="1">
+                <a:solidFill>
+                  <a:schemeClr val="accent2"/>
+                </a:solidFill>
+              </a:rPr>
+              <a:t>autoIncrement</a:t>
+            </a:r>
+            <a:r>
+              <a:rPr lang="pt-BR" sz="1400" dirty="0">
+                <a:solidFill>
+                  <a:schemeClr val="accent2"/>
+                </a:solidFill>
+              </a:rPr>
+              <a:t>: </a:t>
+            </a:r>
+            <a:r>
+              <a:rPr lang="pt-BR" sz="1400" dirty="0" err="1">
+                <a:solidFill>
+                  <a:schemeClr val="accent2"/>
+                </a:solidFill>
+              </a:rPr>
+              <a:t>true</a:t>
+            </a:r>
+            <a:r>
+              <a:rPr lang="pt-BR" sz="1400" dirty="0">
+                <a:solidFill>
+                  <a:schemeClr val="accent2"/>
+                </a:solidFill>
+              </a:rPr>
+              <a:t> });</a:t>
+            </a:r>
+          </a:p>
+          <a:p>
+            <a:pPr marL="0" indent="0">
+              <a:buNone/>
+            </a:pPr>
+            <a:r>
+              <a:rPr lang="pt-BR" sz="1400" dirty="0" smtClean="0">
+                <a:solidFill>
+                  <a:schemeClr val="accent5"/>
+                </a:solidFill>
+              </a:rPr>
+              <a:t>    </a:t>
+            </a:r>
+            <a:r>
+              <a:rPr lang="pt-BR" sz="1400" dirty="0">
+                <a:solidFill>
+                  <a:schemeClr val="accent5"/>
+                </a:solidFill>
+              </a:rPr>
+              <a:t>}</a:t>
+            </a:r>
+          </a:p>
+          <a:p>
+            <a:pPr marL="0" indent="0">
+              <a:buNone/>
+            </a:pPr>
+            <a:r>
+              <a:rPr lang="pt-BR" sz="1400" dirty="0">
+                <a:solidFill>
+                  <a:schemeClr val="accent5"/>
+                </a:solidFill>
+              </a:rPr>
+              <a:t>}</a:t>
+            </a:r>
+          </a:p>
+        </p:txBody>
+      </p:sp>
+    </p:spTree>
+    <p:extLst>
+      <p:ext uri="{BB962C8B-B14F-4D97-AF65-F5344CB8AC3E}">
+        <p14:creationId xmlns:p14="http://schemas.microsoft.com/office/powerpoint/2010/main" val="1852399734"/>
       </p:ext>
     </p:extLst>
   </p:cSld>
@@ -4833,6 +6252,993 @@
     <p:extLst>
       <p:ext uri="{BB962C8B-B14F-4D97-AF65-F5344CB8AC3E}">
         <p14:creationId xmlns:p14="http://schemas.microsoft.com/office/powerpoint/2010/main" val="3099367039"/>
+      </p:ext>
+    </p:extLst>
+  </p:cSld>
+  <p:clrMapOvr>
+    <a:masterClrMapping/>
+  </p:clrMapOvr>
+</p:sld>
+</file>
+
+<file path=ppt/slides/slide20.xml><?xml version="1.0" encoding="utf-8"?>
+<p:sld xmlns:a="http://schemas.openxmlformats.org/drawingml/2006/main" xmlns:r="http://schemas.openxmlformats.org/officeDocument/2006/relationships" xmlns:p="http://schemas.openxmlformats.org/presentationml/2006/main">
+  <p:cSld>
+    <p:spTree>
+      <p:nvGrpSpPr>
+        <p:cNvPr id="1" name=""/>
+        <p:cNvGrpSpPr/>
+        <p:nvPr/>
+      </p:nvGrpSpPr>
+      <p:grpSpPr>
+        <a:xfrm>
+          <a:off x="0" y="0"/>
+          <a:ext cx="0" cy="0"/>
+          <a:chOff x="0" y="0"/>
+          <a:chExt cx="0" cy="0"/>
+        </a:xfrm>
+      </p:grpSpPr>
+      <p:sp>
+        <p:nvSpPr>
+          <p:cNvPr id="2" name="Título 1"/>
+          <p:cNvSpPr>
+            <a:spLocks noGrp="1"/>
+          </p:cNvSpPr>
+          <p:nvPr>
+            <p:ph type="title"/>
+          </p:nvPr>
+        </p:nvSpPr>
+        <p:spPr>
+          <a:xfrm>
+            <a:off x="759177" y="89552"/>
+            <a:ext cx="10515600" cy="549275"/>
+          </a:xfrm>
+        </p:spPr>
+        <p:txBody>
+          <a:bodyPr>
+            <a:normAutofit/>
+          </a:bodyPr>
+          <a:lstStyle/>
+          <a:p>
+            <a:pPr algn="ctr"/>
+            <a:r>
+              <a:rPr lang="pt-BR" sz="2800" b="1" dirty="0" err="1" smtClean="0"/>
+              <a:t>Monkey</a:t>
+            </a:r>
+            <a:r>
+              <a:rPr lang="pt-BR" sz="2800" b="1" dirty="0" smtClean="0"/>
+              <a:t> Patch</a:t>
+            </a:r>
+            <a:endParaRPr lang="pt-BR" sz="2800" b="1" dirty="0"/>
+          </a:p>
+        </p:txBody>
+      </p:sp>
+      <p:pic>
+        <p:nvPicPr>
+          <p:cNvPr id="3" name="Imagem 2"/>
+          <p:cNvPicPr>
+            <a:picLocks noChangeAspect="1"/>
+          </p:cNvPicPr>
+          <p:nvPr/>
+        </p:nvPicPr>
+        <p:blipFill>
+          <a:blip r:embed="rId2"/>
+          <a:stretch>
+            <a:fillRect/>
+          </a:stretch>
+        </p:blipFill>
+        <p:spPr>
+          <a:xfrm>
+            <a:off x="392289" y="638827"/>
+            <a:ext cx="4724400" cy="3981450"/>
+          </a:xfrm>
+          <a:prstGeom prst="rect">
+            <a:avLst/>
+          </a:prstGeom>
+        </p:spPr>
+      </p:pic>
+      <p:pic>
+        <p:nvPicPr>
+          <p:cNvPr id="6" name="Imagem 5"/>
+          <p:cNvPicPr>
+            <a:picLocks noChangeAspect="1"/>
+          </p:cNvPicPr>
+          <p:nvPr/>
+        </p:nvPicPr>
+        <p:blipFill>
+          <a:blip r:embed="rId3"/>
+          <a:stretch>
+            <a:fillRect/>
+          </a:stretch>
+        </p:blipFill>
+        <p:spPr>
+          <a:xfrm>
+            <a:off x="6016977" y="757414"/>
+            <a:ext cx="3571875" cy="1504950"/>
+          </a:xfrm>
+          <a:prstGeom prst="rect">
+            <a:avLst/>
+          </a:prstGeom>
+        </p:spPr>
+      </p:pic>
+      <p:sp>
+        <p:nvSpPr>
+          <p:cNvPr id="7" name="CaixaDeTexto 6"/>
+          <p:cNvSpPr txBox="1"/>
+          <p:nvPr/>
+        </p:nvSpPr>
+        <p:spPr>
+          <a:xfrm>
+            <a:off x="5384801" y="2380951"/>
+            <a:ext cx="5621866" cy="2308324"/>
+          </a:xfrm>
+          <a:prstGeom prst="rect">
+            <a:avLst/>
+          </a:prstGeom>
+          <a:noFill/>
+        </p:spPr>
+        <p:txBody>
+          <a:bodyPr wrap="square" rtlCol="0">
+            <a:spAutoFit/>
+          </a:bodyPr>
+          <a:lstStyle/>
+          <a:p>
+            <a:r>
+              <a:rPr lang="pt-BR" dirty="0" smtClean="0"/>
+              <a:t>Modificando dinamicamente </a:t>
+            </a:r>
+            <a:r>
+              <a:rPr lang="pt-BR" b="1" dirty="0" err="1" smtClean="0"/>
+              <a:t>obterComeCompleto</a:t>
+            </a:r>
+            <a:r>
+              <a:rPr lang="pt-BR" dirty="0" smtClean="0"/>
+              <a:t> apenas na instância </a:t>
+            </a:r>
+            <a:r>
+              <a:rPr lang="pt-BR" b="1" dirty="0" smtClean="0"/>
+              <a:t>pessoa2</a:t>
+            </a:r>
+            <a:r>
+              <a:rPr lang="pt-BR" dirty="0" smtClean="0"/>
+              <a:t>. Usamos </a:t>
+            </a:r>
+            <a:r>
+              <a:rPr lang="pt-BR" b="1" dirty="0" err="1" smtClean="0"/>
+              <a:t>function</a:t>
+            </a:r>
+            <a:r>
+              <a:rPr lang="pt-BR" dirty="0" smtClean="0"/>
+              <a:t> e não </a:t>
+            </a:r>
+            <a:r>
+              <a:rPr lang="pt-BR" b="1" dirty="0" err="1" smtClean="0"/>
+              <a:t>arrow</a:t>
+            </a:r>
+            <a:r>
+              <a:rPr lang="pt-BR" b="1" dirty="0" smtClean="0"/>
+              <a:t> </a:t>
+            </a:r>
+            <a:r>
+              <a:rPr lang="pt-BR" b="1" dirty="0" err="1" smtClean="0"/>
+              <a:t>function</a:t>
+            </a:r>
+            <a:r>
+              <a:rPr lang="pt-BR" dirty="0" smtClean="0"/>
+              <a:t> devido ao seu escopo </a:t>
+            </a:r>
+            <a:r>
+              <a:rPr lang="pt-BR" u="sng" dirty="0" smtClean="0"/>
+              <a:t>dinâmico</a:t>
+            </a:r>
+            <a:r>
+              <a:rPr lang="pt-BR" dirty="0" smtClean="0"/>
+              <a:t>, isto é, </a:t>
+            </a:r>
+            <a:r>
+              <a:rPr lang="pt-BR" b="1" dirty="0" err="1" smtClean="0"/>
+              <a:t>this</a:t>
+            </a:r>
+            <a:r>
+              <a:rPr lang="pt-BR" dirty="0" smtClean="0"/>
+              <a:t> deve variar de acordo com a instância no qual </a:t>
+            </a:r>
+            <a:r>
+              <a:rPr lang="pt-BR" b="1" dirty="0" err="1" smtClean="0"/>
+              <a:t>obternomeCompleto</a:t>
+            </a:r>
+            <a:r>
+              <a:rPr lang="pt-BR" dirty="0" smtClean="0"/>
+              <a:t> é chamado. Se usarmos o </a:t>
+            </a:r>
+            <a:r>
+              <a:rPr lang="pt-BR" b="1" dirty="0" err="1" smtClean="0"/>
+              <a:t>arrow</a:t>
+            </a:r>
+            <a:r>
+              <a:rPr lang="pt-BR" b="1" dirty="0" smtClean="0"/>
+              <a:t> </a:t>
+            </a:r>
+            <a:r>
+              <a:rPr lang="pt-BR" b="1" dirty="0" err="1" smtClean="0"/>
+              <a:t>function</a:t>
+            </a:r>
+            <a:r>
+              <a:rPr lang="pt-BR" dirty="0" smtClean="0"/>
+              <a:t> o escopo será </a:t>
+            </a:r>
+            <a:r>
+              <a:rPr lang="pt-BR" b="1" dirty="0" smtClean="0"/>
+              <a:t>léxico</a:t>
+            </a:r>
+            <a:r>
+              <a:rPr lang="pt-BR" dirty="0" smtClean="0"/>
+              <a:t> e fará com que o contexto seja sempre o da função declarada, no caso, </a:t>
+            </a:r>
+            <a:r>
+              <a:rPr lang="pt-BR" b="1" dirty="0" err="1" smtClean="0"/>
+              <a:t>window</a:t>
+            </a:r>
+            <a:r>
+              <a:rPr lang="pt-BR" dirty="0" smtClean="0"/>
+              <a:t>, o escopo </a:t>
+            </a:r>
+            <a:r>
+              <a:rPr lang="pt-BR" b="1" dirty="0" smtClean="0"/>
+              <a:t>global</a:t>
+            </a:r>
+            <a:r>
+              <a:rPr lang="pt-BR" dirty="0" smtClean="0"/>
+              <a:t>. </a:t>
+            </a:r>
+            <a:endParaRPr lang="pt-BR" dirty="0"/>
+          </a:p>
+        </p:txBody>
+      </p:sp>
+      <p:pic>
+        <p:nvPicPr>
+          <p:cNvPr id="8" name="Imagem 7"/>
+          <p:cNvPicPr>
+            <a:picLocks noChangeAspect="1"/>
+          </p:cNvPicPr>
+          <p:nvPr/>
+        </p:nvPicPr>
+        <p:blipFill>
+          <a:blip r:embed="rId4"/>
+          <a:stretch>
+            <a:fillRect/>
+          </a:stretch>
+        </p:blipFill>
+        <p:spPr>
+          <a:xfrm>
+            <a:off x="3609798" y="5663142"/>
+            <a:ext cx="3933825" cy="1085850"/>
+          </a:xfrm>
+          <a:prstGeom prst="rect">
+            <a:avLst/>
+          </a:prstGeom>
+        </p:spPr>
+      </p:pic>
+      <p:sp>
+        <p:nvSpPr>
+          <p:cNvPr id="9" name="CaixaDeTexto 8"/>
+          <p:cNvSpPr txBox="1"/>
+          <p:nvPr/>
+        </p:nvSpPr>
+        <p:spPr>
+          <a:xfrm>
+            <a:off x="349955" y="4943330"/>
+            <a:ext cx="11221156" cy="646331"/>
+          </a:xfrm>
+          <a:prstGeom prst="rect">
+            <a:avLst/>
+          </a:prstGeom>
+          <a:noFill/>
+        </p:spPr>
+        <p:txBody>
+          <a:bodyPr wrap="square" rtlCol="0">
+            <a:spAutoFit/>
+          </a:bodyPr>
+          <a:lstStyle/>
+          <a:p>
+            <a:r>
+              <a:rPr lang="pt-BR" dirty="0" smtClean="0"/>
+              <a:t>Se quisermos mudar a definição diretamente na própria classe, pode-se fazer como no exemplo abaixo. Mas nos dois casos deve-se ter bastante cuidado.</a:t>
+            </a:r>
+            <a:endParaRPr lang="pt-BR" dirty="0"/>
+          </a:p>
+        </p:txBody>
+      </p:sp>
+      <p:cxnSp>
+        <p:nvCxnSpPr>
+          <p:cNvPr id="11" name="Conector reto 10"/>
+          <p:cNvCxnSpPr/>
+          <p:nvPr/>
+        </p:nvCxnSpPr>
+        <p:spPr>
+          <a:xfrm>
+            <a:off x="248356" y="4807862"/>
+            <a:ext cx="11413066" cy="0"/>
+          </a:xfrm>
+          <a:prstGeom prst="line">
+            <a:avLst/>
+          </a:prstGeom>
+        </p:spPr>
+        <p:style>
+          <a:lnRef idx="1">
+            <a:schemeClr val="accent1"/>
+          </a:lnRef>
+          <a:fillRef idx="0">
+            <a:schemeClr val="accent1"/>
+          </a:fillRef>
+          <a:effectRef idx="0">
+            <a:schemeClr val="accent1"/>
+          </a:effectRef>
+          <a:fontRef idx="minor">
+            <a:schemeClr val="tx1"/>
+          </a:fontRef>
+        </p:style>
+      </p:cxnSp>
+    </p:spTree>
+    <p:extLst>
+      <p:ext uri="{BB962C8B-B14F-4D97-AF65-F5344CB8AC3E}">
+        <p14:creationId xmlns:p14="http://schemas.microsoft.com/office/powerpoint/2010/main" val="1707409314"/>
+      </p:ext>
+    </p:extLst>
+  </p:cSld>
+  <p:clrMapOvr>
+    <a:masterClrMapping/>
+  </p:clrMapOvr>
+</p:sld>
+</file>
+
+<file path=ppt/slides/slide21.xml><?xml version="1.0" encoding="utf-8"?>
+<p:sld xmlns:a="http://schemas.openxmlformats.org/drawingml/2006/main" xmlns:r="http://schemas.openxmlformats.org/officeDocument/2006/relationships" xmlns:p="http://schemas.openxmlformats.org/presentationml/2006/main">
+  <p:cSld>
+    <p:spTree>
+      <p:nvGrpSpPr>
+        <p:cNvPr id="1" name=""/>
+        <p:cNvGrpSpPr/>
+        <p:nvPr/>
+      </p:nvGrpSpPr>
+      <p:grpSpPr>
+        <a:xfrm>
+          <a:off x="0" y="0"/>
+          <a:ext cx="0" cy="0"/>
+          <a:chOff x="0" y="0"/>
+          <a:chExt cx="0" cy="0"/>
+        </a:xfrm>
+      </p:grpSpPr>
+      <p:sp>
+        <p:nvSpPr>
+          <p:cNvPr id="2" name="Título 1"/>
+          <p:cNvSpPr>
+            <a:spLocks noGrp="1"/>
+          </p:cNvSpPr>
+          <p:nvPr>
+            <p:ph type="title"/>
+          </p:nvPr>
+        </p:nvSpPr>
+        <p:spPr>
+          <a:xfrm>
+            <a:off x="759177" y="89552"/>
+            <a:ext cx="10515600" cy="549275"/>
+          </a:xfrm>
+        </p:spPr>
+        <p:txBody>
+          <a:bodyPr>
+            <a:normAutofit/>
+          </a:bodyPr>
+          <a:lstStyle/>
+          <a:p>
+            <a:pPr algn="ctr"/>
+            <a:r>
+              <a:rPr lang="pt-BR" sz="2800" b="1" dirty="0" smtClean="0"/>
+              <a:t>Variáveis imutáveis =&gt; Constantes</a:t>
+            </a:r>
+            <a:endParaRPr lang="pt-BR" sz="2800" b="1" dirty="0"/>
+          </a:p>
+        </p:txBody>
+      </p:sp>
+      <p:sp>
+        <p:nvSpPr>
+          <p:cNvPr id="6" name="CaixaDeTexto 5"/>
+          <p:cNvSpPr txBox="1"/>
+          <p:nvPr/>
+        </p:nvSpPr>
+        <p:spPr>
+          <a:xfrm>
+            <a:off x="1253068" y="819450"/>
+            <a:ext cx="4673600" cy="369332"/>
+          </a:xfrm>
+          <a:prstGeom prst="rect">
+            <a:avLst/>
+          </a:prstGeom>
+          <a:noFill/>
+        </p:spPr>
+        <p:txBody>
+          <a:bodyPr wrap="square" rtlCol="0">
+            <a:spAutoFit/>
+          </a:bodyPr>
+          <a:lstStyle/>
+          <a:p>
+            <a:r>
+              <a:rPr lang="pt-BR" dirty="0" smtClean="0"/>
+              <a:t>Recurso do Ecma2015 ( ES6 ) </a:t>
+            </a:r>
+            <a:endParaRPr lang="pt-BR" dirty="0"/>
+          </a:p>
+        </p:txBody>
+      </p:sp>
+      <p:pic>
+        <p:nvPicPr>
+          <p:cNvPr id="3" name="Imagem 2"/>
+          <p:cNvPicPr>
+            <a:picLocks noChangeAspect="1"/>
+          </p:cNvPicPr>
+          <p:nvPr/>
+        </p:nvPicPr>
+        <p:blipFill>
+          <a:blip r:embed="rId2"/>
+          <a:stretch>
+            <a:fillRect/>
+          </a:stretch>
+        </p:blipFill>
+        <p:spPr>
+          <a:xfrm>
+            <a:off x="673806" y="1524352"/>
+            <a:ext cx="4369452" cy="1218847"/>
+          </a:xfrm>
+          <a:prstGeom prst="rect">
+            <a:avLst/>
+          </a:prstGeom>
+        </p:spPr>
+      </p:pic>
+      <p:pic>
+        <p:nvPicPr>
+          <p:cNvPr id="7" name="Imagem 6"/>
+          <p:cNvPicPr>
+            <a:picLocks noChangeAspect="1"/>
+          </p:cNvPicPr>
+          <p:nvPr/>
+        </p:nvPicPr>
+        <p:blipFill>
+          <a:blip r:embed="rId3"/>
+          <a:stretch>
+            <a:fillRect/>
+          </a:stretch>
+        </p:blipFill>
+        <p:spPr>
+          <a:xfrm>
+            <a:off x="6304790" y="1524352"/>
+            <a:ext cx="4969987" cy="1134766"/>
+          </a:xfrm>
+          <a:prstGeom prst="rect">
+            <a:avLst/>
+          </a:prstGeom>
+        </p:spPr>
+      </p:pic>
+      <p:sp>
+        <p:nvSpPr>
+          <p:cNvPr id="8" name="CaixaDeTexto 7"/>
+          <p:cNvSpPr txBox="1"/>
+          <p:nvPr/>
+        </p:nvSpPr>
+        <p:spPr>
+          <a:xfrm>
+            <a:off x="759176" y="3161895"/>
+            <a:ext cx="9931401" cy="2862322"/>
+          </a:xfrm>
+          <a:prstGeom prst="rect">
+            <a:avLst/>
+          </a:prstGeom>
+          <a:noFill/>
+        </p:spPr>
+        <p:txBody>
+          <a:bodyPr wrap="square" rtlCol="0">
+            <a:spAutoFit/>
+          </a:bodyPr>
+          <a:lstStyle/>
+          <a:p>
+            <a:r>
+              <a:rPr lang="pt-BR" dirty="0" smtClean="0"/>
+              <a:t>Se você tentar alterar.</a:t>
+            </a:r>
+          </a:p>
+          <a:p>
+            <a:endParaRPr lang="pt-BR" dirty="0"/>
+          </a:p>
+          <a:p>
+            <a:r>
+              <a:rPr lang="pt-BR" i="1" dirty="0" err="1" smtClean="0">
+                <a:solidFill>
+                  <a:schemeClr val="accent5"/>
+                </a:solidFill>
+              </a:rPr>
+              <a:t>const</a:t>
+            </a:r>
+            <a:r>
+              <a:rPr lang="pt-BR" i="1" dirty="0" smtClean="0">
+                <a:solidFill>
+                  <a:schemeClr val="accent5"/>
+                </a:solidFill>
+              </a:rPr>
+              <a:t> nome = “Luciano”;</a:t>
+            </a:r>
+          </a:p>
+          <a:p>
+            <a:endParaRPr lang="pt-BR" dirty="0"/>
+          </a:p>
+          <a:p>
+            <a:r>
+              <a:rPr lang="pt-BR" dirty="0" smtClean="0"/>
+              <a:t>E depois: </a:t>
+            </a:r>
+          </a:p>
+          <a:p>
+            <a:endParaRPr lang="pt-BR" dirty="0"/>
+          </a:p>
+          <a:p>
+            <a:r>
+              <a:rPr lang="pt-BR" i="1" dirty="0" smtClean="0">
+                <a:solidFill>
+                  <a:schemeClr val="accent5"/>
+                </a:solidFill>
+              </a:rPr>
+              <a:t>Nome = “Antônio” </a:t>
+            </a:r>
+          </a:p>
+          <a:p>
+            <a:endParaRPr lang="pt-BR" dirty="0"/>
+          </a:p>
+          <a:p>
+            <a:endParaRPr lang="pt-BR" dirty="0" smtClean="0"/>
+          </a:p>
+          <a:p>
+            <a:r>
+              <a:rPr lang="pt-BR" dirty="0" smtClean="0"/>
+              <a:t>Aparecerá o erro </a:t>
+            </a:r>
+            <a:r>
+              <a:rPr lang="pt-BR" b="1" dirty="0" err="1" smtClean="0"/>
+              <a:t>Uncaught</a:t>
+            </a:r>
+            <a:r>
+              <a:rPr lang="pt-BR" b="1" dirty="0" smtClean="0"/>
+              <a:t> </a:t>
+            </a:r>
+            <a:r>
+              <a:rPr lang="pt-BR" b="1" dirty="0" err="1" smtClean="0"/>
+              <a:t>TypeError</a:t>
+            </a:r>
+            <a:r>
+              <a:rPr lang="pt-BR" b="1" dirty="0" smtClean="0"/>
+              <a:t>: </a:t>
+            </a:r>
+            <a:r>
+              <a:rPr lang="pt-BR" b="1" dirty="0" err="1" smtClean="0"/>
+              <a:t>Assisgnment</a:t>
+            </a:r>
+            <a:r>
+              <a:rPr lang="pt-BR" b="1" dirty="0" smtClean="0"/>
+              <a:t> </a:t>
+            </a:r>
+            <a:r>
+              <a:rPr lang="pt-BR" b="1" dirty="0" err="1" smtClean="0"/>
+              <a:t>to</a:t>
+            </a:r>
+            <a:r>
+              <a:rPr lang="pt-BR" b="1" dirty="0" smtClean="0"/>
+              <a:t> </a:t>
+            </a:r>
+            <a:r>
+              <a:rPr lang="pt-BR" b="1" dirty="0" err="1" smtClean="0"/>
+              <a:t>constant</a:t>
+            </a:r>
+            <a:r>
+              <a:rPr lang="pt-BR" b="1" dirty="0" smtClean="0"/>
+              <a:t> </a:t>
+            </a:r>
+            <a:r>
+              <a:rPr lang="pt-BR" b="1" dirty="0" err="1" smtClean="0"/>
+              <a:t>variable</a:t>
+            </a:r>
+            <a:r>
+              <a:rPr lang="pt-BR" b="1" dirty="0" smtClean="0"/>
+              <a:t> </a:t>
+            </a:r>
+            <a:endParaRPr lang="pt-BR" b="1" dirty="0"/>
+          </a:p>
+        </p:txBody>
+      </p:sp>
+    </p:spTree>
+    <p:extLst>
+      <p:ext uri="{BB962C8B-B14F-4D97-AF65-F5344CB8AC3E}">
+        <p14:creationId xmlns:p14="http://schemas.microsoft.com/office/powerpoint/2010/main" val="1350589040"/>
+      </p:ext>
+    </p:extLst>
+  </p:cSld>
+  <p:clrMapOvr>
+    <a:masterClrMapping/>
+  </p:clrMapOvr>
+</p:sld>
+</file>
+
+<file path=ppt/slides/slide22.xml><?xml version="1.0" encoding="utf-8"?>
+<p:sld xmlns:a="http://schemas.openxmlformats.org/drawingml/2006/main" xmlns:r="http://schemas.openxmlformats.org/officeDocument/2006/relationships" xmlns:p="http://schemas.openxmlformats.org/presentationml/2006/main">
+  <p:cSld>
+    <p:spTree>
+      <p:nvGrpSpPr>
+        <p:cNvPr id="1" name=""/>
+        <p:cNvGrpSpPr/>
+        <p:nvPr/>
+      </p:nvGrpSpPr>
+      <p:grpSpPr>
+        <a:xfrm>
+          <a:off x="0" y="0"/>
+          <a:ext cx="0" cy="0"/>
+          <a:chOff x="0" y="0"/>
+          <a:chExt cx="0" cy="0"/>
+        </a:xfrm>
+      </p:grpSpPr>
+      <p:sp>
+        <p:nvSpPr>
+          <p:cNvPr id="2" name="Título 1"/>
+          <p:cNvSpPr>
+            <a:spLocks noGrp="1"/>
+          </p:cNvSpPr>
+          <p:nvPr>
+            <p:ph type="title"/>
+          </p:nvPr>
+        </p:nvSpPr>
+        <p:spPr>
+          <a:xfrm>
+            <a:off x="759177" y="89552"/>
+            <a:ext cx="10515600" cy="549275"/>
+          </a:xfrm>
+        </p:spPr>
+        <p:txBody>
+          <a:bodyPr>
+            <a:normAutofit/>
+          </a:bodyPr>
+          <a:lstStyle/>
+          <a:p>
+            <a:pPr algn="ctr"/>
+            <a:r>
+              <a:rPr lang="pt-BR" sz="2800" b="1" dirty="0" smtClean="0"/>
+              <a:t>Variáveis imutáveis =&gt; Constantes</a:t>
+            </a:r>
+            <a:endParaRPr lang="pt-BR" sz="2800" b="1" dirty="0"/>
+          </a:p>
+        </p:txBody>
+      </p:sp>
+      <p:sp>
+        <p:nvSpPr>
+          <p:cNvPr id="8" name="CaixaDeTexto 7"/>
+          <p:cNvSpPr txBox="1"/>
+          <p:nvPr/>
+        </p:nvSpPr>
+        <p:spPr>
+          <a:xfrm>
+            <a:off x="759177" y="779940"/>
+            <a:ext cx="9931401" cy="3693319"/>
+          </a:xfrm>
+          <a:prstGeom prst="rect">
+            <a:avLst/>
+          </a:prstGeom>
+          <a:noFill/>
+        </p:spPr>
+        <p:txBody>
+          <a:bodyPr wrap="square" rtlCol="0">
+            <a:spAutoFit/>
+          </a:bodyPr>
+          <a:lstStyle/>
+          <a:p>
+            <a:r>
+              <a:rPr lang="pt-BR" i="1" dirty="0" err="1" smtClean="0">
+                <a:solidFill>
+                  <a:schemeClr val="accent5"/>
+                </a:solidFill>
+              </a:rPr>
+              <a:t>const</a:t>
+            </a:r>
+            <a:r>
+              <a:rPr lang="pt-BR" i="1" dirty="0" smtClean="0">
+                <a:solidFill>
+                  <a:schemeClr val="accent5"/>
+                </a:solidFill>
+              </a:rPr>
+              <a:t> hoje = new Date();</a:t>
+            </a:r>
+          </a:p>
+          <a:p>
+            <a:r>
+              <a:rPr lang="pt-BR" i="1" dirty="0" smtClean="0">
+                <a:solidFill>
+                  <a:schemeClr val="accent5"/>
+                </a:solidFill>
+              </a:rPr>
+              <a:t>hoje = new Date() ; // dá erro!</a:t>
+            </a:r>
+          </a:p>
+          <a:p>
+            <a:endParaRPr lang="pt-BR" dirty="0"/>
+          </a:p>
+          <a:p>
+            <a:r>
+              <a:rPr lang="pt-BR" dirty="0" smtClean="0"/>
+              <a:t>Mas,  </a:t>
+            </a:r>
+          </a:p>
+          <a:p>
+            <a:endParaRPr lang="pt-BR" dirty="0"/>
+          </a:p>
+          <a:p>
+            <a:r>
+              <a:rPr lang="pt-BR" i="1" dirty="0" err="1">
+                <a:solidFill>
+                  <a:schemeClr val="accent5"/>
+                </a:solidFill>
+              </a:rPr>
+              <a:t>const</a:t>
+            </a:r>
+            <a:r>
+              <a:rPr lang="pt-BR" i="1" dirty="0">
+                <a:solidFill>
+                  <a:schemeClr val="accent5"/>
+                </a:solidFill>
+              </a:rPr>
+              <a:t> hoje = new Date</a:t>
+            </a:r>
+            <a:r>
+              <a:rPr lang="pt-BR" i="1" dirty="0" smtClean="0">
+                <a:solidFill>
+                  <a:schemeClr val="accent5"/>
+                </a:solidFill>
+              </a:rPr>
+              <a:t>();</a:t>
+            </a:r>
+          </a:p>
+          <a:p>
+            <a:r>
+              <a:rPr lang="pt-BR" i="1" dirty="0" err="1" smtClean="0">
+                <a:solidFill>
+                  <a:schemeClr val="accent5"/>
+                </a:solidFill>
+              </a:rPr>
+              <a:t>Hoje.setDate</a:t>
+            </a:r>
+            <a:r>
+              <a:rPr lang="pt-BR" i="1" dirty="0" smtClean="0">
+                <a:solidFill>
+                  <a:schemeClr val="accent5"/>
+                </a:solidFill>
+              </a:rPr>
+              <a:t>(5);</a:t>
+            </a:r>
+          </a:p>
+          <a:p>
+            <a:r>
+              <a:rPr lang="pt-BR" i="1" dirty="0" smtClean="0">
+                <a:solidFill>
+                  <a:schemeClr val="accent5"/>
+                </a:solidFill>
+              </a:rPr>
+              <a:t>console.log(</a:t>
+            </a:r>
+            <a:r>
+              <a:rPr lang="pt-BR" i="1" dirty="0" err="1" smtClean="0">
+                <a:solidFill>
+                  <a:schemeClr val="accent5"/>
+                </a:solidFill>
+              </a:rPr>
+              <a:t>hoje.getDate</a:t>
+            </a:r>
+            <a:r>
+              <a:rPr lang="pt-BR" i="1" dirty="0" smtClean="0">
+                <a:solidFill>
+                  <a:schemeClr val="accent5"/>
+                </a:solidFill>
+              </a:rPr>
+              <a:t>()); // Alterou para o dia 5!</a:t>
+            </a:r>
+            <a:endParaRPr lang="pt-BR" i="1" dirty="0">
+              <a:solidFill>
+                <a:schemeClr val="accent5"/>
+              </a:solidFill>
+            </a:endParaRPr>
+          </a:p>
+          <a:p>
+            <a:endParaRPr lang="pt-BR" dirty="0"/>
+          </a:p>
+          <a:p>
+            <a:endParaRPr lang="pt-BR" dirty="0" smtClean="0"/>
+          </a:p>
+          <a:p>
+            <a:r>
+              <a:rPr lang="pt-BR" dirty="0" smtClean="0"/>
+              <a:t>Neste caso não estamos atribuindo um novo valor para a variável, como fizemos com o operador “</a:t>
+            </a:r>
+            <a:r>
+              <a:rPr lang="pt-BR" b="1" dirty="0" smtClean="0"/>
+              <a:t>=</a:t>
+            </a:r>
+            <a:r>
+              <a:rPr lang="pt-BR" dirty="0" smtClean="0"/>
+              <a:t>“, mas alterando as propriedades do objeto </a:t>
+            </a:r>
+            <a:r>
+              <a:rPr lang="pt-BR" b="1" i="1" dirty="0" smtClean="0">
+                <a:solidFill>
+                  <a:schemeClr val="accent5"/>
+                </a:solidFill>
+              </a:rPr>
+              <a:t>Date</a:t>
+            </a:r>
+            <a:r>
+              <a:rPr lang="pt-BR" dirty="0" smtClean="0"/>
+              <a:t>, por meio dos seus métodos. Ou seja, </a:t>
+            </a:r>
+            <a:r>
+              <a:rPr lang="pt-BR" b="1" dirty="0" err="1" smtClean="0"/>
+              <a:t>const</a:t>
+            </a:r>
+            <a:r>
+              <a:rPr lang="pt-BR" dirty="0" smtClean="0"/>
+              <a:t> </a:t>
+            </a:r>
+            <a:r>
+              <a:rPr lang="pt-BR" u="sng" dirty="0" smtClean="0"/>
+              <a:t>não garante a imutabilidade</a:t>
+            </a:r>
+            <a:r>
+              <a:rPr lang="pt-BR" dirty="0" smtClean="0"/>
+              <a:t>, apenas a atribuição de um novo valor para a variável. </a:t>
+            </a:r>
+            <a:endParaRPr lang="pt-BR" b="1" dirty="0"/>
+          </a:p>
+        </p:txBody>
+      </p:sp>
+    </p:spTree>
+    <p:extLst>
+      <p:ext uri="{BB962C8B-B14F-4D97-AF65-F5344CB8AC3E}">
+        <p14:creationId xmlns:p14="http://schemas.microsoft.com/office/powerpoint/2010/main" val="3568488777"/>
+      </p:ext>
+    </p:extLst>
+  </p:cSld>
+  <p:clrMapOvr>
+    <a:masterClrMapping/>
+  </p:clrMapOvr>
+</p:sld>
+</file>
+
+<file path=ppt/slides/slide23.xml><?xml version="1.0" encoding="utf-8"?>
+<p:sld xmlns:a="http://schemas.openxmlformats.org/drawingml/2006/main" xmlns:r="http://schemas.openxmlformats.org/officeDocument/2006/relationships" xmlns:p="http://schemas.openxmlformats.org/presentationml/2006/main">
+  <p:cSld>
+    <p:spTree>
+      <p:nvGrpSpPr>
+        <p:cNvPr id="1" name=""/>
+        <p:cNvGrpSpPr/>
+        <p:nvPr/>
+      </p:nvGrpSpPr>
+      <p:grpSpPr>
+        <a:xfrm>
+          <a:off x="0" y="0"/>
+          <a:ext cx="0" cy="0"/>
+          <a:chOff x="0" y="0"/>
+          <a:chExt cx="0" cy="0"/>
+        </a:xfrm>
+      </p:grpSpPr>
+      <p:sp>
+        <p:nvSpPr>
+          <p:cNvPr id="2" name="Título 1"/>
+          <p:cNvSpPr>
+            <a:spLocks noGrp="1"/>
+          </p:cNvSpPr>
+          <p:nvPr>
+            <p:ph type="title"/>
+          </p:nvPr>
+        </p:nvSpPr>
+        <p:spPr/>
+        <p:txBody>
+          <a:bodyPr/>
+          <a:lstStyle/>
+          <a:p>
+            <a:endParaRPr lang="pt-BR"/>
+          </a:p>
+        </p:txBody>
+      </p:sp>
+      <p:sp>
+        <p:nvSpPr>
+          <p:cNvPr id="3" name="Espaço Reservado para Conteúdo 2"/>
+          <p:cNvSpPr>
+            <a:spLocks noGrp="1"/>
+          </p:cNvSpPr>
+          <p:nvPr>
+            <p:ph idx="1"/>
+          </p:nvPr>
+        </p:nvSpPr>
+        <p:spPr/>
+        <p:txBody>
+          <a:bodyPr/>
+          <a:lstStyle/>
+          <a:p>
+            <a:endParaRPr lang="pt-BR"/>
+          </a:p>
+        </p:txBody>
+      </p:sp>
+    </p:spTree>
+    <p:extLst>
+      <p:ext uri="{BB962C8B-B14F-4D97-AF65-F5344CB8AC3E}">
+        <p14:creationId xmlns:p14="http://schemas.microsoft.com/office/powerpoint/2010/main" val="2042820711"/>
+      </p:ext>
+    </p:extLst>
+  </p:cSld>
+  <p:clrMapOvr>
+    <a:masterClrMapping/>
+  </p:clrMapOvr>
+</p:sld>
+</file>
+
+<file path=ppt/slides/slide24.xml><?xml version="1.0" encoding="utf-8"?>
+<p:sld xmlns:a="http://schemas.openxmlformats.org/drawingml/2006/main" xmlns:r="http://schemas.openxmlformats.org/officeDocument/2006/relationships" xmlns:p="http://schemas.openxmlformats.org/presentationml/2006/main">
+  <p:cSld>
+    <p:spTree>
+      <p:nvGrpSpPr>
+        <p:cNvPr id="1" name=""/>
+        <p:cNvGrpSpPr/>
+        <p:nvPr/>
+      </p:nvGrpSpPr>
+      <p:grpSpPr>
+        <a:xfrm>
+          <a:off x="0" y="0"/>
+          <a:ext cx="0" cy="0"/>
+          <a:chOff x="0" y="0"/>
+          <a:chExt cx="0" cy="0"/>
+        </a:xfrm>
+      </p:grpSpPr>
+      <p:sp>
+        <p:nvSpPr>
+          <p:cNvPr id="2" name="Título 1"/>
+          <p:cNvSpPr>
+            <a:spLocks noGrp="1"/>
+          </p:cNvSpPr>
+          <p:nvPr>
+            <p:ph type="title"/>
+          </p:nvPr>
+        </p:nvSpPr>
+        <p:spPr/>
+        <p:txBody>
+          <a:bodyPr/>
+          <a:lstStyle/>
+          <a:p>
+            <a:endParaRPr lang="pt-BR"/>
+          </a:p>
+        </p:txBody>
+      </p:sp>
+      <p:sp>
+        <p:nvSpPr>
+          <p:cNvPr id="3" name="Espaço Reservado para Conteúdo 2"/>
+          <p:cNvSpPr>
+            <a:spLocks noGrp="1"/>
+          </p:cNvSpPr>
+          <p:nvPr>
+            <p:ph idx="1"/>
+          </p:nvPr>
+        </p:nvSpPr>
+        <p:spPr/>
+        <p:txBody>
+          <a:bodyPr/>
+          <a:lstStyle/>
+          <a:p>
+            <a:endParaRPr lang="pt-BR"/>
+          </a:p>
+        </p:txBody>
+      </p:sp>
+    </p:spTree>
+    <p:extLst>
+      <p:ext uri="{BB962C8B-B14F-4D97-AF65-F5344CB8AC3E}">
+        <p14:creationId xmlns:p14="http://schemas.microsoft.com/office/powerpoint/2010/main" val="1965684712"/>
       </p:ext>
     </p:extLst>
   </p:cSld>

</xml_diff>

<commit_message>
Atualizando métodos adiciona e ListaTodos com o padrão DAO
</commit_message>
<xml_diff>
--- a/docs/JS Avançado 1-2-3-resumo.pptx
+++ b/docs/JS Avançado 1-2-3-resumo.pptx
@@ -27,8 +27,9 @@
     <p:sldId id="279" r:id="rId21"/>
     <p:sldId id="280" r:id="rId22"/>
     <p:sldId id="281" r:id="rId23"/>
-    <p:sldId id="277" r:id="rId24"/>
-    <p:sldId id="278" r:id="rId25"/>
+    <p:sldId id="282" r:id="rId24"/>
+    <p:sldId id="277" r:id="rId25"/>
+    <p:sldId id="278" r:id="rId26"/>
   </p:sldIdLst>
   <p:sldSz cx="12192000" cy="6858000"/>
   <p:notesSz cx="6858000" cy="9144000"/>
@@ -264,7 +265,7 @@
           <a:p>
             <a:fld id="{CC58B075-67F8-4A8D-AE1C-3D3E4193EBCA}" type="datetimeFigureOut">
               <a:rPr lang="pt-BR" smtClean="0"/>
-              <a:t>06/05/2019</a:t>
+              <a:t>09/05/2019</a:t>
             </a:fld>
             <a:endParaRPr lang="pt-BR"/>
           </a:p>
@@ -432,7 +433,7 @@
           <a:p>
             <a:fld id="{CC58B075-67F8-4A8D-AE1C-3D3E4193EBCA}" type="datetimeFigureOut">
               <a:rPr lang="pt-BR" smtClean="0"/>
-              <a:t>06/05/2019</a:t>
+              <a:t>09/05/2019</a:t>
             </a:fld>
             <a:endParaRPr lang="pt-BR"/>
           </a:p>
@@ -610,7 +611,7 @@
           <a:p>
             <a:fld id="{CC58B075-67F8-4A8D-AE1C-3D3E4193EBCA}" type="datetimeFigureOut">
               <a:rPr lang="pt-BR" smtClean="0"/>
-              <a:t>06/05/2019</a:t>
+              <a:t>09/05/2019</a:t>
             </a:fld>
             <a:endParaRPr lang="pt-BR"/>
           </a:p>
@@ -778,7 +779,7 @@
           <a:p>
             <a:fld id="{CC58B075-67F8-4A8D-AE1C-3D3E4193EBCA}" type="datetimeFigureOut">
               <a:rPr lang="pt-BR" smtClean="0"/>
-              <a:t>06/05/2019</a:t>
+              <a:t>09/05/2019</a:t>
             </a:fld>
             <a:endParaRPr lang="pt-BR"/>
           </a:p>
@@ -1023,7 +1024,7 @@
           <a:p>
             <a:fld id="{CC58B075-67F8-4A8D-AE1C-3D3E4193EBCA}" type="datetimeFigureOut">
               <a:rPr lang="pt-BR" smtClean="0"/>
-              <a:t>06/05/2019</a:t>
+              <a:t>09/05/2019</a:t>
             </a:fld>
             <a:endParaRPr lang="pt-BR"/>
           </a:p>
@@ -1252,7 +1253,7 @@
           <a:p>
             <a:fld id="{CC58B075-67F8-4A8D-AE1C-3D3E4193EBCA}" type="datetimeFigureOut">
               <a:rPr lang="pt-BR" smtClean="0"/>
-              <a:t>06/05/2019</a:t>
+              <a:t>09/05/2019</a:t>
             </a:fld>
             <a:endParaRPr lang="pt-BR"/>
           </a:p>
@@ -1616,7 +1617,7 @@
           <a:p>
             <a:fld id="{CC58B075-67F8-4A8D-AE1C-3D3E4193EBCA}" type="datetimeFigureOut">
               <a:rPr lang="pt-BR" smtClean="0"/>
-              <a:t>06/05/2019</a:t>
+              <a:t>09/05/2019</a:t>
             </a:fld>
             <a:endParaRPr lang="pt-BR"/>
           </a:p>
@@ -1733,7 +1734,7 @@
           <a:p>
             <a:fld id="{CC58B075-67F8-4A8D-AE1C-3D3E4193EBCA}" type="datetimeFigureOut">
               <a:rPr lang="pt-BR" smtClean="0"/>
-              <a:t>06/05/2019</a:t>
+              <a:t>09/05/2019</a:t>
             </a:fld>
             <a:endParaRPr lang="pt-BR"/>
           </a:p>
@@ -1828,7 +1829,7 @@
           <a:p>
             <a:fld id="{CC58B075-67F8-4A8D-AE1C-3D3E4193EBCA}" type="datetimeFigureOut">
               <a:rPr lang="pt-BR" smtClean="0"/>
-              <a:t>06/05/2019</a:t>
+              <a:t>09/05/2019</a:t>
             </a:fld>
             <a:endParaRPr lang="pt-BR"/>
           </a:p>
@@ -2103,7 +2104,7 @@
           <a:p>
             <a:fld id="{CC58B075-67F8-4A8D-AE1C-3D3E4193EBCA}" type="datetimeFigureOut">
               <a:rPr lang="pt-BR" smtClean="0"/>
-              <a:t>06/05/2019</a:t>
+              <a:t>09/05/2019</a:t>
             </a:fld>
             <a:endParaRPr lang="pt-BR"/>
           </a:p>
@@ -2355,7 +2356,7 @@
           <a:p>
             <a:fld id="{CC58B075-67F8-4A8D-AE1C-3D3E4193EBCA}" type="datetimeFigureOut">
               <a:rPr lang="pt-BR" smtClean="0"/>
-              <a:t>06/05/2019</a:t>
+              <a:t>09/05/2019</a:t>
             </a:fld>
             <a:endParaRPr lang="pt-BR"/>
           </a:p>
@@ -2566,7 +2567,7 @@
           <a:p>
             <a:fld id="{CC58B075-67F8-4A8D-AE1C-3D3E4193EBCA}" type="datetimeFigureOut">
               <a:rPr lang="pt-BR" smtClean="0"/>
-              <a:t>06/05/2019</a:t>
+              <a:t>09/05/2019</a:t>
             </a:fld>
             <a:endParaRPr lang="pt-BR"/>
           </a:p>
@@ -7139,6 +7140,113 @@
             <p:ph type="title"/>
           </p:nvPr>
         </p:nvSpPr>
+        <p:spPr>
+          <a:xfrm>
+            <a:off x="759177" y="89552"/>
+            <a:ext cx="10515600" cy="549275"/>
+          </a:xfrm>
+        </p:spPr>
+        <p:txBody>
+          <a:bodyPr>
+            <a:normAutofit/>
+          </a:bodyPr>
+          <a:lstStyle/>
+          <a:p>
+            <a:pPr algn="ctr"/>
+            <a:r>
+              <a:rPr lang="pt-BR" sz="2800" b="1" dirty="0" err="1" smtClean="0"/>
+              <a:t>Pattern</a:t>
+            </a:r>
+            <a:r>
+              <a:rPr lang="pt-BR" sz="2800" b="1" dirty="0" smtClean="0"/>
+              <a:t> DAO</a:t>
+            </a:r>
+            <a:endParaRPr lang="pt-BR" sz="2800" b="1" dirty="0"/>
+          </a:p>
+        </p:txBody>
+      </p:sp>
+      <p:sp>
+        <p:nvSpPr>
+          <p:cNvPr id="8" name="CaixaDeTexto 7"/>
+          <p:cNvSpPr txBox="1"/>
+          <p:nvPr/>
+        </p:nvSpPr>
+        <p:spPr>
+          <a:xfrm>
+            <a:off x="759177" y="779940"/>
+            <a:ext cx="9931401" cy="369332"/>
+          </a:xfrm>
+          <a:prstGeom prst="rect">
+            <a:avLst/>
+          </a:prstGeom>
+          <a:noFill/>
+        </p:spPr>
+        <p:txBody>
+          <a:bodyPr wrap="square" rtlCol="0">
+            <a:spAutoFit/>
+          </a:bodyPr>
+          <a:lstStyle/>
+          <a:p>
+            <a:r>
+              <a:rPr lang="pt-BR" i="1" dirty="0" err="1" smtClean="0">
+                <a:solidFill>
+                  <a:schemeClr val="accent5"/>
+                </a:solidFill>
+              </a:rPr>
+              <a:t>const</a:t>
+            </a:r>
+            <a:r>
+              <a:rPr lang="pt-BR" i="1" dirty="0" smtClean="0">
+                <a:solidFill>
+                  <a:schemeClr val="accent5"/>
+                </a:solidFill>
+              </a:rPr>
+              <a:t> ....</a:t>
+            </a:r>
+            <a:endParaRPr lang="pt-BR" b="1" dirty="0"/>
+          </a:p>
+        </p:txBody>
+      </p:sp>
+    </p:spTree>
+    <p:extLst>
+      <p:ext uri="{BB962C8B-B14F-4D97-AF65-F5344CB8AC3E}">
+        <p14:creationId xmlns:p14="http://schemas.microsoft.com/office/powerpoint/2010/main" val="884192177"/>
+      </p:ext>
+    </p:extLst>
+  </p:cSld>
+  <p:clrMapOvr>
+    <a:masterClrMapping/>
+  </p:clrMapOvr>
+</p:sld>
+</file>
+
+<file path=ppt/slides/slide24.xml><?xml version="1.0" encoding="utf-8"?>
+<p:sld xmlns:a="http://schemas.openxmlformats.org/drawingml/2006/main" xmlns:r="http://schemas.openxmlformats.org/officeDocument/2006/relationships" xmlns:p="http://schemas.openxmlformats.org/presentationml/2006/main">
+  <p:cSld>
+    <p:spTree>
+      <p:nvGrpSpPr>
+        <p:cNvPr id="1" name=""/>
+        <p:cNvGrpSpPr/>
+        <p:nvPr/>
+      </p:nvGrpSpPr>
+      <p:grpSpPr>
+        <a:xfrm>
+          <a:off x="0" y="0"/>
+          <a:ext cx="0" cy="0"/>
+          <a:chOff x="0" y="0"/>
+          <a:chExt cx="0" cy="0"/>
+        </a:xfrm>
+      </p:grpSpPr>
+      <p:sp>
+        <p:nvSpPr>
+          <p:cNvPr id="2" name="Título 1"/>
+          <p:cNvSpPr>
+            <a:spLocks noGrp="1"/>
+          </p:cNvSpPr>
+          <p:nvPr>
+            <p:ph type="title"/>
+          </p:nvPr>
+        </p:nvSpPr>
         <p:spPr/>
         <p:txBody>
           <a:bodyPr/>
@@ -7180,7 +7288,7 @@
 </p:sld>
 </file>
 
-<file path=ppt/slides/slide24.xml><?xml version="1.0" encoding="utf-8"?>
+<file path=ppt/slides/slide25.xml><?xml version="1.0" encoding="utf-8"?>
 <p:sld xmlns:a="http://schemas.openxmlformats.org/drawingml/2006/main" xmlns:r="http://schemas.openxmlformats.org/officeDocument/2006/relationships" xmlns:p="http://schemas.openxmlformats.org/presentationml/2006/main">
   <p:cSld>
     <p:spTree>

</xml_diff>

<commit_message>
Ajustando métodos com o pattern DAO
</commit_message>
<xml_diff>
--- a/docs/JS Avançado 1-2-3-resumo.pptx
+++ b/docs/JS Avançado 1-2-3-resumo.pptx
@@ -265,7 +265,7 @@
           <a:p>
             <a:fld id="{CC58B075-67F8-4A8D-AE1C-3D3E4193EBCA}" type="datetimeFigureOut">
               <a:rPr lang="pt-BR" smtClean="0"/>
-              <a:t>09/05/2019</a:t>
+              <a:t>10/05/2019</a:t>
             </a:fld>
             <a:endParaRPr lang="pt-BR"/>
           </a:p>
@@ -433,7 +433,7 @@
           <a:p>
             <a:fld id="{CC58B075-67F8-4A8D-AE1C-3D3E4193EBCA}" type="datetimeFigureOut">
               <a:rPr lang="pt-BR" smtClean="0"/>
-              <a:t>09/05/2019</a:t>
+              <a:t>10/05/2019</a:t>
             </a:fld>
             <a:endParaRPr lang="pt-BR"/>
           </a:p>
@@ -611,7 +611,7 @@
           <a:p>
             <a:fld id="{CC58B075-67F8-4A8D-AE1C-3D3E4193EBCA}" type="datetimeFigureOut">
               <a:rPr lang="pt-BR" smtClean="0"/>
-              <a:t>09/05/2019</a:t>
+              <a:t>10/05/2019</a:t>
             </a:fld>
             <a:endParaRPr lang="pt-BR"/>
           </a:p>
@@ -779,7 +779,7 @@
           <a:p>
             <a:fld id="{CC58B075-67F8-4A8D-AE1C-3D3E4193EBCA}" type="datetimeFigureOut">
               <a:rPr lang="pt-BR" smtClean="0"/>
-              <a:t>09/05/2019</a:t>
+              <a:t>10/05/2019</a:t>
             </a:fld>
             <a:endParaRPr lang="pt-BR"/>
           </a:p>
@@ -1024,7 +1024,7 @@
           <a:p>
             <a:fld id="{CC58B075-67F8-4A8D-AE1C-3D3E4193EBCA}" type="datetimeFigureOut">
               <a:rPr lang="pt-BR" smtClean="0"/>
-              <a:t>09/05/2019</a:t>
+              <a:t>10/05/2019</a:t>
             </a:fld>
             <a:endParaRPr lang="pt-BR"/>
           </a:p>
@@ -1253,7 +1253,7 @@
           <a:p>
             <a:fld id="{CC58B075-67F8-4A8D-AE1C-3D3E4193EBCA}" type="datetimeFigureOut">
               <a:rPr lang="pt-BR" smtClean="0"/>
-              <a:t>09/05/2019</a:t>
+              <a:t>10/05/2019</a:t>
             </a:fld>
             <a:endParaRPr lang="pt-BR"/>
           </a:p>
@@ -1617,7 +1617,7 @@
           <a:p>
             <a:fld id="{CC58B075-67F8-4A8D-AE1C-3D3E4193EBCA}" type="datetimeFigureOut">
               <a:rPr lang="pt-BR" smtClean="0"/>
-              <a:t>09/05/2019</a:t>
+              <a:t>10/05/2019</a:t>
             </a:fld>
             <a:endParaRPr lang="pt-BR"/>
           </a:p>
@@ -1734,7 +1734,7 @@
           <a:p>
             <a:fld id="{CC58B075-67F8-4A8D-AE1C-3D3E4193EBCA}" type="datetimeFigureOut">
               <a:rPr lang="pt-BR" smtClean="0"/>
-              <a:t>09/05/2019</a:t>
+              <a:t>10/05/2019</a:t>
             </a:fld>
             <a:endParaRPr lang="pt-BR"/>
           </a:p>
@@ -1829,7 +1829,7 @@
           <a:p>
             <a:fld id="{CC58B075-67F8-4A8D-AE1C-3D3E4193EBCA}" type="datetimeFigureOut">
               <a:rPr lang="pt-BR" smtClean="0"/>
-              <a:t>09/05/2019</a:t>
+              <a:t>10/05/2019</a:t>
             </a:fld>
             <a:endParaRPr lang="pt-BR"/>
           </a:p>
@@ -2104,7 +2104,7 @@
           <a:p>
             <a:fld id="{CC58B075-67F8-4A8D-AE1C-3D3E4193EBCA}" type="datetimeFigureOut">
               <a:rPr lang="pt-BR" smtClean="0"/>
-              <a:t>09/05/2019</a:t>
+              <a:t>10/05/2019</a:t>
             </a:fld>
             <a:endParaRPr lang="pt-BR"/>
           </a:p>
@@ -2356,7 +2356,7 @@
           <a:p>
             <a:fld id="{CC58B075-67F8-4A8D-AE1C-3D3E4193EBCA}" type="datetimeFigureOut">
               <a:rPr lang="pt-BR" smtClean="0"/>
-              <a:t>09/05/2019</a:t>
+              <a:t>10/05/2019</a:t>
             </a:fld>
             <a:endParaRPr lang="pt-BR"/>
           </a:p>
@@ -2567,7 +2567,7 @@
           <a:p>
             <a:fld id="{CC58B075-67F8-4A8D-AE1C-3D3E4193EBCA}" type="datetimeFigureOut">
               <a:rPr lang="pt-BR" smtClean="0"/>
-              <a:t>09/05/2019</a:t>
+              <a:t>10/05/2019</a:t>
             </a:fld>
             <a:endParaRPr lang="pt-BR"/>
           </a:p>
@@ -7173,8 +7173,8 @@
         </p:nvSpPr>
         <p:spPr>
           <a:xfrm>
-            <a:off x="759177" y="779940"/>
-            <a:ext cx="9931401" cy="369332"/>
+            <a:off x="759177" y="802518"/>
+            <a:ext cx="9931401" cy="2031325"/>
           </a:xfrm>
           <a:prstGeom prst="rect">
             <a:avLst/>
@@ -7188,20 +7188,45 @@
           <a:lstStyle/>
           <a:p>
             <a:r>
-              <a:rPr lang="pt-BR" i="1" dirty="0" err="1" smtClean="0">
-                <a:solidFill>
-                  <a:schemeClr val="accent5"/>
-                </a:solidFill>
-              </a:rPr>
-              <a:t>const</a:t>
-            </a:r>
-            <a:r>
-              <a:rPr lang="pt-BR" i="1" dirty="0" smtClean="0">
-                <a:solidFill>
-                  <a:schemeClr val="accent5"/>
-                </a:solidFill>
-              </a:rPr>
-              <a:t> ....</a:t>
+              <a:rPr lang="pt-BR" i="1" dirty="0" smtClean="0"/>
+              <a:t>Capacidade de </a:t>
+            </a:r>
+            <a:r>
+              <a:rPr lang="pt-BR" i="1" dirty="0"/>
+              <a:t>isolar todo o código que acessa seu repositório de dados em um único lugar. Assim, toda vez que o desenvolvedor precisar realizar operações de persistência ele verá que existe um único local para isso, seus </a:t>
+            </a:r>
+            <a:r>
+              <a:rPr lang="pt-BR" i="1" dirty="0" err="1"/>
+              <a:t>DAO's</a:t>
+            </a:r>
+            <a:r>
+              <a:rPr lang="pt-BR" i="1" dirty="0"/>
+              <a:t>.</a:t>
+            </a:r>
+          </a:p>
+          <a:p>
+            <a:endParaRPr lang="pt-BR" i="1" dirty="0"/>
+          </a:p>
+          <a:p>
+            <a:r>
+              <a:rPr lang="pt-BR" i="1" dirty="0"/>
+              <a:t>Falando um pouco mais técnico e nem por isso menos bonito, o DAO faz parte da camada de persistência, funciona como uma fachada para a API do </a:t>
+            </a:r>
+            <a:r>
+              <a:rPr lang="pt-BR" i="1" dirty="0" err="1"/>
+              <a:t>IndexedDB</a:t>
+            </a:r>
+            <a:r>
+              <a:rPr lang="pt-BR" i="1" dirty="0"/>
+              <a:t>. Repare que para usar o DAO não é preciso saber os detalhes do </a:t>
+            </a:r>
+            <a:r>
+              <a:rPr lang="pt-BR" i="1" dirty="0" err="1"/>
+              <a:t>store</a:t>
+            </a:r>
+            <a:r>
+              <a:rPr lang="pt-BR" i="1" dirty="0"/>
+              <a:t> ou cursor.</a:t>
             </a:r>
             <a:endParaRPr lang="pt-BR" b="1" dirty="0"/>
           </a:p>

</xml_diff>

<commit_message>
Mais ajustes no Service
</commit_message>
<xml_diff>
--- a/docs/JS Avançado 1-2-3-resumo.pptx
+++ b/docs/JS Avançado 1-2-3-resumo.pptx
@@ -265,7 +265,7 @@
           <a:p>
             <a:fld id="{CC58B075-67F8-4A8D-AE1C-3D3E4193EBCA}" type="datetimeFigureOut">
               <a:rPr lang="pt-BR" smtClean="0"/>
-              <a:t>10/05/2019</a:t>
+              <a:t>15/05/19</a:t>
             </a:fld>
             <a:endParaRPr lang="pt-BR"/>
           </a:p>
@@ -433,7 +433,7 @@
           <a:p>
             <a:fld id="{CC58B075-67F8-4A8D-AE1C-3D3E4193EBCA}" type="datetimeFigureOut">
               <a:rPr lang="pt-BR" smtClean="0"/>
-              <a:t>10/05/2019</a:t>
+              <a:t>15/05/19</a:t>
             </a:fld>
             <a:endParaRPr lang="pt-BR"/>
           </a:p>
@@ -611,7 +611,7 @@
           <a:p>
             <a:fld id="{CC58B075-67F8-4A8D-AE1C-3D3E4193EBCA}" type="datetimeFigureOut">
               <a:rPr lang="pt-BR" smtClean="0"/>
-              <a:t>10/05/2019</a:t>
+              <a:t>15/05/19</a:t>
             </a:fld>
             <a:endParaRPr lang="pt-BR"/>
           </a:p>
@@ -779,7 +779,7 @@
           <a:p>
             <a:fld id="{CC58B075-67F8-4A8D-AE1C-3D3E4193EBCA}" type="datetimeFigureOut">
               <a:rPr lang="pt-BR" smtClean="0"/>
-              <a:t>10/05/2019</a:t>
+              <a:t>15/05/19</a:t>
             </a:fld>
             <a:endParaRPr lang="pt-BR"/>
           </a:p>
@@ -1024,7 +1024,7 @@
           <a:p>
             <a:fld id="{CC58B075-67F8-4A8D-AE1C-3D3E4193EBCA}" type="datetimeFigureOut">
               <a:rPr lang="pt-BR" smtClean="0"/>
-              <a:t>10/05/2019</a:t>
+              <a:t>15/05/19</a:t>
             </a:fld>
             <a:endParaRPr lang="pt-BR"/>
           </a:p>
@@ -1253,7 +1253,7 @@
           <a:p>
             <a:fld id="{CC58B075-67F8-4A8D-AE1C-3D3E4193EBCA}" type="datetimeFigureOut">
               <a:rPr lang="pt-BR" smtClean="0"/>
-              <a:t>10/05/2019</a:t>
+              <a:t>15/05/19</a:t>
             </a:fld>
             <a:endParaRPr lang="pt-BR"/>
           </a:p>
@@ -1617,7 +1617,7 @@
           <a:p>
             <a:fld id="{CC58B075-67F8-4A8D-AE1C-3D3E4193EBCA}" type="datetimeFigureOut">
               <a:rPr lang="pt-BR" smtClean="0"/>
-              <a:t>10/05/2019</a:t>
+              <a:t>15/05/19</a:t>
             </a:fld>
             <a:endParaRPr lang="pt-BR"/>
           </a:p>
@@ -1734,7 +1734,7 @@
           <a:p>
             <a:fld id="{CC58B075-67F8-4A8D-AE1C-3D3E4193EBCA}" type="datetimeFigureOut">
               <a:rPr lang="pt-BR" smtClean="0"/>
-              <a:t>10/05/2019</a:t>
+              <a:t>15/05/19</a:t>
             </a:fld>
             <a:endParaRPr lang="pt-BR"/>
           </a:p>
@@ -1829,7 +1829,7 @@
           <a:p>
             <a:fld id="{CC58B075-67F8-4A8D-AE1C-3D3E4193EBCA}" type="datetimeFigureOut">
               <a:rPr lang="pt-BR" smtClean="0"/>
-              <a:t>10/05/2019</a:t>
+              <a:t>15/05/19</a:t>
             </a:fld>
             <a:endParaRPr lang="pt-BR"/>
           </a:p>
@@ -2104,7 +2104,7 @@
           <a:p>
             <a:fld id="{CC58B075-67F8-4A8D-AE1C-3D3E4193EBCA}" type="datetimeFigureOut">
               <a:rPr lang="pt-BR" smtClean="0"/>
-              <a:t>10/05/2019</a:t>
+              <a:t>15/05/19</a:t>
             </a:fld>
             <a:endParaRPr lang="pt-BR"/>
           </a:p>
@@ -2356,7 +2356,7 @@
           <a:p>
             <a:fld id="{CC58B075-67F8-4A8D-AE1C-3D3E4193EBCA}" type="datetimeFigureOut">
               <a:rPr lang="pt-BR" smtClean="0"/>
-              <a:t>10/05/2019</a:t>
+              <a:t>15/05/19</a:t>
             </a:fld>
             <a:endParaRPr lang="pt-BR"/>
           </a:p>
@@ -2567,7 +2567,7 @@
           <a:p>
             <a:fld id="{CC58B075-67F8-4A8D-AE1C-3D3E4193EBCA}" type="datetimeFigureOut">
               <a:rPr lang="pt-BR" smtClean="0"/>
-              <a:t>10/05/2019</a:t>
+              <a:t>15/05/19</a:t>
             </a:fld>
             <a:endParaRPr lang="pt-BR"/>
           </a:p>
@@ -4505,11 +4505,11 @@
           <a:p>
             <a:pPr algn="ctr"/>
             <a:r>
-              <a:rPr lang="pt-BR" sz="2800" b="1" dirty="0" smtClean="0"/>
+              <a:rPr lang="pt-BR" sz="2800" b="1" dirty="0"/>
               <a:t>Uma instância </a:t>
             </a:r>
             <a:r>
-              <a:rPr lang="pt-BR" sz="2800" b="1" dirty="0" err="1" smtClean="0"/>
+              <a:rPr lang="pt-BR" sz="2800" b="1" dirty="0" err="1"/>
               <a:t>ConnectionFactory</a:t>
             </a:r>
             <a:endParaRPr lang="pt-BR" sz="2800" b="1" dirty="0"/>
@@ -4546,7 +4546,7 @@
               <a:buNone/>
             </a:pPr>
             <a:r>
-              <a:rPr lang="pt-BR" sz="2800" dirty="0" smtClean="0">
+              <a:rPr lang="pt-BR" sz="2800" dirty="0">
                 <a:solidFill>
                   <a:schemeClr val="accent5"/>
                 </a:solidFill>
@@ -4554,7 +4554,7 @@
               <a:t>Não permitindo criar instâncias a partir dela e que possui um método estático </a:t>
             </a:r>
             <a:r>
-              <a:rPr lang="pt-BR" sz="2800" dirty="0" err="1" smtClean="0">
+              <a:rPr lang="pt-BR" sz="2800" dirty="0" err="1">
                 <a:solidFill>
                   <a:schemeClr val="accent5"/>
                 </a:solidFill>
@@ -4567,26 +4567,18 @@
                   <a:schemeClr val="accent5"/>
                 </a:solidFill>
               </a:rPr>
-              <a:t> </a:t>
-            </a:r>
-            <a:r>
-              <a:rPr lang="pt-BR" dirty="0" smtClean="0">
+              <a:t> cujo retorno é uma </a:t>
+            </a:r>
+            <a:r>
+              <a:rPr lang="pt-BR" dirty="0" err="1">
                 <a:solidFill>
                   <a:schemeClr val="accent5"/>
                 </a:solidFill>
               </a:rPr>
-              <a:t>cujo retorno é uma </a:t>
-            </a:r>
-            <a:r>
-              <a:rPr lang="pt-BR" dirty="0" err="1" smtClean="0">
-                <a:solidFill>
-                  <a:schemeClr val="accent5"/>
-                </a:solidFill>
-              </a:rPr>
               <a:t>promise</a:t>
             </a:r>
             <a:r>
-              <a:rPr lang="pt-BR" dirty="0" smtClean="0">
+              <a:rPr lang="pt-BR" dirty="0">
                 <a:solidFill>
                   <a:schemeClr val="accent5"/>
                 </a:solidFill>
@@ -4608,7 +4600,7 @@
             <a:pPr marL="0" indent="0">
               <a:buNone/>
             </a:pPr>
-            <a:endParaRPr lang="pt-BR" dirty="0" smtClean="0">
+            <a:endParaRPr lang="pt-BR" dirty="0">
               <a:solidFill>
                 <a:schemeClr val="accent5"/>
               </a:solidFill>
@@ -4866,7 +4858,7 @@
               <a:buNone/>
             </a:pPr>
             <a:r>
-              <a:rPr lang="pt-BR" sz="7200" dirty="0" smtClean="0"/>
+              <a:rPr lang="pt-BR" sz="7200" dirty="0"/>
               <a:t>        </a:t>
             </a:r>
             <a:r>
@@ -4939,7 +4931,7 @@
               <a:buNone/>
             </a:pPr>
             <a:r>
-              <a:rPr lang="pt-BR" sz="7200" dirty="0" smtClean="0"/>
+              <a:rPr lang="pt-BR" sz="7200" dirty="0"/>
               <a:t>        </a:t>
             </a:r>
             <a:r>
@@ -4964,25 +4956,16 @@
             </a:r>
             <a:r>
               <a:rPr lang="pt-BR" sz="7200" dirty="0"/>
-              <a:t>) =&gt; </a:t>
-            </a:r>
-            <a:r>
-              <a:rPr lang="pt-BR" sz="7200" dirty="0" smtClean="0"/>
-              <a:t>{  ...</a:t>
-            </a:r>
-            <a:endParaRPr lang="pt-BR" sz="7200" dirty="0"/>
+              <a:t>) =&gt; {  ...</a:t>
+            </a:r>
           </a:p>
           <a:p>
             <a:pPr marL="0" indent="0">
               <a:buNone/>
             </a:pPr>
             <a:r>
-              <a:rPr lang="pt-BR" sz="7200" dirty="0" smtClean="0"/>
-              <a:t>	        </a:t>
-            </a:r>
-            <a:r>
               <a:rPr lang="pt-BR" sz="7200" dirty="0"/>
-              <a:t>});</a:t>
+              <a:t>	        });</a:t>
             </a:r>
           </a:p>
           <a:p>
@@ -5002,14 +4985,13 @@
               <a:rPr lang="pt-BR" sz="7200" dirty="0"/>
               <a:t>}</a:t>
             </a:r>
-            <a:endParaRPr lang="pt-BR" sz="7200" dirty="0" smtClean="0"/>
           </a:p>
           <a:p>
             <a:pPr marL="0" indent="0">
               <a:buFont typeface="Arial" panose="020B0604020202020204" pitchFamily="34" charset="0"/>
               <a:buNone/>
             </a:pPr>
-            <a:endParaRPr lang="pt-BR" sz="7200" dirty="0" smtClean="0"/>
+            <a:endParaRPr lang="pt-BR" sz="7200" dirty="0"/>
           </a:p>
           <a:p>
             <a:pPr marL="0" indent="0">
@@ -5074,11 +5056,11 @@
           <a:p>
             <a:pPr algn="ctr"/>
             <a:r>
-              <a:rPr lang="pt-BR" sz="2800" b="1" dirty="0" smtClean="0"/>
+              <a:rPr lang="pt-BR" sz="2800" b="1" dirty="0"/>
               <a:t>Module </a:t>
             </a:r>
             <a:r>
-              <a:rPr lang="pt-BR" sz="2800" b="1" dirty="0" err="1" smtClean="0"/>
+              <a:rPr lang="pt-BR" sz="2800" b="1" dirty="0" err="1"/>
               <a:t>Pattern</a:t>
             </a:r>
             <a:endParaRPr lang="pt-BR" sz="2800" b="1" dirty="0"/>
@@ -5187,11 +5169,11 @@
           <a:p>
             <a:pPr algn="ctr"/>
             <a:r>
-              <a:rPr lang="pt-BR" sz="2800" dirty="0" smtClean="0"/>
+              <a:rPr lang="pt-BR" sz="2800" dirty="0"/>
               <a:t>Método </a:t>
             </a:r>
             <a:r>
-              <a:rPr lang="pt-BR" sz="2800" dirty="0" err="1" smtClean="0"/>
+              <a:rPr lang="pt-BR" sz="2800" dirty="0" err="1"/>
               <a:t>getConnection</a:t>
             </a:r>
             <a:endParaRPr lang="pt-BR" sz="2800" dirty="0"/>
@@ -5261,7 +5243,7 @@
               <a:buNone/>
             </a:pPr>
             <a:r>
-              <a:rPr lang="pt-BR" sz="1400" dirty="0" smtClean="0">
+              <a:rPr lang="pt-BR" sz="1400" dirty="0">
                 <a:solidFill>
                   <a:schemeClr val="accent5"/>
                 </a:solidFill>
@@ -5290,7 +5272,7 @@
               <a:buNone/>
             </a:pPr>
             <a:r>
-              <a:rPr lang="pt-BR" sz="1400" dirty="0" smtClean="0">
+              <a:rPr lang="pt-BR" sz="1400" dirty="0">
                 <a:solidFill>
                   <a:schemeClr val="accent5"/>
                 </a:solidFill>
@@ -5298,7 +5280,7 @@
               <a:t>       </a:t>
             </a:r>
             <a:r>
-              <a:rPr lang="pt-BR" sz="1400" dirty="0" smtClean="0">
+              <a:rPr lang="pt-BR" sz="1400" dirty="0">
                 <a:solidFill>
                   <a:schemeClr val="accent2"/>
                 </a:solidFill>
@@ -5427,7 +5409,7 @@
               <a:buNone/>
             </a:pPr>
             <a:r>
-              <a:rPr lang="pt-BR" sz="1400" dirty="0" smtClean="0">
+              <a:rPr lang="pt-BR" sz="1400" dirty="0">
                 <a:solidFill>
                   <a:schemeClr val="accent2"/>
                 </a:solidFill>
@@ -5488,7 +5470,7 @@
               <a:buNone/>
             </a:pPr>
             <a:r>
-              <a:rPr lang="pt-BR" sz="1400" dirty="0" smtClean="0">
+              <a:rPr lang="pt-BR" sz="1400" dirty="0">
                 <a:solidFill>
                   <a:schemeClr val="accent2"/>
                 </a:solidFill>
@@ -5549,7 +5531,7 @@
               <a:buNone/>
             </a:pPr>
             <a:r>
-              <a:rPr lang="pt-BR" sz="1400" dirty="0" smtClean="0">
+              <a:rPr lang="pt-BR" sz="1400" dirty="0">
                 <a:solidFill>
                   <a:schemeClr val="accent2"/>
                 </a:solidFill>
@@ -5578,7 +5560,7 @@
               <a:buNone/>
             </a:pPr>
             <a:r>
-              <a:rPr lang="pt-BR" sz="1400" dirty="0" smtClean="0">
+              <a:rPr lang="pt-BR" sz="1400" dirty="0">
                 <a:solidFill>
                   <a:schemeClr val="accent2"/>
                 </a:solidFill>
@@ -5639,20 +5621,25 @@
               <a:buNone/>
             </a:pPr>
             <a:r>
-              <a:rPr lang="pt-BR" sz="1400" dirty="0" smtClean="0">
+              <a:rPr lang="pt-BR" sz="1400" dirty="0">
                 <a:solidFill>
                   <a:schemeClr val="accent2"/>
                 </a:solidFill>
               </a:rPr>
-              <a:t>            </a:t>
-            </a:r>
+              <a:t>            };</a:t>
+            </a:r>
+          </a:p>
+          <a:p>
+            <a:pPr marL="0" indent="0">
+              <a:buNone/>
+            </a:pPr>
             <a:r>
               <a:rPr lang="pt-BR" sz="1400" dirty="0">
                 <a:solidFill>
-                  <a:schemeClr val="accent2"/>
-                </a:solidFill>
-              </a:rPr>
-              <a:t>};</a:t>
+                  <a:schemeClr val="accent5"/>
+                </a:solidFill>
+              </a:rPr>
+              <a:t>        });</a:t>
             </a:r>
           </a:p>
           <a:p>
@@ -5660,40 +5647,19 @@
               <a:buNone/>
             </a:pPr>
             <a:r>
-              <a:rPr lang="pt-BR" sz="1400" dirty="0" smtClean="0">
+              <a:rPr lang="pt-BR" sz="1400" dirty="0">
                 <a:solidFill>
                   <a:schemeClr val="accent5"/>
                 </a:solidFill>
               </a:rPr>
-              <a:t>        </a:t>
-            </a:r>
-            <a:r>
-              <a:rPr lang="pt-BR" sz="1400" dirty="0">
-                <a:solidFill>
-                  <a:schemeClr val="accent5"/>
-                </a:solidFill>
-              </a:rPr>
-              <a:t>});</a:t>
+              <a:t>    }</a:t>
             </a:r>
           </a:p>
           <a:p>
             <a:pPr marL="0" indent="0">
               <a:buNone/>
             </a:pPr>
-            <a:r>
-              <a:rPr lang="pt-BR" sz="1400" dirty="0">
-                <a:solidFill>
-                  <a:schemeClr val="accent5"/>
-                </a:solidFill>
-              </a:rPr>
-              <a:t>    }</a:t>
-            </a:r>
-          </a:p>
-          <a:p>
-            <a:pPr marL="0" indent="0">
-              <a:buNone/>
-            </a:pPr>
-            <a:endParaRPr lang="pt-BR" sz="1400" dirty="0" smtClean="0">
+            <a:endParaRPr lang="pt-BR" sz="1400" dirty="0">
               <a:solidFill>
                 <a:schemeClr val="accent5"/>
               </a:solidFill>
@@ -5704,7 +5670,7 @@
               <a:buNone/>
             </a:pPr>
             <a:r>
-              <a:rPr lang="pt-BR" sz="1400" dirty="0" smtClean="0">
+              <a:rPr lang="pt-BR" sz="1400" dirty="0">
                 <a:solidFill>
                   <a:schemeClr val="accent5"/>
                 </a:solidFill>
@@ -5757,7 +5723,7 @@
               <a:buNone/>
             </a:pPr>
             <a:r>
-              <a:rPr lang="pt-BR" sz="1400" dirty="0" smtClean="0">
+              <a:rPr lang="pt-BR" sz="1400" dirty="0">
                 <a:solidFill>
                   <a:schemeClr val="accent2"/>
                 </a:solidFill>
@@ -5927,20 +5893,12 @@
               <a:buNone/>
             </a:pPr>
             <a:r>
-              <a:rPr lang="pt-BR" sz="1400" dirty="0" smtClean="0">
+              <a:rPr lang="pt-BR" sz="1400" dirty="0">
                 <a:solidFill>
                   <a:schemeClr val="accent5"/>
                 </a:solidFill>
               </a:rPr>
-              <a:t>    </a:t>
-            </a:r>
-            <a:r>
-              <a:rPr lang="pt-BR" sz="1400" dirty="0">
-                <a:solidFill>
-                  <a:schemeClr val="accent5"/>
-                </a:solidFill>
-              </a:rPr>
-              <a:t>}</a:t>
+              <a:t>    }</a:t>
             </a:r>
           </a:p>
           <a:p>
@@ -6303,14 +6261,13 @@
           <a:p>
             <a:pPr algn="ctr"/>
             <a:r>
-              <a:rPr lang="pt-BR" sz="2800" b="1" dirty="0" err="1" smtClean="0"/>
+              <a:rPr lang="pt-BR" sz="2800" b="1" dirty="0" err="1"/>
               <a:t>Monkey</a:t>
             </a:r>
             <a:r>
-              <a:rPr lang="pt-BR" sz="2800" b="1" dirty="0" smtClean="0"/>
+              <a:rPr lang="pt-BR" sz="2800" b="1" dirty="0"/>
               <a:t> Patch</a:t>
             </a:r>
-            <a:endParaRPr lang="pt-BR" sz="2800" b="1" dirty="0"/>
           </a:p>
         </p:txBody>
       </p:sp>
@@ -6385,114 +6342,113 @@
           <a:lstStyle/>
           <a:p>
             <a:r>
-              <a:rPr lang="pt-BR" dirty="0" smtClean="0"/>
+              <a:rPr lang="pt-BR" dirty="0"/>
               <a:t>Modificando dinamicamente </a:t>
             </a:r>
             <a:r>
-              <a:rPr lang="pt-BR" b="1" dirty="0" err="1" smtClean="0"/>
-              <a:t>obterComeCompleto</a:t>
-            </a:r>
-            <a:r>
-              <a:rPr lang="pt-BR" dirty="0" smtClean="0"/>
+              <a:rPr lang="pt-BR" b="1" dirty="0" err="1"/>
+              <a:t>obterNomeCompleto</a:t>
+            </a:r>
+            <a:r>
+              <a:rPr lang="pt-BR" dirty="0"/>
               <a:t> apenas na instância </a:t>
             </a:r>
             <a:r>
-              <a:rPr lang="pt-BR" b="1" dirty="0" smtClean="0"/>
+              <a:rPr lang="pt-BR" b="1" dirty="0"/>
               <a:t>pessoa2</a:t>
             </a:r>
             <a:r>
-              <a:rPr lang="pt-BR" dirty="0" smtClean="0"/>
+              <a:rPr lang="pt-BR" dirty="0"/>
               <a:t>. Usamos </a:t>
             </a:r>
             <a:r>
-              <a:rPr lang="pt-BR" b="1" dirty="0" err="1" smtClean="0"/>
+              <a:rPr lang="pt-BR" b="1" dirty="0" err="1"/>
               <a:t>function</a:t>
             </a:r>
             <a:r>
-              <a:rPr lang="pt-BR" dirty="0" smtClean="0"/>
+              <a:rPr lang="pt-BR" dirty="0"/>
               <a:t> e não </a:t>
             </a:r>
             <a:r>
-              <a:rPr lang="pt-BR" b="1" dirty="0" err="1" smtClean="0"/>
+              <a:rPr lang="pt-BR" b="1" dirty="0" err="1"/>
               <a:t>arrow</a:t>
             </a:r>
             <a:r>
-              <a:rPr lang="pt-BR" b="1" dirty="0" smtClean="0"/>
+              <a:rPr lang="pt-BR" b="1" dirty="0"/>
               <a:t> </a:t>
             </a:r>
             <a:r>
-              <a:rPr lang="pt-BR" b="1" dirty="0" err="1" smtClean="0"/>
+              <a:rPr lang="pt-BR" b="1" dirty="0" err="1"/>
               <a:t>function</a:t>
             </a:r>
             <a:r>
-              <a:rPr lang="pt-BR" dirty="0" smtClean="0"/>
+              <a:rPr lang="pt-BR" dirty="0"/>
               <a:t> devido ao seu escopo </a:t>
             </a:r>
             <a:r>
-              <a:rPr lang="pt-BR" u="sng" dirty="0" smtClean="0"/>
+              <a:rPr lang="pt-BR" u="sng" dirty="0"/>
               <a:t>dinâmico</a:t>
             </a:r>
             <a:r>
-              <a:rPr lang="pt-BR" dirty="0" smtClean="0"/>
+              <a:rPr lang="pt-BR" dirty="0"/>
               <a:t>, isto é, </a:t>
             </a:r>
             <a:r>
-              <a:rPr lang="pt-BR" b="1" dirty="0" err="1" smtClean="0"/>
+              <a:rPr lang="pt-BR" b="1" dirty="0" err="1"/>
               <a:t>this</a:t>
             </a:r>
             <a:r>
-              <a:rPr lang="pt-BR" dirty="0" smtClean="0"/>
+              <a:rPr lang="pt-BR" dirty="0"/>
               <a:t> deve variar de acordo com a instância no qual </a:t>
             </a:r>
             <a:r>
-              <a:rPr lang="pt-BR" b="1" dirty="0" err="1" smtClean="0"/>
+              <a:rPr lang="pt-BR" b="1" dirty="0" err="1"/>
               <a:t>obternomeCompleto</a:t>
             </a:r>
             <a:r>
-              <a:rPr lang="pt-BR" dirty="0" smtClean="0"/>
+              <a:rPr lang="pt-BR" dirty="0"/>
               <a:t> é chamado. Se usarmos o </a:t>
             </a:r>
             <a:r>
-              <a:rPr lang="pt-BR" b="1" dirty="0" err="1" smtClean="0"/>
+              <a:rPr lang="pt-BR" b="1" dirty="0" err="1"/>
               <a:t>arrow</a:t>
             </a:r>
             <a:r>
-              <a:rPr lang="pt-BR" b="1" dirty="0" smtClean="0"/>
+              <a:rPr lang="pt-BR" b="1" dirty="0"/>
               <a:t> </a:t>
             </a:r>
             <a:r>
-              <a:rPr lang="pt-BR" b="1" dirty="0" err="1" smtClean="0"/>
+              <a:rPr lang="pt-BR" b="1" dirty="0" err="1"/>
               <a:t>function</a:t>
             </a:r>
             <a:r>
-              <a:rPr lang="pt-BR" dirty="0" smtClean="0"/>
+              <a:rPr lang="pt-BR" dirty="0"/>
               <a:t> o escopo será </a:t>
             </a:r>
             <a:r>
-              <a:rPr lang="pt-BR" b="1" dirty="0" smtClean="0"/>
+              <a:rPr lang="pt-BR" b="1" dirty="0"/>
               <a:t>léxico</a:t>
             </a:r>
             <a:r>
-              <a:rPr lang="pt-BR" dirty="0" smtClean="0"/>
+              <a:rPr lang="pt-BR" dirty="0"/>
               <a:t> e fará com que o contexto seja sempre o da função declarada, no caso, </a:t>
             </a:r>
             <a:r>
-              <a:rPr lang="pt-BR" b="1" dirty="0" err="1" smtClean="0"/>
+              <a:rPr lang="pt-BR" b="1" dirty="0" err="1"/>
               <a:t>window</a:t>
             </a:r>
             <a:r>
-              <a:rPr lang="pt-BR" dirty="0" smtClean="0"/>
+              <a:rPr lang="pt-BR" dirty="0"/>
               <a:t>, o escopo </a:t>
             </a:r>
             <a:r>
-              <a:rPr lang="pt-BR" b="1" dirty="0" smtClean="0"/>
+              <a:rPr lang="pt-BR" b="1" dirty="0"/>
               <a:t>global</a:t>
             </a:r>
             <a:r>
-              <a:rPr lang="pt-BR" dirty="0" smtClean="0"/>
+              <a:rPr lang="pt-BR" dirty="0"/>
               <a:t>. </a:t>
             </a:r>
-            <a:endParaRPr lang="pt-BR" dirty="0"/>
           </a:p>
         </p:txBody>
       </p:sp>
@@ -6543,10 +6499,9 @@
           <a:lstStyle/>
           <a:p>
             <a:r>
-              <a:rPr lang="pt-BR" dirty="0" smtClean="0"/>
+              <a:rPr lang="pt-BR" dirty="0"/>
               <a:t>Se quisermos mudar a definição diretamente na própria classe, pode-se fazer como no exemplo abaixo. Mas nos dois casos deve-se ter bastante cuidado.</a:t>
             </a:r>
-            <a:endParaRPr lang="pt-BR" dirty="0"/>
           </a:p>
         </p:txBody>
       </p:sp>
@@ -6634,10 +6589,9 @@
           <a:p>
             <a:pPr algn="ctr"/>
             <a:r>
-              <a:rPr lang="pt-BR" sz="2800" b="1" dirty="0" smtClean="0"/>
+              <a:rPr lang="pt-BR" sz="2800" b="1" dirty="0"/>
               <a:t>Variáveis imutáveis =&gt; Constantes</a:t>
             </a:r>
-            <a:endParaRPr lang="pt-BR" sz="2800" b="1" dirty="0"/>
           </a:p>
         </p:txBody>
       </p:sp>
@@ -6664,10 +6618,9 @@
           <a:lstStyle/>
           <a:p>
             <a:r>
-              <a:rPr lang="pt-BR" dirty="0" smtClean="0"/>
+              <a:rPr lang="pt-BR" dirty="0"/>
               <a:t>Recurso do Ecma2015 ( ES6 ) </a:t>
             </a:r>
-            <a:endParaRPr lang="pt-BR" dirty="0"/>
           </a:p>
         </p:txBody>
       </p:sp>
@@ -6742,7 +6695,7 @@
           <a:lstStyle/>
           <a:p>
             <a:r>
-              <a:rPr lang="pt-BR" dirty="0" smtClean="0"/>
+              <a:rPr lang="pt-BR" dirty="0"/>
               <a:t>Se você tentar alterar.</a:t>
             </a:r>
           </a:p>
@@ -6751,7 +6704,7 @@
           </a:p>
           <a:p>
             <a:r>
-              <a:rPr lang="pt-BR" i="1" dirty="0" err="1" smtClean="0">
+              <a:rPr lang="pt-BR" i="1" dirty="0" err="1">
                 <a:solidFill>
                   <a:schemeClr val="accent5"/>
                 </a:solidFill>
@@ -6759,7 +6712,7 @@
               <a:t>const</a:t>
             </a:r>
             <a:r>
-              <a:rPr lang="pt-BR" i="1" dirty="0" smtClean="0">
+              <a:rPr lang="pt-BR" i="1" dirty="0">
                 <a:solidFill>
                   <a:schemeClr val="accent5"/>
                 </a:solidFill>
@@ -6772,7 +6725,7 @@
           </a:p>
           <a:p>
             <a:r>
-              <a:rPr lang="pt-BR" dirty="0" smtClean="0"/>
+              <a:rPr lang="pt-BR" dirty="0"/>
               <a:t>E depois: </a:t>
             </a:r>
           </a:p>
@@ -6781,7 +6734,7 @@
           </a:p>
           <a:p>
             <a:r>
-              <a:rPr lang="pt-BR" i="1" dirty="0" smtClean="0">
+              <a:rPr lang="pt-BR" i="1" dirty="0">
                 <a:solidFill>
                   <a:schemeClr val="accent5"/>
                 </a:solidFill>
@@ -6793,62 +6746,61 @@
             <a:endParaRPr lang="pt-BR" dirty="0"/>
           </a:p>
           <a:p>
-            <a:endParaRPr lang="pt-BR" dirty="0" smtClean="0"/>
-          </a:p>
-          <a:p>
-            <a:r>
-              <a:rPr lang="pt-BR" dirty="0" smtClean="0"/>
+            <a:endParaRPr lang="pt-BR" dirty="0"/>
+          </a:p>
+          <a:p>
+            <a:r>
+              <a:rPr lang="pt-BR" dirty="0"/>
               <a:t>Aparecerá o erro </a:t>
             </a:r>
             <a:r>
-              <a:rPr lang="pt-BR" b="1" dirty="0" err="1" smtClean="0"/>
+              <a:rPr lang="pt-BR" b="1" dirty="0" err="1"/>
               <a:t>Uncaught</a:t>
             </a:r>
             <a:r>
-              <a:rPr lang="pt-BR" b="1" dirty="0" smtClean="0"/>
+              <a:rPr lang="pt-BR" b="1" dirty="0"/>
               <a:t> </a:t>
             </a:r>
             <a:r>
-              <a:rPr lang="pt-BR" b="1" dirty="0" err="1" smtClean="0"/>
+              <a:rPr lang="pt-BR" b="1" dirty="0" err="1"/>
               <a:t>TypeError</a:t>
             </a:r>
             <a:r>
-              <a:rPr lang="pt-BR" b="1" dirty="0" smtClean="0"/>
+              <a:rPr lang="pt-BR" b="1" dirty="0"/>
               <a:t>: </a:t>
             </a:r>
             <a:r>
-              <a:rPr lang="pt-BR" b="1" dirty="0" err="1" smtClean="0"/>
+              <a:rPr lang="pt-BR" b="1" dirty="0" err="1"/>
               <a:t>Assisgnment</a:t>
             </a:r>
             <a:r>
-              <a:rPr lang="pt-BR" b="1" dirty="0" smtClean="0"/>
+              <a:rPr lang="pt-BR" b="1" dirty="0"/>
               <a:t> </a:t>
             </a:r>
             <a:r>
-              <a:rPr lang="pt-BR" b="1" dirty="0" err="1" smtClean="0"/>
+              <a:rPr lang="pt-BR" b="1" dirty="0" err="1"/>
               <a:t>to</a:t>
             </a:r>
             <a:r>
-              <a:rPr lang="pt-BR" b="1" dirty="0" smtClean="0"/>
+              <a:rPr lang="pt-BR" b="1" dirty="0"/>
               <a:t> </a:t>
             </a:r>
             <a:r>
-              <a:rPr lang="pt-BR" b="1" dirty="0" err="1" smtClean="0"/>
+              <a:rPr lang="pt-BR" b="1" dirty="0" err="1"/>
               <a:t>constant</a:t>
             </a:r>
             <a:r>
-              <a:rPr lang="pt-BR" b="1" dirty="0" smtClean="0"/>
+              <a:rPr lang="pt-BR" b="1" dirty="0"/>
               <a:t> </a:t>
             </a:r>
             <a:r>
-              <a:rPr lang="pt-BR" b="1" dirty="0" err="1" smtClean="0"/>
+              <a:rPr lang="pt-BR" b="1" dirty="0" err="1"/>
               <a:t>variable</a:t>
             </a:r>
             <a:r>
-              <a:rPr lang="pt-BR" b="1" dirty="0" smtClean="0"/>
+              <a:rPr lang="pt-BR" b="1" dirty="0"/>
               <a:t> </a:t>
             </a:r>
-            <a:endParaRPr lang="pt-BR" b="1" dirty="0"/>
           </a:p>
         </p:txBody>
       </p:sp>
@@ -6906,10 +6858,9 @@
           <a:p>
             <a:pPr algn="ctr"/>
             <a:r>
-              <a:rPr lang="pt-BR" sz="2800" b="1" dirty="0" smtClean="0"/>
+              <a:rPr lang="pt-BR" sz="2800" b="1" dirty="0"/>
               <a:t>Variáveis imutáveis =&gt; Constantes</a:t>
             </a:r>
-            <a:endParaRPr lang="pt-BR" sz="2800" b="1" dirty="0"/>
           </a:p>
         </p:txBody>
       </p:sp>
@@ -6936,7 +6887,7 @@
           <a:lstStyle/>
           <a:p>
             <a:r>
-              <a:rPr lang="pt-BR" i="1" dirty="0" err="1" smtClean="0">
+              <a:rPr lang="pt-BR" i="1" dirty="0" err="1">
                 <a:solidFill>
                   <a:schemeClr val="accent5"/>
                 </a:solidFill>
@@ -6944,7 +6895,7 @@
               <a:t>const</a:t>
             </a:r>
             <a:r>
-              <a:rPr lang="pt-BR" i="1" dirty="0" smtClean="0">
+              <a:rPr lang="pt-BR" i="1" dirty="0">
                 <a:solidFill>
                   <a:schemeClr val="accent5"/>
                 </a:solidFill>
@@ -6954,7 +6905,7 @@
           </a:p>
           <a:p>
             <a:r>
-              <a:rPr lang="pt-BR" i="1" dirty="0" smtClean="0">
+              <a:rPr lang="pt-BR" i="1" dirty="0">
                 <a:solidFill>
                   <a:schemeClr val="accent5"/>
                 </a:solidFill>
@@ -6967,7 +6918,7 @@
           </a:p>
           <a:p>
             <a:r>
-              <a:rPr lang="pt-BR" dirty="0" smtClean="0"/>
+              <a:rPr lang="pt-BR" dirty="0"/>
               <a:t>Mas,  </a:t>
             </a:r>
           </a:p>
@@ -6989,111 +6940,98 @@
                   <a:schemeClr val="accent5"/>
                 </a:solidFill>
               </a:rPr>
-              <a:t> hoje = new Date</a:t>
-            </a:r>
-            <a:r>
-              <a:rPr lang="pt-BR" i="1" dirty="0" smtClean="0">
+              <a:t> hoje = new Date();</a:t>
+            </a:r>
+          </a:p>
+          <a:p>
+            <a:r>
+              <a:rPr lang="pt-BR" i="1" dirty="0" err="1">
                 <a:solidFill>
                   <a:schemeClr val="accent5"/>
                 </a:solidFill>
               </a:rPr>
-              <a:t>();</a:t>
-            </a:r>
-          </a:p>
-          <a:p>
-            <a:r>
-              <a:rPr lang="pt-BR" i="1" dirty="0" err="1" smtClean="0">
+              <a:t>Hoje.setDate</a:t>
+            </a:r>
+            <a:r>
+              <a:rPr lang="pt-BR" i="1" dirty="0">
                 <a:solidFill>
                   <a:schemeClr val="accent5"/>
                 </a:solidFill>
               </a:rPr>
-              <a:t>Hoje.setDate</a:t>
-            </a:r>
-            <a:r>
-              <a:rPr lang="pt-BR" i="1" dirty="0" smtClean="0">
+              <a:t>(5);</a:t>
+            </a:r>
+          </a:p>
+          <a:p>
+            <a:r>
+              <a:rPr lang="pt-BR" i="1" dirty="0">
                 <a:solidFill>
                   <a:schemeClr val="accent5"/>
                 </a:solidFill>
               </a:rPr>
-              <a:t>(5);</a:t>
-            </a:r>
-          </a:p>
-          <a:p>
-            <a:r>
-              <a:rPr lang="pt-BR" i="1" dirty="0" smtClean="0">
+              <a:t>console.log(</a:t>
+            </a:r>
+            <a:r>
+              <a:rPr lang="pt-BR" i="1" dirty="0" err="1">
                 <a:solidFill>
                   <a:schemeClr val="accent5"/>
                 </a:solidFill>
               </a:rPr>
-              <a:t>console.log(</a:t>
-            </a:r>
-            <a:r>
-              <a:rPr lang="pt-BR" i="1" dirty="0" err="1" smtClean="0">
+              <a:t>hoje.getDate</a:t>
+            </a:r>
+            <a:r>
+              <a:rPr lang="pt-BR" i="1" dirty="0">
                 <a:solidFill>
                   <a:schemeClr val="accent5"/>
                 </a:solidFill>
               </a:rPr>
-              <a:t>hoje.getDate</a:t>
-            </a:r>
-            <a:r>
-              <a:rPr lang="pt-BR" i="1" dirty="0" smtClean="0">
+              <a:t>()); // Alterou para o dia 5!</a:t>
+            </a:r>
+          </a:p>
+          <a:p>
+            <a:endParaRPr lang="pt-BR" dirty="0"/>
+          </a:p>
+          <a:p>
+            <a:endParaRPr lang="pt-BR" dirty="0"/>
+          </a:p>
+          <a:p>
+            <a:r>
+              <a:rPr lang="pt-BR" dirty="0"/>
+              <a:t>Neste caso não estamos atribuindo um novo valor para a variável, como fizemos com o operador “</a:t>
+            </a:r>
+            <a:r>
+              <a:rPr lang="pt-BR" b="1" dirty="0"/>
+              <a:t>=</a:t>
+            </a:r>
+            <a:r>
+              <a:rPr lang="pt-BR" dirty="0"/>
+              <a:t>“, mas alterando as propriedades do objeto </a:t>
+            </a:r>
+            <a:r>
+              <a:rPr lang="pt-BR" b="1" i="1" dirty="0">
                 <a:solidFill>
                   <a:schemeClr val="accent5"/>
                 </a:solidFill>
               </a:rPr>
-              <a:t>()); // Alterou para o dia 5!</a:t>
-            </a:r>
-            <a:endParaRPr lang="pt-BR" i="1" dirty="0">
-              <a:solidFill>
-                <a:schemeClr val="accent5"/>
-              </a:solidFill>
-            </a:endParaRPr>
-          </a:p>
-          <a:p>
-            <a:endParaRPr lang="pt-BR" dirty="0"/>
-          </a:p>
-          <a:p>
-            <a:endParaRPr lang="pt-BR" dirty="0" smtClean="0"/>
-          </a:p>
-          <a:p>
-            <a:r>
-              <a:rPr lang="pt-BR" dirty="0" smtClean="0"/>
-              <a:t>Neste caso não estamos atribuindo um novo valor para a variável, como fizemos com o operador “</a:t>
-            </a:r>
-            <a:r>
-              <a:rPr lang="pt-BR" b="1" dirty="0" smtClean="0"/>
-              <a:t>=</a:t>
-            </a:r>
-            <a:r>
-              <a:rPr lang="pt-BR" dirty="0" smtClean="0"/>
-              <a:t>“, mas alterando as propriedades do objeto </a:t>
-            </a:r>
-            <a:r>
-              <a:rPr lang="pt-BR" b="1" i="1" dirty="0" smtClean="0">
-                <a:solidFill>
-                  <a:schemeClr val="accent5"/>
-                </a:solidFill>
-              </a:rPr>
               <a:t>Date</a:t>
             </a:r>
             <a:r>
-              <a:rPr lang="pt-BR" dirty="0" smtClean="0"/>
+              <a:rPr lang="pt-BR" dirty="0"/>
               <a:t>, por meio dos seus métodos. Ou seja, </a:t>
             </a:r>
             <a:r>
-              <a:rPr lang="pt-BR" b="1" dirty="0" err="1" smtClean="0"/>
+              <a:rPr lang="pt-BR" b="1" dirty="0" err="1"/>
               <a:t>const</a:t>
             </a:r>
             <a:r>
-              <a:rPr lang="pt-BR" dirty="0" smtClean="0"/>
+              <a:rPr lang="pt-BR" dirty="0"/>
               <a:t> </a:t>
             </a:r>
             <a:r>
-              <a:rPr lang="pt-BR" u="sng" dirty="0" smtClean="0"/>
+              <a:rPr lang="pt-BR" u="sng" dirty="0"/>
               <a:t>não garante a imutabilidade</a:t>
             </a:r>
             <a:r>
-              <a:rPr lang="pt-BR" dirty="0" smtClean="0"/>
+              <a:rPr lang="pt-BR" dirty="0"/>
               <a:t>, apenas a atribuição de um novo valor para a variável. </a:t>
             </a:r>
             <a:endParaRPr lang="pt-BR" b="1" dirty="0"/>
@@ -7154,14 +7092,13 @@
           <a:p>
             <a:pPr algn="ctr"/>
             <a:r>
-              <a:rPr lang="pt-BR" sz="2800" b="1" dirty="0" err="1" smtClean="0"/>
+              <a:rPr lang="pt-BR" sz="2800" b="1" dirty="0" err="1"/>
               <a:t>Pattern</a:t>
             </a:r>
             <a:r>
-              <a:rPr lang="pt-BR" sz="2800" b="1" dirty="0" smtClean="0"/>
+              <a:rPr lang="pt-BR" sz="2800" b="1" dirty="0"/>
               <a:t> DAO</a:t>
             </a:r>
-            <a:endParaRPr lang="pt-BR" sz="2800" b="1" dirty="0"/>
           </a:p>
         </p:txBody>
       </p:sp>
@@ -7188,12 +7125,8 @@
           <a:lstStyle/>
           <a:p>
             <a:r>
-              <a:rPr lang="pt-BR" i="1" dirty="0" smtClean="0"/>
-              <a:t>Capacidade de </a:t>
-            </a:r>
-            <a:r>
               <a:rPr lang="pt-BR" i="1" dirty="0"/>
-              <a:t>isolar todo o código que acessa seu repositório de dados em um único lugar. Assim, toda vez que o desenvolvedor precisar realizar operações de persistência ele verá que existe um único local para isso, seus </a:t>
+              <a:t>Capacidade de isolar todo o código que acessa seu repositório de dados em um único lugar. Assim, toda vez que o desenvolvedor precisar realizar operações de persistência ele verá que existe um único local para isso, seus </a:t>
             </a:r>
             <a:r>
               <a:rPr lang="pt-BR" i="1" dirty="0" err="1"/>

</xml_diff>

<commit_message>
Adicionando Transpiler Babel - Código gerado com erro; Tratar depois
</commit_message>
<xml_diff>
--- a/docs/JS Avançado 1-2-3-resumo.pptx
+++ b/docs/JS Avançado 1-2-3-resumo.pptx
@@ -28,8 +28,10 @@
     <p:sldId id="280" r:id="rId22"/>
     <p:sldId id="281" r:id="rId23"/>
     <p:sldId id="282" r:id="rId24"/>
-    <p:sldId id="277" r:id="rId25"/>
-    <p:sldId id="278" r:id="rId26"/>
+    <p:sldId id="283" r:id="rId25"/>
+    <p:sldId id="284" r:id="rId26"/>
+    <p:sldId id="277" r:id="rId27"/>
+    <p:sldId id="278" r:id="rId28"/>
   </p:sldIdLst>
   <p:sldSz cx="12192000" cy="6858000"/>
   <p:notesSz cx="6858000" cy="9144000"/>
@@ -265,7 +267,7 @@
           <a:p>
             <a:fld id="{CC58B075-67F8-4A8D-AE1C-3D3E4193EBCA}" type="datetimeFigureOut">
               <a:rPr lang="pt-BR" smtClean="0"/>
-              <a:t>15/05/19</a:t>
+              <a:t>16/05/19</a:t>
             </a:fld>
             <a:endParaRPr lang="pt-BR"/>
           </a:p>
@@ -433,7 +435,7 @@
           <a:p>
             <a:fld id="{CC58B075-67F8-4A8D-AE1C-3D3E4193EBCA}" type="datetimeFigureOut">
               <a:rPr lang="pt-BR" smtClean="0"/>
-              <a:t>15/05/19</a:t>
+              <a:t>16/05/19</a:t>
             </a:fld>
             <a:endParaRPr lang="pt-BR"/>
           </a:p>
@@ -611,7 +613,7 @@
           <a:p>
             <a:fld id="{CC58B075-67F8-4A8D-AE1C-3D3E4193EBCA}" type="datetimeFigureOut">
               <a:rPr lang="pt-BR" smtClean="0"/>
-              <a:t>15/05/19</a:t>
+              <a:t>16/05/19</a:t>
             </a:fld>
             <a:endParaRPr lang="pt-BR"/>
           </a:p>
@@ -779,7 +781,7 @@
           <a:p>
             <a:fld id="{CC58B075-67F8-4A8D-AE1C-3D3E4193EBCA}" type="datetimeFigureOut">
               <a:rPr lang="pt-BR" smtClean="0"/>
-              <a:t>15/05/19</a:t>
+              <a:t>16/05/19</a:t>
             </a:fld>
             <a:endParaRPr lang="pt-BR"/>
           </a:p>
@@ -1024,7 +1026,7 @@
           <a:p>
             <a:fld id="{CC58B075-67F8-4A8D-AE1C-3D3E4193EBCA}" type="datetimeFigureOut">
               <a:rPr lang="pt-BR" smtClean="0"/>
-              <a:t>15/05/19</a:t>
+              <a:t>16/05/19</a:t>
             </a:fld>
             <a:endParaRPr lang="pt-BR"/>
           </a:p>
@@ -1253,7 +1255,7 @@
           <a:p>
             <a:fld id="{CC58B075-67F8-4A8D-AE1C-3D3E4193EBCA}" type="datetimeFigureOut">
               <a:rPr lang="pt-BR" smtClean="0"/>
-              <a:t>15/05/19</a:t>
+              <a:t>16/05/19</a:t>
             </a:fld>
             <a:endParaRPr lang="pt-BR"/>
           </a:p>
@@ -1617,7 +1619,7 @@
           <a:p>
             <a:fld id="{CC58B075-67F8-4A8D-AE1C-3D3E4193EBCA}" type="datetimeFigureOut">
               <a:rPr lang="pt-BR" smtClean="0"/>
-              <a:t>15/05/19</a:t>
+              <a:t>16/05/19</a:t>
             </a:fld>
             <a:endParaRPr lang="pt-BR"/>
           </a:p>
@@ -1734,7 +1736,7 @@
           <a:p>
             <a:fld id="{CC58B075-67F8-4A8D-AE1C-3D3E4193EBCA}" type="datetimeFigureOut">
               <a:rPr lang="pt-BR" smtClean="0"/>
-              <a:t>15/05/19</a:t>
+              <a:t>16/05/19</a:t>
             </a:fld>
             <a:endParaRPr lang="pt-BR"/>
           </a:p>
@@ -1829,7 +1831,7 @@
           <a:p>
             <a:fld id="{CC58B075-67F8-4A8D-AE1C-3D3E4193EBCA}" type="datetimeFigureOut">
               <a:rPr lang="pt-BR" smtClean="0"/>
-              <a:t>15/05/19</a:t>
+              <a:t>16/05/19</a:t>
             </a:fld>
             <a:endParaRPr lang="pt-BR"/>
           </a:p>
@@ -2104,7 +2106,7 @@
           <a:p>
             <a:fld id="{CC58B075-67F8-4A8D-AE1C-3D3E4193EBCA}" type="datetimeFigureOut">
               <a:rPr lang="pt-BR" smtClean="0"/>
-              <a:t>15/05/19</a:t>
+              <a:t>16/05/19</a:t>
             </a:fld>
             <a:endParaRPr lang="pt-BR"/>
           </a:p>
@@ -2356,7 +2358,7 @@
           <a:p>
             <a:fld id="{CC58B075-67F8-4A8D-AE1C-3D3E4193EBCA}" type="datetimeFigureOut">
               <a:rPr lang="pt-BR" smtClean="0"/>
-              <a:t>15/05/19</a:t>
+              <a:t>16/05/19</a:t>
             </a:fld>
             <a:endParaRPr lang="pt-BR"/>
           </a:p>
@@ -2567,7 +2569,7 @@
           <a:p>
             <a:fld id="{CC58B075-67F8-4A8D-AE1C-3D3E4193EBCA}" type="datetimeFigureOut">
               <a:rPr lang="pt-BR" smtClean="0"/>
-              <a:t>15/05/19</a:t>
+              <a:t>16/05/19</a:t>
             </a:fld>
             <a:endParaRPr lang="pt-BR"/>
           </a:p>
@@ -3898,7 +3900,7 @@
         </p:spPr>
         <p:txBody>
           <a:bodyPr>
-            <a:normAutofit lnSpcReduction="10000"/>
+            <a:normAutofit/>
           </a:bodyPr>
           <a:lstStyle/>
           <a:p>
@@ -7205,6 +7207,283 @@
             <p:ph type="title"/>
           </p:nvPr>
         </p:nvSpPr>
+        <p:spPr>
+          <a:xfrm>
+            <a:off x="759177" y="89552"/>
+            <a:ext cx="10515600" cy="549275"/>
+          </a:xfrm>
+        </p:spPr>
+        <p:txBody>
+          <a:bodyPr>
+            <a:normAutofit/>
+          </a:bodyPr>
+          <a:lstStyle/>
+          <a:p>
+            <a:pPr algn="ctr"/>
+            <a:r>
+              <a:rPr lang="pt-BR" sz="2800" b="1" dirty="0" err="1"/>
+              <a:t>Fetch</a:t>
+            </a:r>
+            <a:r>
+              <a:rPr lang="pt-BR" sz="2800" b="1" dirty="0"/>
+              <a:t> API</a:t>
+            </a:r>
+          </a:p>
+        </p:txBody>
+      </p:sp>
+      <p:sp>
+        <p:nvSpPr>
+          <p:cNvPr id="8" name="CaixaDeTexto 7"/>
+          <p:cNvSpPr txBox="1"/>
+          <p:nvPr/>
+        </p:nvSpPr>
+        <p:spPr>
+          <a:xfrm>
+            <a:off x="759177" y="802518"/>
+            <a:ext cx="9931401" cy="2308324"/>
+          </a:xfrm>
+          <a:prstGeom prst="rect">
+            <a:avLst/>
+          </a:prstGeom>
+          <a:noFill/>
+        </p:spPr>
+        <p:txBody>
+          <a:bodyPr wrap="square" rtlCol="0">
+            <a:spAutoFit/>
+          </a:bodyPr>
+          <a:lstStyle/>
+          <a:p>
+            <a:r>
+              <a:rPr lang="pt-BR" dirty="0"/>
+              <a:t>Neste curso, estamos usando o </a:t>
+            </a:r>
+            <a:r>
+              <a:rPr lang="pt-BR" dirty="0" err="1"/>
+              <a:t>ECMAScript</a:t>
+            </a:r>
+            <a:r>
+              <a:rPr lang="pt-BR" dirty="0"/>
+              <a:t> 2015. Não usamos mais o termo "ES 6", porque a cada ano, o </a:t>
+            </a:r>
+            <a:r>
+              <a:rPr lang="pt-BR" dirty="0" err="1"/>
+              <a:t>JavaScript</a:t>
+            </a:r>
+            <a:r>
+              <a:rPr lang="pt-BR" dirty="0"/>
+              <a:t> ganha novos recursos. No ES 2016, foi incluída uma API com o objetivo de simplificar a criação de requisições Ajax: </a:t>
+            </a:r>
+            <a:r>
+              <a:rPr lang="pt-BR" b="1" dirty="0" err="1"/>
+              <a:t>Fetch</a:t>
+            </a:r>
+            <a:r>
+              <a:rPr lang="pt-BR" b="1" dirty="0"/>
+              <a:t> API</a:t>
+            </a:r>
+            <a:r>
+              <a:rPr lang="pt-BR" dirty="0"/>
+              <a:t>, uma API de busca do JS. O que veremos aqui, vai além do </a:t>
+            </a:r>
+            <a:r>
+              <a:rPr lang="pt-BR" dirty="0" err="1"/>
+              <a:t>ECMAScript</a:t>
+            </a:r>
+            <a:r>
+              <a:rPr lang="pt-BR" dirty="0"/>
+              <a:t> 2015.</a:t>
+            </a:r>
+          </a:p>
+          <a:p>
+            <a:endParaRPr lang="pt-BR" dirty="0"/>
+          </a:p>
+          <a:p>
+            <a:r>
+              <a:rPr lang="pt-BR" dirty="0"/>
+              <a:t>Talvez, você fique preocupado se o seu código funcionará em outros navegadores, mas temos uma solução para a questão de compatibilidade. Mas, por enquanto, pedimos que você realize os testes no Chrome ou no Firefox, deixando os outros browsers de lado por enquanto.</a:t>
+            </a:r>
+          </a:p>
+        </p:txBody>
+      </p:sp>
+    </p:spTree>
+    <p:extLst>
+      <p:ext uri="{BB962C8B-B14F-4D97-AF65-F5344CB8AC3E}">
+        <p14:creationId xmlns:p14="http://schemas.microsoft.com/office/powerpoint/2010/main" val="1284380944"/>
+      </p:ext>
+    </p:extLst>
+  </p:cSld>
+  <p:clrMapOvr>
+    <a:masterClrMapping/>
+  </p:clrMapOvr>
+</p:sld>
+</file>
+
+<file path=ppt/slides/slide25.xml><?xml version="1.0" encoding="utf-8"?>
+<p:sld xmlns:a="http://schemas.openxmlformats.org/drawingml/2006/main" xmlns:r="http://schemas.openxmlformats.org/officeDocument/2006/relationships" xmlns:p="http://schemas.openxmlformats.org/presentationml/2006/main">
+  <p:cSld>
+    <p:spTree>
+      <p:nvGrpSpPr>
+        <p:cNvPr id="1" name=""/>
+        <p:cNvGrpSpPr/>
+        <p:nvPr/>
+      </p:nvGrpSpPr>
+      <p:grpSpPr>
+        <a:xfrm>
+          <a:off x="0" y="0"/>
+          <a:ext cx="0" cy="0"/>
+          <a:chOff x="0" y="0"/>
+          <a:chExt cx="0" cy="0"/>
+        </a:xfrm>
+      </p:grpSpPr>
+      <p:sp>
+        <p:nvSpPr>
+          <p:cNvPr id="2" name="Título 1"/>
+          <p:cNvSpPr>
+            <a:spLocks noGrp="1"/>
+          </p:cNvSpPr>
+          <p:nvPr>
+            <p:ph type="title"/>
+          </p:nvPr>
+        </p:nvSpPr>
+        <p:spPr>
+          <a:xfrm>
+            <a:off x="759177" y="89552"/>
+            <a:ext cx="10515600" cy="549275"/>
+          </a:xfrm>
+        </p:spPr>
+        <p:txBody>
+          <a:bodyPr>
+            <a:normAutofit fontScale="90000"/>
+          </a:bodyPr>
+          <a:lstStyle/>
+          <a:p>
+            <a:pPr algn="ctr"/>
+            <a:r>
+              <a:rPr lang="pt-BR" b="1" dirty="0" err="1"/>
+              <a:t>Transcompilação</a:t>
+            </a:r>
+            <a:endParaRPr lang="pt-BR" sz="2800" b="1" dirty="0"/>
+          </a:p>
+        </p:txBody>
+      </p:sp>
+      <p:sp>
+        <p:nvSpPr>
+          <p:cNvPr id="8" name="CaixaDeTexto 7"/>
+          <p:cNvSpPr txBox="1"/>
+          <p:nvPr/>
+        </p:nvSpPr>
+        <p:spPr>
+          <a:xfrm>
+            <a:off x="759177" y="802518"/>
+            <a:ext cx="9931401" cy="1477328"/>
+          </a:xfrm>
+          <a:prstGeom prst="rect">
+            <a:avLst/>
+          </a:prstGeom>
+          <a:noFill/>
+        </p:spPr>
+        <p:txBody>
+          <a:bodyPr wrap="square" rtlCol="0">
+            <a:spAutoFit/>
+          </a:bodyPr>
+          <a:lstStyle/>
+          <a:p>
+            <a:r>
+              <a:rPr lang="pt-BR" dirty="0"/>
+              <a:t>Nós programaremos com o ES6 e depois, vamos compilar o código para o ES5. Este processo de </a:t>
+            </a:r>
+            <a:r>
+              <a:rPr lang="pt-BR" i="1" dirty="0" err="1"/>
+              <a:t>downgrade</a:t>
+            </a:r>
+            <a:r>
+              <a:rPr lang="pt-BR" dirty="0"/>
+              <a:t> </a:t>
+            </a:r>
+          </a:p>
+          <a:p>
+            <a:endParaRPr lang="pt-BR" dirty="0"/>
+          </a:p>
+          <a:p>
+            <a:r>
+              <a:rPr lang="pt-BR" dirty="0"/>
+              <a:t>Encontramos vários </a:t>
+            </a:r>
+            <a:r>
+              <a:rPr lang="pt-BR" i="1" dirty="0" err="1"/>
+              <a:t>transpilers</a:t>
+            </a:r>
+            <a:r>
+              <a:rPr lang="pt-BR" dirty="0"/>
+              <a:t> no mercado: </a:t>
+            </a:r>
+            <a:r>
+              <a:rPr lang="pt-BR" b="1" dirty="0"/>
+              <a:t>Babel</a:t>
+            </a:r>
+            <a:r>
+              <a:rPr lang="pt-BR" dirty="0"/>
+              <a:t>, o </a:t>
+            </a:r>
+            <a:r>
+              <a:rPr lang="pt-BR" b="1" dirty="0" err="1"/>
+              <a:t>TypeScript</a:t>
+            </a:r>
+            <a:r>
+              <a:rPr lang="pt-BR" dirty="0"/>
+              <a:t> (que também atua como </a:t>
+            </a:r>
+            <a:r>
+              <a:rPr lang="pt-BR" dirty="0" err="1"/>
+              <a:t>transcompilador</a:t>
+            </a:r>
+            <a:r>
+              <a:rPr lang="pt-BR" dirty="0"/>
+              <a:t>). No nosso caso, focaremos no Babel, por ser open source.</a:t>
+            </a:r>
+          </a:p>
+        </p:txBody>
+      </p:sp>
+    </p:spTree>
+    <p:extLst>
+      <p:ext uri="{BB962C8B-B14F-4D97-AF65-F5344CB8AC3E}">
+        <p14:creationId xmlns:p14="http://schemas.microsoft.com/office/powerpoint/2010/main" val="3964789399"/>
+      </p:ext>
+    </p:extLst>
+  </p:cSld>
+  <p:clrMapOvr>
+    <a:masterClrMapping/>
+  </p:clrMapOvr>
+</p:sld>
+</file>
+
+<file path=ppt/slides/slide26.xml><?xml version="1.0" encoding="utf-8"?>
+<p:sld xmlns:a="http://schemas.openxmlformats.org/drawingml/2006/main" xmlns:r="http://schemas.openxmlformats.org/officeDocument/2006/relationships" xmlns:p="http://schemas.openxmlformats.org/presentationml/2006/main">
+  <p:cSld>
+    <p:spTree>
+      <p:nvGrpSpPr>
+        <p:cNvPr id="1" name=""/>
+        <p:cNvGrpSpPr/>
+        <p:nvPr/>
+      </p:nvGrpSpPr>
+      <p:grpSpPr>
+        <a:xfrm>
+          <a:off x="0" y="0"/>
+          <a:ext cx="0" cy="0"/>
+          <a:chOff x="0" y="0"/>
+          <a:chExt cx="0" cy="0"/>
+        </a:xfrm>
+      </p:grpSpPr>
+      <p:sp>
+        <p:nvSpPr>
+          <p:cNvPr id="2" name="Título 1"/>
+          <p:cNvSpPr>
+            <a:spLocks noGrp="1"/>
+          </p:cNvSpPr>
+          <p:nvPr>
+            <p:ph type="title"/>
+          </p:nvPr>
+        </p:nvSpPr>
         <p:spPr/>
         <p:txBody>
           <a:bodyPr/>
@@ -7246,7 +7525,7 @@
 </p:sld>
 </file>
 
-<file path=ppt/slides/slide25.xml><?xml version="1.0" encoding="utf-8"?>
+<file path=ppt/slides/slide27.xml><?xml version="1.0" encoding="utf-8"?>
 <p:sld xmlns:a="http://schemas.openxmlformats.org/drawingml/2006/main" xmlns:r="http://schemas.openxmlformats.org/officeDocument/2006/relationships" xmlns:p="http://schemas.openxmlformats.org/presentationml/2006/main">
   <p:cSld>
     <p:spTree>

</xml_diff>

<commit_message>
Adicionando a estrutra de módulos do ES6 e configurando um Loader (System.js)
</commit_message>
<xml_diff>
--- a/docs/JS Avançado 1-2-3-resumo.pptx
+++ b/docs/JS Avançado 1-2-3-resumo.pptx
@@ -30,8 +30,9 @@
     <p:sldId id="282" r:id="rId24"/>
     <p:sldId id="283" r:id="rId25"/>
     <p:sldId id="284" r:id="rId26"/>
-    <p:sldId id="277" r:id="rId27"/>
-    <p:sldId id="278" r:id="rId28"/>
+    <p:sldId id="285" r:id="rId27"/>
+    <p:sldId id="277" r:id="rId28"/>
+    <p:sldId id="278" r:id="rId29"/>
   </p:sldIdLst>
   <p:sldSz cx="12192000" cy="6858000"/>
   <p:notesSz cx="6858000" cy="9144000"/>
@@ -267,7 +268,7 @@
           <a:p>
             <a:fld id="{CC58B075-67F8-4A8D-AE1C-3D3E4193EBCA}" type="datetimeFigureOut">
               <a:rPr lang="pt-BR" smtClean="0"/>
-              <a:t>16/05/19</a:t>
+              <a:t>19/05/19</a:t>
             </a:fld>
             <a:endParaRPr lang="pt-BR"/>
           </a:p>
@@ -435,7 +436,7 @@
           <a:p>
             <a:fld id="{CC58B075-67F8-4A8D-AE1C-3D3E4193EBCA}" type="datetimeFigureOut">
               <a:rPr lang="pt-BR" smtClean="0"/>
-              <a:t>16/05/19</a:t>
+              <a:t>19/05/19</a:t>
             </a:fld>
             <a:endParaRPr lang="pt-BR"/>
           </a:p>
@@ -613,7 +614,7 @@
           <a:p>
             <a:fld id="{CC58B075-67F8-4A8D-AE1C-3D3E4193EBCA}" type="datetimeFigureOut">
               <a:rPr lang="pt-BR" smtClean="0"/>
-              <a:t>16/05/19</a:t>
+              <a:t>19/05/19</a:t>
             </a:fld>
             <a:endParaRPr lang="pt-BR"/>
           </a:p>
@@ -781,7 +782,7 @@
           <a:p>
             <a:fld id="{CC58B075-67F8-4A8D-AE1C-3D3E4193EBCA}" type="datetimeFigureOut">
               <a:rPr lang="pt-BR" smtClean="0"/>
-              <a:t>16/05/19</a:t>
+              <a:t>19/05/19</a:t>
             </a:fld>
             <a:endParaRPr lang="pt-BR"/>
           </a:p>
@@ -1026,7 +1027,7 @@
           <a:p>
             <a:fld id="{CC58B075-67F8-4A8D-AE1C-3D3E4193EBCA}" type="datetimeFigureOut">
               <a:rPr lang="pt-BR" smtClean="0"/>
-              <a:t>16/05/19</a:t>
+              <a:t>19/05/19</a:t>
             </a:fld>
             <a:endParaRPr lang="pt-BR"/>
           </a:p>
@@ -1255,7 +1256,7 @@
           <a:p>
             <a:fld id="{CC58B075-67F8-4A8D-AE1C-3D3E4193EBCA}" type="datetimeFigureOut">
               <a:rPr lang="pt-BR" smtClean="0"/>
-              <a:t>16/05/19</a:t>
+              <a:t>19/05/19</a:t>
             </a:fld>
             <a:endParaRPr lang="pt-BR"/>
           </a:p>
@@ -1619,7 +1620,7 @@
           <a:p>
             <a:fld id="{CC58B075-67F8-4A8D-AE1C-3D3E4193EBCA}" type="datetimeFigureOut">
               <a:rPr lang="pt-BR" smtClean="0"/>
-              <a:t>16/05/19</a:t>
+              <a:t>19/05/19</a:t>
             </a:fld>
             <a:endParaRPr lang="pt-BR"/>
           </a:p>
@@ -1736,7 +1737,7 @@
           <a:p>
             <a:fld id="{CC58B075-67F8-4A8D-AE1C-3D3E4193EBCA}" type="datetimeFigureOut">
               <a:rPr lang="pt-BR" smtClean="0"/>
-              <a:t>16/05/19</a:t>
+              <a:t>19/05/19</a:t>
             </a:fld>
             <a:endParaRPr lang="pt-BR"/>
           </a:p>
@@ -1831,7 +1832,7 @@
           <a:p>
             <a:fld id="{CC58B075-67F8-4A8D-AE1C-3D3E4193EBCA}" type="datetimeFigureOut">
               <a:rPr lang="pt-BR" smtClean="0"/>
-              <a:t>16/05/19</a:t>
+              <a:t>19/05/19</a:t>
             </a:fld>
             <a:endParaRPr lang="pt-BR"/>
           </a:p>
@@ -2106,7 +2107,7 @@
           <a:p>
             <a:fld id="{CC58B075-67F8-4A8D-AE1C-3D3E4193EBCA}" type="datetimeFigureOut">
               <a:rPr lang="pt-BR" smtClean="0"/>
-              <a:t>16/05/19</a:t>
+              <a:t>19/05/19</a:t>
             </a:fld>
             <a:endParaRPr lang="pt-BR"/>
           </a:p>
@@ -2358,7 +2359,7 @@
           <a:p>
             <a:fld id="{CC58B075-67F8-4A8D-AE1C-3D3E4193EBCA}" type="datetimeFigureOut">
               <a:rPr lang="pt-BR" smtClean="0"/>
-              <a:t>16/05/19</a:t>
+              <a:t>19/05/19</a:t>
             </a:fld>
             <a:endParaRPr lang="pt-BR"/>
           </a:p>
@@ -2569,7 +2570,7 @@
           <a:p>
             <a:fld id="{CC58B075-67F8-4A8D-AE1C-3D3E4193EBCA}" type="datetimeFigureOut">
               <a:rPr lang="pt-BR" smtClean="0"/>
-              <a:t>16/05/19</a:t>
+              <a:t>19/05/19</a:t>
             </a:fld>
             <a:endParaRPr lang="pt-BR"/>
           </a:p>
@@ -7484,6 +7485,304 @@
             <p:ph type="title"/>
           </p:nvPr>
         </p:nvSpPr>
+        <p:spPr>
+          <a:xfrm>
+            <a:off x="759177" y="89552"/>
+            <a:ext cx="10515600" cy="549275"/>
+          </a:xfrm>
+        </p:spPr>
+        <p:txBody>
+          <a:bodyPr>
+            <a:normAutofit fontScale="90000"/>
+          </a:bodyPr>
+          <a:lstStyle/>
+          <a:p>
+            <a:pPr algn="ctr"/>
+            <a:r>
+              <a:rPr lang="pt-BR" b="1" dirty="0" err="1"/>
+              <a:t>Loader</a:t>
+            </a:r>
+            <a:r>
+              <a:rPr lang="pt-BR" b="1" dirty="0"/>
+              <a:t> – </a:t>
+            </a:r>
+            <a:r>
+              <a:rPr lang="pt-BR" b="1" dirty="0" err="1"/>
+              <a:t>System.js</a:t>
+            </a:r>
+            <a:endParaRPr lang="pt-BR" sz="2800" b="1" dirty="0"/>
+          </a:p>
+        </p:txBody>
+      </p:sp>
+      <p:sp>
+        <p:nvSpPr>
+          <p:cNvPr id="8" name="CaixaDeTexto 7"/>
+          <p:cNvSpPr txBox="1"/>
+          <p:nvPr/>
+        </p:nvSpPr>
+        <p:spPr>
+          <a:xfrm>
+            <a:off x="759177" y="802518"/>
+            <a:ext cx="9931401" cy="3416320"/>
+          </a:xfrm>
+          <a:prstGeom prst="rect">
+            <a:avLst/>
+          </a:prstGeom>
+          <a:noFill/>
+        </p:spPr>
+        <p:txBody>
+          <a:bodyPr wrap="square" rtlCol="0">
+            <a:spAutoFit/>
+          </a:bodyPr>
+          <a:lstStyle/>
+          <a:p>
+            <a:r>
+              <a:rPr lang="pt-BR" dirty="0"/>
+              <a:t>Estamos usando os módulos de ES6 definindo os </a:t>
+            </a:r>
+            <a:r>
+              <a:rPr lang="pt-BR" dirty="0" err="1"/>
+              <a:t>imports</a:t>
+            </a:r>
+            <a:r>
+              <a:rPr lang="pt-BR" dirty="0"/>
+              <a:t> e </a:t>
+            </a:r>
+            <a:r>
+              <a:rPr lang="pt-BR" dirty="0" err="1"/>
+              <a:t>exports</a:t>
+            </a:r>
+            <a:r>
+              <a:rPr lang="pt-BR" dirty="0"/>
+              <a:t>, mas não definimos como estes módulos devem ser carregados no navegador. Não existe um consenso ... Precisamos que os scripts sejam carregados numa determinada ordem no sistema.</a:t>
+            </a:r>
+          </a:p>
+          <a:p>
+            <a:endParaRPr lang="pt-BR" dirty="0"/>
+          </a:p>
+          <a:p>
+            <a:r>
+              <a:rPr lang="pt-BR" dirty="0"/>
+              <a:t>O responsável por isso, chama-se </a:t>
+            </a:r>
+            <a:r>
+              <a:rPr lang="pt-BR" b="1" dirty="0" err="1"/>
+              <a:t>Loader</a:t>
+            </a:r>
+            <a:r>
+              <a:rPr lang="pt-BR" dirty="0"/>
+              <a:t>, porém não existe um padrão.</a:t>
+            </a:r>
+          </a:p>
+          <a:p>
+            <a:endParaRPr lang="pt-BR" dirty="0"/>
+          </a:p>
+          <a:p>
+            <a:r>
+              <a:rPr lang="pt-BR" dirty="0"/>
+              <a:t>Uma biblioteca muito famosa é o </a:t>
+            </a:r>
+            <a:r>
+              <a:rPr lang="pt-BR" b="1" dirty="0" err="1"/>
+              <a:t>System.js</a:t>
+            </a:r>
+            <a:r>
+              <a:rPr lang="pt-BR" b="1" dirty="0"/>
+              <a:t> </a:t>
+            </a:r>
+            <a:r>
+              <a:rPr lang="pt-BR" dirty="0"/>
+              <a:t>e será instalada pelo </a:t>
+            </a:r>
+            <a:r>
+              <a:rPr lang="pt-BR" b="1" dirty="0" err="1"/>
+              <a:t>Node.JS</a:t>
+            </a:r>
+            <a:r>
+              <a:rPr lang="pt-BR" b="1" dirty="0"/>
+              <a:t> </a:t>
+            </a:r>
+          </a:p>
+          <a:p>
+            <a:endParaRPr lang="pt-BR" b="1" dirty="0"/>
+          </a:p>
+          <a:p>
+            <a:r>
+              <a:rPr lang="pt-BR" dirty="0"/>
+              <a:t>Precisa ser carregado no </a:t>
+            </a:r>
+            <a:r>
+              <a:rPr lang="pt-BR" dirty="0" err="1"/>
+              <a:t>index.html</a:t>
+            </a:r>
+            <a:endParaRPr lang="pt-BR" dirty="0"/>
+          </a:p>
+          <a:p>
+            <a:r>
+              <a:rPr lang="pt-BR" b="1" dirty="0"/>
+              <a:t>	</a:t>
+            </a:r>
+          </a:p>
+          <a:p>
+            <a:r>
+              <a:rPr lang="pt-BR" b="1" dirty="0"/>
+              <a:t>	</a:t>
+            </a:r>
+            <a:r>
+              <a:rPr lang="pt-BR" dirty="0">
+                <a:solidFill>
+                  <a:srgbClr val="990055"/>
+                </a:solidFill>
+              </a:rPr>
+              <a:t>&lt;script</a:t>
+            </a:r>
+            <a:r>
+              <a:rPr lang="pt-BR" dirty="0"/>
+              <a:t> </a:t>
+            </a:r>
+            <a:r>
+              <a:rPr lang="pt-BR" dirty="0" err="1">
+                <a:solidFill>
+                  <a:srgbClr val="669900"/>
+                </a:solidFill>
+              </a:rPr>
+              <a:t>src</a:t>
+            </a:r>
+            <a:r>
+              <a:rPr lang="pt-BR" dirty="0">
+                <a:solidFill>
+                  <a:srgbClr val="999999"/>
+                </a:solidFill>
+              </a:rPr>
+              <a:t>=</a:t>
+            </a:r>
+            <a:r>
+              <a:rPr lang="pt-BR" dirty="0">
+                <a:solidFill>
+                  <a:srgbClr val="0077AA"/>
+                </a:solidFill>
+              </a:rPr>
+              <a:t>"</a:t>
+            </a:r>
+            <a:r>
+              <a:rPr lang="pt-BR" dirty="0" err="1">
+                <a:solidFill>
+                  <a:srgbClr val="0077AA"/>
+                </a:solidFill>
+              </a:rPr>
+              <a:t>node_modules</a:t>
+            </a:r>
+            <a:r>
+              <a:rPr lang="pt-BR" dirty="0">
+                <a:solidFill>
+                  <a:srgbClr val="0077AA"/>
+                </a:solidFill>
+              </a:rPr>
+              <a:t>/</a:t>
+            </a:r>
+            <a:r>
+              <a:rPr lang="pt-BR" dirty="0" err="1">
+                <a:solidFill>
+                  <a:srgbClr val="0077AA"/>
+                </a:solidFill>
+              </a:rPr>
+              <a:t>systemjs</a:t>
+            </a:r>
+            <a:r>
+              <a:rPr lang="pt-BR" dirty="0">
+                <a:solidFill>
+                  <a:srgbClr val="0077AA"/>
+                </a:solidFill>
+              </a:rPr>
+              <a:t>/</a:t>
+            </a:r>
+            <a:r>
+              <a:rPr lang="pt-BR" dirty="0" err="1">
+                <a:solidFill>
+                  <a:srgbClr val="0077AA"/>
+                </a:solidFill>
+              </a:rPr>
+              <a:t>dist</a:t>
+            </a:r>
+            <a:r>
+              <a:rPr lang="pt-BR" dirty="0">
+                <a:solidFill>
+                  <a:srgbClr val="0077AA"/>
+                </a:solidFill>
+              </a:rPr>
+              <a:t>/</a:t>
+            </a:r>
+            <a:r>
+              <a:rPr lang="pt-BR" dirty="0" err="1">
+                <a:solidFill>
+                  <a:srgbClr val="0077AA"/>
+                </a:solidFill>
+              </a:rPr>
+              <a:t>system.js</a:t>
+            </a:r>
+            <a:r>
+              <a:rPr lang="pt-BR" dirty="0">
+                <a:solidFill>
+                  <a:srgbClr val="0077AA"/>
+                </a:solidFill>
+              </a:rPr>
+              <a:t>"</a:t>
+            </a:r>
+            <a:r>
+              <a:rPr lang="pt-BR" dirty="0">
+                <a:solidFill>
+                  <a:srgbClr val="990055"/>
+                </a:solidFill>
+              </a:rPr>
+              <a:t>&gt;&lt;/script&gt;</a:t>
+            </a:r>
+            <a:endParaRPr lang="pt-BR" b="1" dirty="0"/>
+          </a:p>
+          <a:p>
+            <a:endParaRPr lang="pt-BR" dirty="0"/>
+          </a:p>
+        </p:txBody>
+      </p:sp>
+    </p:spTree>
+    <p:extLst>
+      <p:ext uri="{BB962C8B-B14F-4D97-AF65-F5344CB8AC3E}">
+        <p14:creationId xmlns:p14="http://schemas.microsoft.com/office/powerpoint/2010/main" val="2627748378"/>
+      </p:ext>
+    </p:extLst>
+  </p:cSld>
+  <p:clrMapOvr>
+    <a:masterClrMapping/>
+  </p:clrMapOvr>
+</p:sld>
+</file>
+
+<file path=ppt/slides/slide27.xml><?xml version="1.0" encoding="utf-8"?>
+<p:sld xmlns:a="http://schemas.openxmlformats.org/drawingml/2006/main" xmlns:r="http://schemas.openxmlformats.org/officeDocument/2006/relationships" xmlns:p="http://schemas.openxmlformats.org/presentationml/2006/main">
+  <p:cSld>
+    <p:spTree>
+      <p:nvGrpSpPr>
+        <p:cNvPr id="1" name=""/>
+        <p:cNvGrpSpPr/>
+        <p:nvPr/>
+      </p:nvGrpSpPr>
+      <p:grpSpPr>
+        <a:xfrm>
+          <a:off x="0" y="0"/>
+          <a:ext cx="0" cy="0"/>
+          <a:chOff x="0" y="0"/>
+          <a:chExt cx="0" cy="0"/>
+        </a:xfrm>
+      </p:grpSpPr>
+      <p:sp>
+        <p:nvSpPr>
+          <p:cNvPr id="2" name="Título 1"/>
+          <p:cNvSpPr>
+            <a:spLocks noGrp="1"/>
+          </p:cNvSpPr>
+          <p:nvPr>
+            <p:ph type="title"/>
+          </p:nvPr>
+        </p:nvSpPr>
         <p:spPr/>
         <p:txBody>
           <a:bodyPr/>
@@ -7525,7 +7824,7 @@
 </p:sld>
 </file>
 
-<file path=ppt/slides/slide27.xml><?xml version="1.0" encoding="utf-8"?>
+<file path=ppt/slides/slide28.xml><?xml version="1.0" encoding="utf-8"?>
 <p:sld xmlns:a="http://schemas.openxmlformats.org/drawingml/2006/main" xmlns:r="http://schemas.openxmlformats.org/officeDocument/2006/relationships" xmlns:p="http://schemas.openxmlformats.org/presentationml/2006/main">
   <p:cSld>
     <p:spTree>

</xml_diff>